<commit_message>
started section on statics
</commit_message>
<xml_diff>
--- a/tex/figures/ApplyingNewtonsLaws/Figures.pptx
+++ b/tex/figures/ApplyingNewtonsLaws/Figures.pptx
@@ -7,6 +7,7 @@
   <p:sldIdLst>
     <p:sldId id="271" r:id="rId2"/>
     <p:sldId id="270" r:id="rId3"/>
+    <p:sldId id="272" r:id="rId4"/>
   </p:sldIdLst>
   <p:sldSz cx="12192000" cy="6858000"/>
   <p:notesSz cx="6858000" cy="9144000"/>
@@ -7479,6 +7480,1501 @@
 </p:sld>
 </file>
 
+<file path=ppt/slides/slide3.xml><?xml version="1.0" encoding="utf-8"?>
+<p:sld xmlns:a="http://schemas.openxmlformats.org/drawingml/2006/main" xmlns:r="http://schemas.openxmlformats.org/officeDocument/2006/relationships" xmlns:p="http://schemas.openxmlformats.org/presentationml/2006/main">
+  <p:cSld>
+    <p:spTree>
+      <p:nvGrpSpPr>
+        <p:cNvPr id="1" name=""/>
+        <p:cNvGrpSpPr/>
+        <p:nvPr/>
+      </p:nvGrpSpPr>
+      <p:grpSpPr>
+        <a:xfrm>
+          <a:off x="0" y="0"/>
+          <a:ext cx="0" cy="0"/>
+          <a:chOff x="0" y="0"/>
+          <a:chExt cx="0" cy="0"/>
+        </a:xfrm>
+      </p:grpSpPr>
+      <p:grpSp>
+        <p:nvGrpSpPr>
+          <p:cNvPr id="26" name="Group 25"/>
+          <p:cNvGrpSpPr/>
+          <p:nvPr/>
+        </p:nvGrpSpPr>
+        <p:grpSpPr>
+          <a:xfrm>
+            <a:off x="2040673" y="1739590"/>
+            <a:ext cx="1626352" cy="2040673"/>
+            <a:chOff x="2040673" y="1739590"/>
+            <a:chExt cx="1626352" cy="2040673"/>
+          </a:xfrm>
+        </p:grpSpPr>
+        <p:sp>
+          <p:nvSpPr>
+            <p:cNvPr id="4" name="Rectangle 3"/>
+            <p:cNvSpPr/>
+            <p:nvPr/>
+          </p:nvSpPr>
+          <p:spPr>
+            <a:xfrm>
+              <a:off x="3434576" y="1739590"/>
+              <a:ext cx="232449" cy="2040673"/>
+            </a:xfrm>
+            <a:prstGeom prst="rect">
+              <a:avLst/>
+            </a:prstGeom>
+            <a:solidFill>
+              <a:schemeClr val="bg2">
+                <a:lumMod val="50000"/>
+              </a:schemeClr>
+            </a:solidFill>
+            <a:ln w="38100">
+              <a:solidFill>
+                <a:schemeClr val="tx1"/>
+              </a:solidFill>
+            </a:ln>
+          </p:spPr>
+          <p:style>
+            <a:lnRef idx="2">
+              <a:schemeClr val="accent1">
+                <a:shade val="50000"/>
+              </a:schemeClr>
+            </a:lnRef>
+            <a:fillRef idx="1">
+              <a:schemeClr val="accent1"/>
+            </a:fillRef>
+            <a:effectRef idx="0">
+              <a:schemeClr val="accent1"/>
+            </a:effectRef>
+            <a:fontRef idx="minor">
+              <a:schemeClr val="lt1"/>
+            </a:fontRef>
+          </p:style>
+          <p:txBody>
+            <a:bodyPr rtlCol="0" anchor="ctr"/>
+            <a:lstStyle/>
+            <a:p>
+              <a:pPr algn="ctr"/>
+              <a:endParaRPr lang="en-US"/>
+            </a:p>
+          </p:txBody>
+        </p:sp>
+        <p:sp>
+          <p:nvSpPr>
+            <p:cNvPr id="5" name="Rectangle 4"/>
+            <p:cNvSpPr/>
+            <p:nvPr/>
+          </p:nvSpPr>
+          <p:spPr>
+            <a:xfrm>
+              <a:off x="2787805" y="2509024"/>
+              <a:ext cx="646771" cy="602166"/>
+            </a:xfrm>
+            <a:prstGeom prst="rect">
+              <a:avLst/>
+            </a:prstGeom>
+            <a:solidFill>
+              <a:schemeClr val="bg2">
+                <a:lumMod val="90000"/>
+              </a:schemeClr>
+            </a:solidFill>
+            <a:ln w="38100">
+              <a:solidFill>
+                <a:schemeClr val="tx1"/>
+              </a:solidFill>
+            </a:ln>
+          </p:spPr>
+          <p:style>
+            <a:lnRef idx="2">
+              <a:schemeClr val="accent1">
+                <a:shade val="50000"/>
+              </a:schemeClr>
+            </a:lnRef>
+            <a:fillRef idx="1">
+              <a:schemeClr val="accent1"/>
+            </a:fillRef>
+            <a:effectRef idx="0">
+              <a:schemeClr val="accent1"/>
+            </a:effectRef>
+            <a:fontRef idx="minor">
+              <a:schemeClr val="lt1"/>
+            </a:fontRef>
+          </p:style>
+          <p:txBody>
+            <a:bodyPr rtlCol="0" anchor="ctr"/>
+            <a:lstStyle/>
+            <a:p>
+              <a:pPr algn="ctr"/>
+              <a:endParaRPr lang="en-US"/>
+            </a:p>
+          </p:txBody>
+        </p:sp>
+        <p:cxnSp>
+          <p:nvCxnSpPr>
+            <p:cNvPr id="7" name="Straight Arrow Connector 6"/>
+            <p:cNvCxnSpPr>
+              <a:endCxn id="5" idx="1"/>
+            </p:cNvCxnSpPr>
+            <p:nvPr/>
+          </p:nvCxnSpPr>
+          <p:spPr>
+            <a:xfrm>
+              <a:off x="2040673" y="2810107"/>
+              <a:ext cx="747132" cy="0"/>
+            </a:xfrm>
+            <a:prstGeom prst="straightConnector1">
+              <a:avLst/>
+            </a:prstGeom>
+            <a:ln w="38100">
+              <a:solidFill>
+                <a:schemeClr val="tx1"/>
+              </a:solidFill>
+              <a:tailEnd type="triangle"/>
+            </a:ln>
+          </p:spPr>
+          <p:style>
+            <a:lnRef idx="1">
+              <a:schemeClr val="accent1"/>
+            </a:lnRef>
+            <a:fillRef idx="0">
+              <a:schemeClr val="accent1"/>
+            </a:fillRef>
+            <a:effectRef idx="0">
+              <a:schemeClr val="accent1"/>
+            </a:effectRef>
+            <a:fontRef idx="minor">
+              <a:schemeClr val="tx1"/>
+            </a:fontRef>
+          </p:style>
+        </p:cxnSp>
+        <mc:AlternateContent xmlns:mc="http://schemas.openxmlformats.org/markup-compatibility/2006">
+          <mc:Choice xmlns:a14="http://schemas.microsoft.com/office/drawing/2010/main" Requires="a14">
+            <p:sp>
+              <p:nvSpPr>
+                <p:cNvPr id="8" name="TextBox 7"/>
+                <p:cNvSpPr txBox="1"/>
+                <p:nvPr/>
+              </p:nvSpPr>
+              <p:spPr>
+                <a:xfrm>
+                  <a:off x="2317727" y="2414501"/>
+                  <a:ext cx="237629" cy="345159"/>
+                </a:xfrm>
+                <a:prstGeom prst="rect">
+                  <a:avLst/>
+                </a:prstGeom>
+                <a:noFill/>
+              </p:spPr>
+              <p:txBody>
+                <a:bodyPr wrap="none" lIns="0" tIns="0" rIns="0" bIns="0" rtlCol="0">
+                  <a:spAutoFit/>
+                </a:bodyPr>
+                <a:lstStyle/>
+                <a:p>
+                  <a14:m>
+                    <m:oMathPara xmlns:m="http://schemas.openxmlformats.org/officeDocument/2006/math">
+                      <m:oMathParaPr>
+                        <m:jc m:val="centerGroup"/>
+                      </m:oMathParaPr>
+                      <m:oMath xmlns:m="http://schemas.openxmlformats.org/officeDocument/2006/math">
+                        <m:acc>
+                          <m:accPr>
+                            <m:chr m:val="⃗"/>
+                            <m:ctrlPr>
+                              <a:rPr lang="en-US" sz="2000" b="0" i="1" smtClean="0">
+                                <a:latin typeface="Cambria Math" panose="02040503050406030204" pitchFamily="18" charset="0"/>
+                                <a:cs typeface="Arial" panose="020B0604020202020204" pitchFamily="34" charset="0"/>
+                              </a:rPr>
+                            </m:ctrlPr>
+                          </m:accPr>
+                          <m:e>
+                            <m:r>
+                              <a:rPr lang="en-US" sz="2000" b="0" i="1" smtClean="0">
+                                <a:latin typeface="Cambria Math" panose="02040503050406030204" pitchFamily="18" charset="0"/>
+                                <a:cs typeface="Arial" panose="020B0604020202020204" pitchFamily="34" charset="0"/>
+                              </a:rPr>
+                              <m:t>𝐹</m:t>
+                            </m:r>
+                          </m:e>
+                        </m:acc>
+                      </m:oMath>
+                    </m:oMathPara>
+                  </a14:m>
+                  <a:endParaRPr lang="en-US" sz="2000" dirty="0" smtClean="0">
+                    <a:latin typeface="Arial" panose="020B0604020202020204" pitchFamily="34" charset="0"/>
+                    <a:cs typeface="Arial" panose="020B0604020202020204" pitchFamily="34" charset="0"/>
+                  </a:endParaRPr>
+                </a:p>
+              </p:txBody>
+            </p:sp>
+          </mc:Choice>
+          <mc:Fallback>
+            <p:sp>
+              <p:nvSpPr>
+                <p:cNvPr id="8" name="TextBox 7"/>
+                <p:cNvSpPr txBox="1">
+                  <a:spLocks noRot="1" noChangeAspect="1" noMove="1" noResize="1" noEditPoints="1" noAdjustHandles="1" noChangeArrowheads="1" noChangeShapeType="1" noTextEdit="1"/>
+                </p:cNvSpPr>
+                <p:nvPr/>
+              </p:nvSpPr>
+              <p:spPr>
+                <a:xfrm>
+                  <a:off x="2317727" y="2414501"/>
+                  <a:ext cx="237629" cy="345159"/>
+                </a:xfrm>
+                <a:prstGeom prst="rect">
+                  <a:avLst/>
+                </a:prstGeom>
+                <a:blipFill>
+                  <a:blip r:embed="rId2"/>
+                  <a:stretch>
+                    <a:fillRect l="-20513" t="-33333" r="-92308" b="-8772"/>
+                  </a:stretch>
+                </a:blipFill>
+              </p:spPr>
+              <p:txBody>
+                <a:bodyPr/>
+                <a:lstStyle/>
+                <a:p>
+                  <a:r>
+                    <a:rPr lang="en-US">
+                      <a:noFill/>
+                    </a:rPr>
+                    <a:t> </a:t>
+                  </a:r>
+                </a:p>
+              </p:txBody>
+            </p:sp>
+          </mc:Fallback>
+        </mc:AlternateContent>
+      </p:grpSp>
+      <p:grpSp>
+        <p:nvGrpSpPr>
+          <p:cNvPr id="35" name="Group 34"/>
+          <p:cNvGrpSpPr/>
+          <p:nvPr/>
+        </p:nvGrpSpPr>
+        <p:grpSpPr>
+          <a:xfrm>
+            <a:off x="4521593" y="1721217"/>
+            <a:ext cx="2020456" cy="2331060"/>
+            <a:chOff x="4521593" y="1721217"/>
+            <a:chExt cx="2020456" cy="2331060"/>
+          </a:xfrm>
+        </p:grpSpPr>
+        <p:grpSp>
+          <p:nvGrpSpPr>
+            <p:cNvPr id="25" name="Group 24"/>
+            <p:cNvGrpSpPr/>
+            <p:nvPr/>
+          </p:nvGrpSpPr>
+          <p:grpSpPr>
+            <a:xfrm>
+              <a:off x="4885274" y="1721217"/>
+              <a:ext cx="1656775" cy="2153565"/>
+              <a:chOff x="4885274" y="1721217"/>
+              <a:chExt cx="1656775" cy="2153565"/>
+            </a:xfrm>
+          </p:grpSpPr>
+          <p:sp>
+            <p:nvSpPr>
+              <p:cNvPr id="9" name="Oval 8"/>
+              <p:cNvSpPr/>
+              <p:nvPr/>
+            </p:nvSpPr>
+            <p:spPr>
+              <a:xfrm>
+                <a:off x="5664861" y="2772009"/>
+                <a:ext cx="120943" cy="119766"/>
+              </a:xfrm>
+              <a:prstGeom prst="ellipse">
+                <a:avLst/>
+              </a:prstGeom>
+              <a:solidFill>
+                <a:schemeClr val="tx1"/>
+              </a:solidFill>
+              <a:ln w="38100">
+                <a:solidFill>
+                  <a:schemeClr val="tx1"/>
+                </a:solidFill>
+              </a:ln>
+            </p:spPr>
+            <p:style>
+              <a:lnRef idx="2">
+                <a:schemeClr val="accent1">
+                  <a:shade val="50000"/>
+                </a:schemeClr>
+              </a:lnRef>
+              <a:fillRef idx="1">
+                <a:schemeClr val="accent1"/>
+              </a:fillRef>
+              <a:effectRef idx="0">
+                <a:schemeClr val="accent1"/>
+              </a:effectRef>
+              <a:fontRef idx="minor">
+                <a:schemeClr val="lt1"/>
+              </a:fontRef>
+            </p:style>
+            <p:txBody>
+              <a:bodyPr rtlCol="0" anchor="ctr"/>
+              <a:lstStyle/>
+              <a:p>
+                <a:pPr algn="ctr"/>
+                <a:endParaRPr lang="en-US"/>
+              </a:p>
+            </p:txBody>
+          </p:sp>
+          <p:cxnSp>
+            <p:nvCxnSpPr>
+              <p:cNvPr id="10" name="Straight Arrow Connector 9"/>
+              <p:cNvCxnSpPr/>
+              <p:nvPr/>
+            </p:nvCxnSpPr>
+            <p:spPr>
+              <a:xfrm>
+                <a:off x="5794917" y="2830181"/>
+                <a:ext cx="747132" cy="0"/>
+              </a:xfrm>
+              <a:prstGeom prst="straightConnector1">
+                <a:avLst/>
+              </a:prstGeom>
+              <a:ln w="38100">
+                <a:solidFill>
+                  <a:schemeClr val="tx1"/>
+                </a:solidFill>
+                <a:tailEnd type="triangle"/>
+              </a:ln>
+            </p:spPr>
+            <p:style>
+              <a:lnRef idx="1">
+                <a:schemeClr val="accent1"/>
+              </a:lnRef>
+              <a:fillRef idx="0">
+                <a:schemeClr val="accent1"/>
+              </a:fillRef>
+              <a:effectRef idx="0">
+                <a:schemeClr val="accent1"/>
+              </a:effectRef>
+              <a:fontRef idx="minor">
+                <a:schemeClr val="tx1"/>
+              </a:fontRef>
+            </p:style>
+          </p:cxnSp>
+          <mc:AlternateContent xmlns:mc="http://schemas.openxmlformats.org/markup-compatibility/2006">
+            <mc:Choice xmlns:a14="http://schemas.microsoft.com/office/drawing/2010/main" Requires="a14">
+              <p:sp>
+                <p:nvSpPr>
+                  <p:cNvPr id="11" name="TextBox 10"/>
+                  <p:cNvSpPr txBox="1"/>
+                  <p:nvPr/>
+                </p:nvSpPr>
+                <p:spPr>
+                  <a:xfrm>
+                    <a:off x="6202242" y="2503710"/>
+                    <a:ext cx="237629" cy="345159"/>
+                  </a:xfrm>
+                  <a:prstGeom prst="rect">
+                    <a:avLst/>
+                  </a:prstGeom>
+                  <a:noFill/>
+                </p:spPr>
+                <p:txBody>
+                  <a:bodyPr wrap="none" lIns="0" tIns="0" rIns="0" bIns="0" rtlCol="0">
+                    <a:spAutoFit/>
+                  </a:bodyPr>
+                  <a:lstStyle/>
+                  <a:p>
+                    <a14:m>
+                      <m:oMathPara xmlns:m="http://schemas.openxmlformats.org/officeDocument/2006/math">
+                        <m:oMathParaPr>
+                          <m:jc m:val="centerGroup"/>
+                        </m:oMathParaPr>
+                        <m:oMath xmlns:m="http://schemas.openxmlformats.org/officeDocument/2006/math">
+                          <m:acc>
+                            <m:accPr>
+                              <m:chr m:val="⃗"/>
+                              <m:ctrlPr>
+                                <a:rPr lang="en-US" sz="2000" b="0" i="1" smtClean="0">
+                                  <a:latin typeface="Cambria Math" panose="02040503050406030204" pitchFamily="18" charset="0"/>
+                                  <a:cs typeface="Arial" panose="020B0604020202020204" pitchFamily="34" charset="0"/>
+                                </a:rPr>
+                              </m:ctrlPr>
+                            </m:accPr>
+                            <m:e>
+                              <m:r>
+                                <a:rPr lang="en-US" sz="2000" b="0" i="1" smtClean="0">
+                                  <a:latin typeface="Cambria Math" panose="02040503050406030204" pitchFamily="18" charset="0"/>
+                                  <a:cs typeface="Arial" panose="020B0604020202020204" pitchFamily="34" charset="0"/>
+                                </a:rPr>
+                                <m:t>𝐹</m:t>
+                              </m:r>
+                            </m:e>
+                          </m:acc>
+                        </m:oMath>
+                      </m:oMathPara>
+                    </a14:m>
+                    <a:endParaRPr lang="en-US" sz="2000" dirty="0" smtClean="0">
+                      <a:latin typeface="Arial" panose="020B0604020202020204" pitchFamily="34" charset="0"/>
+                      <a:cs typeface="Arial" panose="020B0604020202020204" pitchFamily="34" charset="0"/>
+                    </a:endParaRPr>
+                  </a:p>
+                </p:txBody>
+              </p:sp>
+            </mc:Choice>
+            <mc:Fallback>
+              <p:sp>
+                <p:nvSpPr>
+                  <p:cNvPr id="11" name="TextBox 10"/>
+                  <p:cNvSpPr txBox="1">
+                    <a:spLocks noRot="1" noChangeAspect="1" noMove="1" noResize="1" noEditPoints="1" noAdjustHandles="1" noChangeArrowheads="1" noChangeShapeType="1" noTextEdit="1"/>
+                  </p:cNvSpPr>
+                  <p:nvPr/>
+                </p:nvSpPr>
+                <p:spPr>
+                  <a:xfrm>
+                    <a:off x="6202242" y="2503710"/>
+                    <a:ext cx="237629" cy="345159"/>
+                  </a:xfrm>
+                  <a:prstGeom prst="rect">
+                    <a:avLst/>
+                  </a:prstGeom>
+                  <a:blipFill>
+                    <a:blip r:embed="rId3"/>
+                    <a:stretch>
+                      <a:fillRect l="-20513" t="-35714" r="-92308" b="-8929"/>
+                    </a:stretch>
+                  </a:blipFill>
+                </p:spPr>
+                <p:txBody>
+                  <a:bodyPr/>
+                  <a:lstStyle/>
+                  <a:p>
+                    <a:r>
+                      <a:rPr lang="en-US">
+                        <a:noFill/>
+                      </a:rPr>
+                      <a:t> </a:t>
+                    </a:r>
+                  </a:p>
+                </p:txBody>
+              </p:sp>
+            </mc:Fallback>
+          </mc:AlternateContent>
+          <p:cxnSp>
+            <p:nvCxnSpPr>
+              <p:cNvPr id="12" name="Straight Arrow Connector 11"/>
+              <p:cNvCxnSpPr/>
+              <p:nvPr/>
+            </p:nvCxnSpPr>
+            <p:spPr>
+              <a:xfrm flipH="1">
+                <a:off x="4885274" y="2841332"/>
+                <a:ext cx="817756" cy="5946"/>
+              </a:xfrm>
+              <a:prstGeom prst="straightConnector1">
+                <a:avLst/>
+              </a:prstGeom>
+              <a:ln w="38100">
+                <a:solidFill>
+                  <a:schemeClr val="tx1"/>
+                </a:solidFill>
+                <a:tailEnd type="triangle"/>
+              </a:ln>
+            </p:spPr>
+            <p:style>
+              <a:lnRef idx="1">
+                <a:schemeClr val="accent1"/>
+              </a:lnRef>
+              <a:fillRef idx="0">
+                <a:schemeClr val="accent1"/>
+              </a:fillRef>
+              <a:effectRef idx="0">
+                <a:schemeClr val="accent1"/>
+              </a:effectRef>
+              <a:fontRef idx="minor">
+                <a:schemeClr val="tx1"/>
+              </a:fontRef>
+            </p:style>
+          </p:cxnSp>
+          <p:cxnSp>
+            <p:nvCxnSpPr>
+              <p:cNvPr id="14" name="Straight Arrow Connector 13"/>
+              <p:cNvCxnSpPr/>
+              <p:nvPr/>
+            </p:nvCxnSpPr>
+            <p:spPr>
+              <a:xfrm flipH="1">
+                <a:off x="5714181" y="2891775"/>
+                <a:ext cx="16908" cy="983007"/>
+              </a:xfrm>
+              <a:prstGeom prst="straightConnector1">
+                <a:avLst/>
+              </a:prstGeom>
+              <a:ln w="38100">
+                <a:solidFill>
+                  <a:schemeClr val="tx1"/>
+                </a:solidFill>
+                <a:tailEnd type="triangle"/>
+              </a:ln>
+            </p:spPr>
+            <p:style>
+              <a:lnRef idx="1">
+                <a:schemeClr val="accent1"/>
+              </a:lnRef>
+              <a:fillRef idx="0">
+                <a:schemeClr val="accent1"/>
+              </a:fillRef>
+              <a:effectRef idx="0">
+                <a:schemeClr val="accent1"/>
+              </a:effectRef>
+              <a:fontRef idx="minor">
+                <a:schemeClr val="tx1"/>
+              </a:fontRef>
+            </p:style>
+          </p:cxnSp>
+          <p:cxnSp>
+            <p:nvCxnSpPr>
+              <p:cNvPr id="19" name="Straight Arrow Connector 18"/>
+              <p:cNvCxnSpPr/>
+              <p:nvPr/>
+            </p:nvCxnSpPr>
+            <p:spPr>
+              <a:xfrm flipV="1">
+                <a:off x="5730050" y="1796727"/>
+                <a:ext cx="12190" cy="983007"/>
+              </a:xfrm>
+              <a:prstGeom prst="straightConnector1">
+                <a:avLst/>
+              </a:prstGeom>
+              <a:ln w="38100">
+                <a:solidFill>
+                  <a:schemeClr val="tx1"/>
+                </a:solidFill>
+                <a:tailEnd type="triangle"/>
+              </a:ln>
+            </p:spPr>
+            <p:style>
+              <a:lnRef idx="1">
+                <a:schemeClr val="accent1"/>
+              </a:lnRef>
+              <a:fillRef idx="0">
+                <a:schemeClr val="accent1"/>
+              </a:fillRef>
+              <a:effectRef idx="0">
+                <a:schemeClr val="accent1"/>
+              </a:effectRef>
+              <a:fontRef idx="minor">
+                <a:schemeClr val="tx1"/>
+              </a:fontRef>
+            </p:style>
+          </p:cxnSp>
+          <mc:AlternateContent xmlns:mc="http://schemas.openxmlformats.org/markup-compatibility/2006">
+            <mc:Choice xmlns:a14="http://schemas.microsoft.com/office/drawing/2010/main" Requires="a14">
+              <p:sp>
+                <p:nvSpPr>
+                  <p:cNvPr id="22" name="TextBox 21"/>
+                  <p:cNvSpPr txBox="1"/>
+                  <p:nvPr/>
+                </p:nvSpPr>
+                <p:spPr>
+                  <a:xfrm>
+                    <a:off x="4970988" y="2485022"/>
+                    <a:ext cx="264367" cy="345159"/>
+                  </a:xfrm>
+                  <a:prstGeom prst="rect">
+                    <a:avLst/>
+                  </a:prstGeom>
+                  <a:noFill/>
+                </p:spPr>
+                <p:txBody>
+                  <a:bodyPr wrap="none" lIns="0" tIns="0" rIns="0" bIns="0" rtlCol="0">
+                    <a:spAutoFit/>
+                  </a:bodyPr>
+                  <a:lstStyle/>
+                  <a:p>
+                    <a14:m>
+                      <m:oMathPara xmlns:m="http://schemas.openxmlformats.org/officeDocument/2006/math">
+                        <m:oMathParaPr>
+                          <m:jc m:val="centerGroup"/>
+                        </m:oMathParaPr>
+                        <m:oMath xmlns:m="http://schemas.openxmlformats.org/officeDocument/2006/math">
+                          <m:acc>
+                            <m:accPr>
+                              <m:chr m:val="⃗"/>
+                              <m:ctrlPr>
+                                <a:rPr lang="en-US" sz="2000" b="0" i="1" smtClean="0">
+                                  <a:latin typeface="Cambria Math" panose="02040503050406030204" pitchFamily="18" charset="0"/>
+                                  <a:cs typeface="Arial" panose="020B0604020202020204" pitchFamily="34" charset="0"/>
+                                </a:rPr>
+                              </m:ctrlPr>
+                            </m:accPr>
+                            <m:e>
+                              <m:r>
+                                <a:rPr lang="en-US" sz="2000" b="0" i="1" smtClean="0">
+                                  <a:latin typeface="Cambria Math" panose="02040503050406030204" pitchFamily="18" charset="0"/>
+                                  <a:cs typeface="Arial" panose="020B0604020202020204" pitchFamily="34" charset="0"/>
+                                </a:rPr>
+                                <m:t>𝑁</m:t>
+                              </m:r>
+                            </m:e>
+                          </m:acc>
+                        </m:oMath>
+                      </m:oMathPara>
+                    </a14:m>
+                    <a:endParaRPr lang="en-US" sz="2000" dirty="0" smtClean="0">
+                      <a:latin typeface="Arial" panose="020B0604020202020204" pitchFamily="34" charset="0"/>
+                      <a:cs typeface="Arial" panose="020B0604020202020204" pitchFamily="34" charset="0"/>
+                    </a:endParaRPr>
+                  </a:p>
+                </p:txBody>
+              </p:sp>
+            </mc:Choice>
+            <mc:Fallback>
+              <p:sp>
+                <p:nvSpPr>
+                  <p:cNvPr id="22" name="TextBox 21"/>
+                  <p:cNvSpPr txBox="1">
+                    <a:spLocks noRot="1" noChangeAspect="1" noMove="1" noResize="1" noEditPoints="1" noAdjustHandles="1" noChangeArrowheads="1" noChangeShapeType="1" noTextEdit="1"/>
+                  </p:cNvSpPr>
+                  <p:nvPr/>
+                </p:nvSpPr>
+                <p:spPr>
+                  <a:xfrm>
+                    <a:off x="4970988" y="2485022"/>
+                    <a:ext cx="264367" cy="345159"/>
+                  </a:xfrm>
+                  <a:prstGeom prst="rect">
+                    <a:avLst/>
+                  </a:prstGeom>
+                  <a:blipFill>
+                    <a:blip r:embed="rId4"/>
+                    <a:stretch>
+                      <a:fillRect l="-18182" r="-18182" b="-8929"/>
+                    </a:stretch>
+                  </a:blipFill>
+                </p:spPr>
+                <p:txBody>
+                  <a:bodyPr/>
+                  <a:lstStyle/>
+                  <a:p>
+                    <a:r>
+                      <a:rPr lang="en-US">
+                        <a:noFill/>
+                      </a:rPr>
+                      <a:t> </a:t>
+                    </a:r>
+                  </a:p>
+                </p:txBody>
+              </p:sp>
+            </mc:Fallback>
+          </mc:AlternateContent>
+          <mc:AlternateContent xmlns:mc="http://schemas.openxmlformats.org/markup-compatibility/2006">
+            <mc:Choice xmlns:a14="http://schemas.microsoft.com/office/drawing/2010/main" Requires="a14">
+              <p:sp>
+                <p:nvSpPr>
+                  <p:cNvPr id="23" name="TextBox 22"/>
+                  <p:cNvSpPr txBox="1"/>
+                  <p:nvPr/>
+                </p:nvSpPr>
+                <p:spPr>
+                  <a:xfrm>
+                    <a:off x="5385656" y="3383278"/>
+                    <a:ext cx="303865" cy="377219"/>
+                  </a:xfrm>
+                  <a:prstGeom prst="rect">
+                    <a:avLst/>
+                  </a:prstGeom>
+                  <a:noFill/>
+                </p:spPr>
+                <p:txBody>
+                  <a:bodyPr wrap="none" lIns="0" tIns="0" rIns="0" bIns="0" rtlCol="0">
+                    <a:spAutoFit/>
+                  </a:bodyPr>
+                  <a:lstStyle/>
+                  <a:p>
+                    <a14:m>
+                      <m:oMathPara xmlns:m="http://schemas.openxmlformats.org/officeDocument/2006/math">
+                        <m:oMathParaPr>
+                          <m:jc m:val="centerGroup"/>
+                        </m:oMathParaPr>
+                        <m:oMath xmlns:m="http://schemas.openxmlformats.org/officeDocument/2006/math">
+                          <m:sSub>
+                            <m:sSubPr>
+                              <m:ctrlPr>
+                                <a:rPr lang="en-US" sz="2000" b="0" i="1" smtClean="0">
+                                  <a:latin typeface="Cambria Math" panose="02040503050406030204" pitchFamily="18" charset="0"/>
+                                  <a:cs typeface="Arial" panose="020B0604020202020204" pitchFamily="34" charset="0"/>
+                                </a:rPr>
+                              </m:ctrlPr>
+                            </m:sSubPr>
+                            <m:e>
+                              <m:acc>
+                                <m:accPr>
+                                  <m:chr m:val="⃗"/>
+                                  <m:ctrlPr>
+                                    <a:rPr lang="en-US" sz="2000" b="0" i="1" smtClean="0">
+                                      <a:latin typeface="Cambria Math" panose="02040503050406030204" pitchFamily="18" charset="0"/>
+                                      <a:cs typeface="Arial" panose="020B0604020202020204" pitchFamily="34" charset="0"/>
+                                    </a:rPr>
+                                  </m:ctrlPr>
+                                </m:accPr>
+                                <m:e>
+                                  <m:r>
+                                    <a:rPr lang="en-US" sz="2000" b="0" i="1" smtClean="0">
+                                      <a:latin typeface="Cambria Math" panose="02040503050406030204" pitchFamily="18" charset="0"/>
+                                      <a:cs typeface="Arial" panose="020B0604020202020204" pitchFamily="34" charset="0"/>
+                                    </a:rPr>
+                                    <m:t>𝐹</m:t>
+                                  </m:r>
+                                </m:e>
+                              </m:acc>
+                            </m:e>
+                            <m:sub>
+                              <m:r>
+                                <a:rPr lang="en-US" sz="2000" b="0" i="1" smtClean="0">
+                                  <a:latin typeface="Cambria Math" panose="02040503050406030204" pitchFamily="18" charset="0"/>
+                                  <a:cs typeface="Arial" panose="020B0604020202020204" pitchFamily="34" charset="0"/>
+                                </a:rPr>
+                                <m:t>𝑔</m:t>
+                              </m:r>
+                            </m:sub>
+                          </m:sSub>
+                        </m:oMath>
+                      </m:oMathPara>
+                    </a14:m>
+                    <a:endParaRPr lang="en-US" sz="2000" dirty="0" smtClean="0">
+                      <a:latin typeface="Arial" panose="020B0604020202020204" pitchFamily="34" charset="0"/>
+                      <a:cs typeface="Arial" panose="020B0604020202020204" pitchFamily="34" charset="0"/>
+                    </a:endParaRPr>
+                  </a:p>
+                </p:txBody>
+              </p:sp>
+            </mc:Choice>
+            <mc:Fallback>
+              <p:sp>
+                <p:nvSpPr>
+                  <p:cNvPr id="23" name="TextBox 22"/>
+                  <p:cNvSpPr txBox="1">
+                    <a:spLocks noRot="1" noChangeAspect="1" noMove="1" noResize="1" noEditPoints="1" noAdjustHandles="1" noChangeArrowheads="1" noChangeShapeType="1" noTextEdit="1"/>
+                  </p:cNvSpPr>
+                  <p:nvPr/>
+                </p:nvSpPr>
+                <p:spPr>
+                  <a:xfrm>
+                    <a:off x="5385656" y="3383278"/>
+                    <a:ext cx="303865" cy="377219"/>
+                  </a:xfrm>
+                  <a:prstGeom prst="rect">
+                    <a:avLst/>
+                  </a:prstGeom>
+                  <a:blipFill>
+                    <a:blip r:embed="rId5"/>
+                    <a:stretch>
+                      <a:fillRect l="-16000" t="-30645" r="-72000" b="-17742"/>
+                    </a:stretch>
+                  </a:blipFill>
+                </p:spPr>
+                <p:txBody>
+                  <a:bodyPr/>
+                  <a:lstStyle/>
+                  <a:p>
+                    <a:r>
+                      <a:rPr lang="en-US">
+                        <a:noFill/>
+                      </a:rPr>
+                      <a:t> </a:t>
+                    </a:r>
+                  </a:p>
+                </p:txBody>
+              </p:sp>
+            </mc:Fallback>
+          </mc:AlternateContent>
+          <mc:AlternateContent xmlns:mc="http://schemas.openxmlformats.org/markup-compatibility/2006">
+            <mc:Choice xmlns:a14="http://schemas.microsoft.com/office/drawing/2010/main" Requires="a14">
+              <p:sp>
+                <p:nvSpPr>
+                  <p:cNvPr id="24" name="TextBox 23"/>
+                  <p:cNvSpPr txBox="1"/>
+                  <p:nvPr/>
+                </p:nvSpPr>
+                <p:spPr>
+                  <a:xfrm>
+                    <a:off x="5812530" y="1721217"/>
+                    <a:ext cx="267381" cy="354071"/>
+                  </a:xfrm>
+                  <a:prstGeom prst="rect">
+                    <a:avLst/>
+                  </a:prstGeom>
+                  <a:noFill/>
+                </p:spPr>
+                <p:txBody>
+                  <a:bodyPr wrap="none" lIns="0" tIns="0" rIns="0" bIns="0" rtlCol="0">
+                    <a:spAutoFit/>
+                  </a:bodyPr>
+                  <a:lstStyle/>
+                  <a:p>
+                    <a14:m>
+                      <m:oMathPara xmlns:m="http://schemas.openxmlformats.org/officeDocument/2006/math">
+                        <m:oMathParaPr>
+                          <m:jc m:val="centerGroup"/>
+                        </m:oMathParaPr>
+                        <m:oMath xmlns:m="http://schemas.openxmlformats.org/officeDocument/2006/math">
+                          <m:sSub>
+                            <m:sSubPr>
+                              <m:ctrlPr>
+                                <a:rPr lang="en-US" sz="2000" b="0" i="1" smtClean="0">
+                                  <a:latin typeface="Cambria Math" panose="02040503050406030204" pitchFamily="18" charset="0"/>
+                                  <a:cs typeface="Arial" panose="020B0604020202020204" pitchFamily="34" charset="0"/>
+                                </a:rPr>
+                              </m:ctrlPr>
+                            </m:sSubPr>
+                            <m:e>
+                              <m:acc>
+                                <m:accPr>
+                                  <m:chr m:val="⃗"/>
+                                  <m:ctrlPr>
+                                    <a:rPr lang="en-US" sz="2000" b="0" i="1" smtClean="0">
+                                      <a:latin typeface="Cambria Math" panose="02040503050406030204" pitchFamily="18" charset="0"/>
+                                      <a:cs typeface="Arial" panose="020B0604020202020204" pitchFamily="34" charset="0"/>
+                                    </a:rPr>
+                                  </m:ctrlPr>
+                                </m:accPr>
+                                <m:e>
+                                  <m:r>
+                                    <a:rPr lang="en-US" sz="2000" b="0" i="1" smtClean="0">
+                                      <a:latin typeface="Cambria Math" panose="02040503050406030204" pitchFamily="18" charset="0"/>
+                                      <a:cs typeface="Arial" panose="020B0604020202020204" pitchFamily="34" charset="0"/>
+                                    </a:rPr>
+                                    <m:t>𝑓</m:t>
+                                  </m:r>
+                                </m:e>
+                              </m:acc>
+                            </m:e>
+                            <m:sub>
+                              <m:r>
+                                <a:rPr lang="en-US" sz="2000" b="0" i="1" smtClean="0">
+                                  <a:latin typeface="Cambria Math" panose="02040503050406030204" pitchFamily="18" charset="0"/>
+                                  <a:cs typeface="Arial" panose="020B0604020202020204" pitchFamily="34" charset="0"/>
+                                </a:rPr>
+                                <m:t>𝑠</m:t>
+                              </m:r>
+                            </m:sub>
+                          </m:sSub>
+                        </m:oMath>
+                      </m:oMathPara>
+                    </a14:m>
+                    <a:endParaRPr lang="en-US" sz="2000" dirty="0" smtClean="0">
+                      <a:latin typeface="Arial" panose="020B0604020202020204" pitchFamily="34" charset="0"/>
+                      <a:cs typeface="Arial" panose="020B0604020202020204" pitchFamily="34" charset="0"/>
+                    </a:endParaRPr>
+                  </a:p>
+                </p:txBody>
+              </p:sp>
+            </mc:Choice>
+            <mc:Fallback>
+              <p:sp>
+                <p:nvSpPr>
+                  <p:cNvPr id="24" name="TextBox 23"/>
+                  <p:cNvSpPr txBox="1">
+                    <a:spLocks noRot="1" noChangeAspect="1" noMove="1" noResize="1" noEditPoints="1" noAdjustHandles="1" noChangeArrowheads="1" noChangeShapeType="1" noTextEdit="1"/>
+                  </p:cNvSpPr>
+                  <p:nvPr/>
+                </p:nvSpPr>
+                <p:spPr>
+                  <a:xfrm>
+                    <a:off x="5812530" y="1721217"/>
+                    <a:ext cx="267381" cy="354071"/>
+                  </a:xfrm>
+                  <a:prstGeom prst="rect">
+                    <a:avLst/>
+                  </a:prstGeom>
+                  <a:blipFill>
+                    <a:blip r:embed="rId6"/>
+                    <a:stretch>
+                      <a:fillRect l="-29545" t="-32759" r="-84091" b="-32759"/>
+                    </a:stretch>
+                  </a:blipFill>
+                </p:spPr>
+                <p:txBody>
+                  <a:bodyPr/>
+                  <a:lstStyle/>
+                  <a:p>
+                    <a:r>
+                      <a:rPr lang="en-US">
+                        <a:noFill/>
+                      </a:rPr>
+                      <a:t> </a:t>
+                    </a:r>
+                  </a:p>
+                </p:txBody>
+              </p:sp>
+            </mc:Fallback>
+          </mc:AlternateContent>
+        </p:grpSp>
+        <p:grpSp>
+          <p:nvGrpSpPr>
+            <p:cNvPr id="27" name="Group 26"/>
+            <p:cNvGrpSpPr/>
+            <p:nvPr/>
+          </p:nvGrpSpPr>
+          <p:grpSpPr>
+            <a:xfrm>
+              <a:off x="4521593" y="3342282"/>
+              <a:ext cx="898789" cy="709995"/>
+              <a:chOff x="758520" y="708040"/>
+              <a:chExt cx="2596102" cy="2135605"/>
+            </a:xfrm>
+          </p:grpSpPr>
+          <p:grpSp>
+            <p:nvGrpSpPr>
+              <p:cNvPr id="28" name="Group 27"/>
+              <p:cNvGrpSpPr/>
+              <p:nvPr/>
+            </p:nvGrpSpPr>
+            <p:grpSpPr>
+              <a:xfrm>
+                <a:off x="758520" y="708040"/>
+                <a:ext cx="2596102" cy="2135605"/>
+                <a:chOff x="785815" y="680744"/>
+                <a:chExt cx="2596102" cy="2135605"/>
+              </a:xfrm>
+            </p:grpSpPr>
+            <p:cxnSp>
+              <p:nvCxnSpPr>
+                <p:cNvPr id="30" name="Straight Arrow Connector 29"/>
+                <p:cNvCxnSpPr/>
+                <p:nvPr/>
+              </p:nvCxnSpPr>
+              <p:spPr>
+                <a:xfrm flipV="1">
+                  <a:off x="1516583" y="680744"/>
+                  <a:ext cx="7683" cy="1859535"/>
+                </a:xfrm>
+                <a:prstGeom prst="straightConnector1">
+                  <a:avLst/>
+                </a:prstGeom>
+                <a:ln w="38100">
+                  <a:solidFill>
+                    <a:schemeClr val="tx1"/>
+                  </a:solidFill>
+                  <a:tailEnd type="triangle"/>
+                </a:ln>
+              </p:spPr>
+              <p:style>
+                <a:lnRef idx="1">
+                  <a:schemeClr val="accent1"/>
+                </a:lnRef>
+                <a:fillRef idx="0">
+                  <a:schemeClr val="accent1"/>
+                </a:fillRef>
+                <a:effectRef idx="0">
+                  <a:schemeClr val="accent1"/>
+                </a:effectRef>
+                <a:fontRef idx="minor">
+                  <a:schemeClr val="tx1"/>
+                </a:fontRef>
+              </p:style>
+            </p:cxnSp>
+            <p:cxnSp>
+              <p:nvCxnSpPr>
+                <p:cNvPr id="31" name="Straight Arrow Connector 30"/>
+                <p:cNvCxnSpPr/>
+                <p:nvPr/>
+              </p:nvCxnSpPr>
+              <p:spPr>
+                <a:xfrm flipV="1">
+                  <a:off x="1507013" y="2535259"/>
+                  <a:ext cx="1874904" cy="1"/>
+                </a:xfrm>
+                <a:prstGeom prst="straightConnector1">
+                  <a:avLst/>
+                </a:prstGeom>
+                <a:ln w="38100">
+                  <a:solidFill>
+                    <a:schemeClr val="tx1"/>
+                  </a:solidFill>
+                  <a:tailEnd type="triangle"/>
+                </a:ln>
+              </p:spPr>
+              <p:style>
+                <a:lnRef idx="1">
+                  <a:schemeClr val="accent1"/>
+                </a:lnRef>
+                <a:fillRef idx="0">
+                  <a:schemeClr val="accent1"/>
+                </a:fillRef>
+                <a:effectRef idx="0">
+                  <a:schemeClr val="accent1"/>
+                </a:effectRef>
+                <a:fontRef idx="minor">
+                  <a:schemeClr val="tx1"/>
+                </a:fontRef>
+              </p:style>
+            </p:cxnSp>
+            <mc:AlternateContent xmlns:mc="http://schemas.openxmlformats.org/markup-compatibility/2006" xmlns:a14="http://schemas.microsoft.com/office/drawing/2010/main">
+              <mc:Choice Requires="a14">
+                <p:sp>
+                  <p:nvSpPr>
+                    <p:cNvPr id="32" name="Rectangle 31"/>
+                    <p:cNvSpPr/>
+                    <p:nvPr/>
+                  </p:nvSpPr>
+                  <p:spPr>
+                    <a:xfrm>
+                      <a:off x="2697555" y="2447016"/>
+                      <a:ext cx="367985" cy="369333"/>
+                    </a:xfrm>
+                    <a:prstGeom prst="rect">
+                      <a:avLst/>
+                    </a:prstGeom>
+                  </p:spPr>
+                  <p:txBody>
+                    <a:bodyPr wrap="none">
+                      <a:spAutoFit/>
+                    </a:bodyPr>
+                    <a:lstStyle/>
+                    <a:p>
+                      <a:pPr/>
+                      <a14:m>
+                        <m:oMathPara xmlns:m="http://schemas.openxmlformats.org/officeDocument/2006/math">
+                          <m:oMathParaPr>
+                            <m:jc m:val="centerGroup"/>
+                          </m:oMathParaPr>
+                          <m:oMath xmlns:m="http://schemas.openxmlformats.org/officeDocument/2006/math">
+                            <m:r>
+                              <a:rPr lang="en-US" i="1">
+                                <a:latin typeface="Cambria Math" panose="02040503050406030204" pitchFamily="18" charset="0"/>
+                                <a:cs typeface="Arial" panose="020B0604020202020204" pitchFamily="34" charset="0"/>
+                              </a:rPr>
+                              <m:t>𝑥</m:t>
+                            </m:r>
+                          </m:oMath>
+                        </m:oMathPara>
+                      </a14:m>
+                      <a:endParaRPr lang="en-CA" dirty="0"/>
+                    </a:p>
+                  </p:txBody>
+                </p:sp>
+              </mc:Choice>
+              <mc:Fallback xmlns="">
+                <p:sp>
+                  <p:nvSpPr>
+                    <p:cNvPr id="107" name="Rectangle 106"/>
+                    <p:cNvSpPr>
+                      <a:spLocks noRot="1" noChangeAspect="1" noMove="1" noResize="1" noEditPoints="1" noAdjustHandles="1" noChangeArrowheads="1" noChangeShapeType="1" noTextEdit="1"/>
+                    </p:cNvSpPr>
+                    <p:nvPr/>
+                  </p:nvSpPr>
+                  <p:spPr>
+                    <a:xfrm>
+                      <a:off x="2697555" y="2447016"/>
+                      <a:ext cx="367985" cy="369333"/>
+                    </a:xfrm>
+                    <a:prstGeom prst="rect">
+                      <a:avLst/>
+                    </a:prstGeom>
+                    <a:blipFill>
+                      <a:blip r:embed="rId27"/>
+                      <a:stretch>
+                        <a:fillRect r="-95238" b="-160000"/>
+                      </a:stretch>
+                    </a:blipFill>
+                  </p:spPr>
+                  <p:txBody>
+                    <a:bodyPr/>
+                    <a:lstStyle/>
+                    <a:p>
+                      <a:r>
+                        <a:rPr lang="en-US">
+                          <a:noFill/>
+                        </a:rPr>
+                        <a:t> </a:t>
+                      </a:r>
+                    </a:p>
+                  </p:txBody>
+                </p:sp>
+              </mc:Fallback>
+            </mc:AlternateContent>
+            <mc:AlternateContent xmlns:mc="http://schemas.openxmlformats.org/markup-compatibility/2006" xmlns:a14="http://schemas.microsoft.com/office/drawing/2010/main">
+              <mc:Choice Requires="a14">
+                <p:sp>
+                  <p:nvSpPr>
+                    <p:cNvPr id="33" name="Rectangle 32"/>
+                    <p:cNvSpPr/>
+                    <p:nvPr/>
+                  </p:nvSpPr>
+                  <p:spPr>
+                    <a:xfrm>
+                      <a:off x="785815" y="912420"/>
+                      <a:ext cx="371385" cy="369333"/>
+                    </a:xfrm>
+                    <a:prstGeom prst="rect">
+                      <a:avLst/>
+                    </a:prstGeom>
+                  </p:spPr>
+                  <p:txBody>
+                    <a:bodyPr wrap="none">
+                      <a:spAutoFit/>
+                    </a:bodyPr>
+                    <a:lstStyle/>
+                    <a:p>
+                      <a:pPr/>
+                      <a14:m>
+                        <m:oMathPara xmlns:m="http://schemas.openxmlformats.org/officeDocument/2006/math">
+                          <m:oMathParaPr>
+                            <m:jc m:val="centerGroup"/>
+                          </m:oMathParaPr>
+                          <m:oMath xmlns:m="http://schemas.openxmlformats.org/officeDocument/2006/math">
+                            <m:r>
+                              <a:rPr lang="en-US" b="0" i="1" smtClean="0">
+                                <a:latin typeface="Cambria Math" panose="02040503050406030204" pitchFamily="18" charset="0"/>
+                              </a:rPr>
+                              <m:t>𝑦</m:t>
+                            </m:r>
+                          </m:oMath>
+                        </m:oMathPara>
+                      </a14:m>
+                      <a:endParaRPr lang="en-CA" dirty="0"/>
+                    </a:p>
+                  </p:txBody>
+                </p:sp>
+              </mc:Choice>
+              <mc:Fallback xmlns="">
+                <p:sp>
+                  <p:nvSpPr>
+                    <p:cNvPr id="108" name="Rectangle 107"/>
+                    <p:cNvSpPr>
+                      <a:spLocks noRot="1" noChangeAspect="1" noMove="1" noResize="1" noEditPoints="1" noAdjustHandles="1" noChangeArrowheads="1" noChangeShapeType="1" noTextEdit="1"/>
+                    </p:cNvSpPr>
+                    <p:nvPr/>
+                  </p:nvSpPr>
+                  <p:spPr>
+                    <a:xfrm>
+                      <a:off x="785815" y="912420"/>
+                      <a:ext cx="371385" cy="369333"/>
+                    </a:xfrm>
+                    <a:prstGeom prst="rect">
+                      <a:avLst/>
+                    </a:prstGeom>
+                    <a:blipFill>
+                      <a:blip r:embed="rId28"/>
+                      <a:stretch>
+                        <a:fillRect l="-19048" r="-114286" b="-220000"/>
+                      </a:stretch>
+                    </a:blipFill>
+                  </p:spPr>
+                  <p:txBody>
+                    <a:bodyPr/>
+                    <a:lstStyle/>
+                    <a:p>
+                      <a:r>
+                        <a:rPr lang="en-US">
+                          <a:noFill/>
+                        </a:rPr>
+                        <a:t> </a:t>
+                      </a:r>
+                    </a:p>
+                  </p:txBody>
+                </p:sp>
+              </mc:Fallback>
+            </mc:AlternateContent>
+            <mc:AlternateContent xmlns:mc="http://schemas.openxmlformats.org/markup-compatibility/2006" xmlns:a14="http://schemas.microsoft.com/office/drawing/2010/main">
+              <mc:Choice Requires="a14">
+                <p:sp>
+                  <p:nvSpPr>
+                    <p:cNvPr id="34" name="Rectangle 33"/>
+                    <p:cNvSpPr/>
+                    <p:nvPr/>
+                  </p:nvSpPr>
+                  <p:spPr>
+                    <a:xfrm>
+                      <a:off x="1006642" y="2350591"/>
+                      <a:ext cx="367985" cy="369333"/>
+                    </a:xfrm>
+                    <a:prstGeom prst="rect">
+                      <a:avLst/>
+                    </a:prstGeom>
+                  </p:spPr>
+                  <p:txBody>
+                    <a:bodyPr wrap="none">
+                      <a:spAutoFit/>
+                    </a:bodyPr>
+                    <a:lstStyle/>
+                    <a:p>
+                      <a:pPr/>
+                      <a14:m>
+                        <m:oMathPara xmlns:m="http://schemas.openxmlformats.org/officeDocument/2006/math">
+                          <m:oMathParaPr>
+                            <m:jc m:val="centerGroup"/>
+                          </m:oMathParaPr>
+                          <m:oMath xmlns:m="http://schemas.openxmlformats.org/officeDocument/2006/math">
+                            <m:r>
+                              <a:rPr lang="en-US" b="0" i="1" smtClean="0">
+                                <a:latin typeface="Cambria Math" panose="02040503050406030204" pitchFamily="18" charset="0"/>
+                                <a:cs typeface="Arial" panose="020B0604020202020204" pitchFamily="34" charset="0"/>
+                              </a:rPr>
+                              <m:t>0</m:t>
+                            </m:r>
+                          </m:oMath>
+                        </m:oMathPara>
+                      </a14:m>
+                      <a:endParaRPr lang="en-CA" dirty="0"/>
+                    </a:p>
+                  </p:txBody>
+                </p:sp>
+              </mc:Choice>
+              <mc:Fallback xmlns="">
+                <p:sp>
+                  <p:nvSpPr>
+                    <p:cNvPr id="109" name="Rectangle 108"/>
+                    <p:cNvSpPr>
+                      <a:spLocks noRot="1" noChangeAspect="1" noMove="1" noResize="1" noEditPoints="1" noAdjustHandles="1" noChangeArrowheads="1" noChangeShapeType="1" noTextEdit="1"/>
+                    </p:cNvSpPr>
+                    <p:nvPr/>
+                  </p:nvSpPr>
+                  <p:spPr>
+                    <a:xfrm>
+                      <a:off x="1006642" y="2350591"/>
+                      <a:ext cx="367985" cy="369333"/>
+                    </a:xfrm>
+                    <a:prstGeom prst="rect">
+                      <a:avLst/>
+                    </a:prstGeom>
+                    <a:blipFill>
+                      <a:blip r:embed="rId29"/>
+                      <a:stretch>
+                        <a:fillRect l="-14286" r="-114286" b="-180000"/>
+                      </a:stretch>
+                    </a:blipFill>
+                  </p:spPr>
+                  <p:txBody>
+                    <a:bodyPr/>
+                    <a:lstStyle/>
+                    <a:p>
+                      <a:r>
+                        <a:rPr lang="en-US">
+                          <a:noFill/>
+                        </a:rPr>
+                        <a:t> </a:t>
+                      </a:r>
+                    </a:p>
+                  </p:txBody>
+                </p:sp>
+              </mc:Fallback>
+            </mc:AlternateContent>
+          </p:grpSp>
+          <p:sp>
+            <p:nvSpPr>
+              <p:cNvPr id="29" name="Rectangle 28"/>
+              <p:cNvSpPr/>
+              <p:nvPr/>
+            </p:nvSpPr>
+            <p:spPr>
+              <a:xfrm>
+                <a:off x="1129904" y="1614682"/>
+                <a:ext cx="184731" cy="369332"/>
+              </a:xfrm>
+              <a:prstGeom prst="rect">
+                <a:avLst/>
+              </a:prstGeom>
+            </p:spPr>
+            <p:txBody>
+              <a:bodyPr wrap="none">
+                <a:spAutoFit/>
+              </a:bodyPr>
+              <a:lstStyle/>
+              <a:p>
+                <a:endParaRPr lang="en-CA" dirty="0"/>
+              </a:p>
+            </p:txBody>
+          </p:sp>
+        </p:grpSp>
+      </p:grpSp>
+      <mc:AlternateContent xmlns:mc="http://schemas.openxmlformats.org/markup-compatibility/2006">
+        <mc:Choice xmlns:a14="http://schemas.microsoft.com/office/drawing/2010/main" Requires="a14">
+          <p:sp>
+            <p:nvSpPr>
+              <p:cNvPr id="36" name="TextBox 35"/>
+              <p:cNvSpPr txBox="1"/>
+              <p:nvPr/>
+            </p:nvSpPr>
+            <p:spPr>
+              <a:xfrm>
+                <a:off x="7534277" y="3188393"/>
+                <a:ext cx="933845" cy="527067"/>
+              </a:xfrm>
+              <a:prstGeom prst="rect">
+                <a:avLst/>
+              </a:prstGeom>
+              <a:noFill/>
+            </p:spPr>
+            <p:txBody>
+              <a:bodyPr wrap="none" lIns="0" tIns="0" rIns="0" bIns="0" rtlCol="0">
+                <a:spAutoFit/>
+              </a:bodyPr>
+              <a:lstStyle/>
+              <a:p>
+                <a14:m>
+                  <m:oMathPara xmlns:m="http://schemas.openxmlformats.org/officeDocument/2006/math">
+                    <m:oMathParaPr>
+                      <m:jc m:val="centerGroup"/>
+                    </m:oMathParaPr>
+                    <m:oMath xmlns:m="http://schemas.openxmlformats.org/officeDocument/2006/math">
+                      <m:r>
+                        <a:rPr lang="en-US" sz="2000" b="0" i="1" smtClean="0">
+                          <a:latin typeface="Cambria Math" panose="02040503050406030204" pitchFamily="18" charset="0"/>
+                          <a:cs typeface="Arial" panose="020B0604020202020204" pitchFamily="34" charset="0"/>
+                        </a:rPr>
+                        <m:t>𝛼</m:t>
+                      </m:r>
+                      <m:r>
+                        <a:rPr lang="en-US" sz="2000" b="0" i="1" smtClean="0">
+                          <a:latin typeface="Cambria Math" panose="02040503050406030204" pitchFamily="18" charset="0"/>
+                          <a:cs typeface="Arial" panose="020B0604020202020204" pitchFamily="34" charset="0"/>
+                        </a:rPr>
+                        <m:t> </m:t>
+                      </m:r>
+                      <m:f>
+                        <m:fPr>
+                          <m:ctrlPr>
+                            <a:rPr lang="en-US" sz="2000" b="0" i="1" smtClean="0">
+                              <a:latin typeface="Cambria Math" panose="02040503050406030204" pitchFamily="18" charset="0"/>
+                              <a:cs typeface="Arial" panose="020B0604020202020204" pitchFamily="34" charset="0"/>
+                            </a:rPr>
+                          </m:ctrlPr>
+                        </m:fPr>
+                        <m:num>
+                          <m:r>
+                            <a:rPr lang="en-US" sz="2000" b="0" i="1" smtClean="0">
+                              <a:latin typeface="Cambria Math" panose="02040503050406030204" pitchFamily="18" charset="0"/>
+                              <a:cs typeface="Arial" panose="020B0604020202020204" pitchFamily="34" charset="0"/>
+                            </a:rPr>
+                            <m:t>𝑎</m:t>
+                          </m:r>
+                        </m:num>
+                        <m:den>
+                          <m:r>
+                            <a:rPr lang="en-US" sz="2000" b="0" i="1" smtClean="0">
+                              <a:latin typeface="Cambria Math" panose="02040503050406030204" pitchFamily="18" charset="0"/>
+                              <a:cs typeface="Arial" panose="020B0604020202020204" pitchFamily="34" charset="0"/>
+                            </a:rPr>
+                            <m:t>𝑏</m:t>
+                          </m:r>
+                        </m:den>
+                      </m:f>
+                      <m:r>
+                        <a:rPr lang="en-US" sz="2000" b="0" i="1" smtClean="0">
+                          <a:latin typeface="Cambria Math" panose="02040503050406030204" pitchFamily="18" charset="0"/>
+                          <a:cs typeface="Arial" panose="020B0604020202020204" pitchFamily="34" charset="0"/>
+                        </a:rPr>
+                        <m:t>   </m:t>
+                      </m:r>
+                      <m:sSub>
+                        <m:sSubPr>
+                          <m:ctrlPr>
+                            <a:rPr lang="en-US" sz="2000" b="0" i="1" smtClean="0">
+                              <a:latin typeface="Cambria Math" panose="02040503050406030204" pitchFamily="18" charset="0"/>
+                              <a:cs typeface="Arial" panose="020B0604020202020204" pitchFamily="34" charset="0"/>
+                            </a:rPr>
+                          </m:ctrlPr>
+                        </m:sSubPr>
+                        <m:e>
+                          <m:acc>
+                            <m:accPr>
+                              <m:chr m:val="⃗"/>
+                              <m:ctrlPr>
+                                <a:rPr lang="en-US" sz="2000" b="0" i="1" smtClean="0">
+                                  <a:latin typeface="Cambria Math" panose="02040503050406030204" pitchFamily="18" charset="0"/>
+                                  <a:cs typeface="Arial" panose="020B0604020202020204" pitchFamily="34" charset="0"/>
+                                </a:rPr>
+                              </m:ctrlPr>
+                            </m:accPr>
+                            <m:e>
+                              <m:r>
+                                <a:rPr lang="en-US" sz="2000" b="0" i="1" smtClean="0">
+                                  <a:latin typeface="Cambria Math" panose="02040503050406030204" pitchFamily="18" charset="0"/>
+                                  <a:cs typeface="Arial" panose="020B0604020202020204" pitchFamily="34" charset="0"/>
+                                </a:rPr>
+                                <m:t>𝐹</m:t>
+                              </m:r>
+                            </m:e>
+                          </m:acc>
+                        </m:e>
+                        <m:sub>
+                          <m:r>
+                            <a:rPr lang="en-US" sz="2000" b="0" i="1" smtClean="0">
+                              <a:latin typeface="Cambria Math" panose="02040503050406030204" pitchFamily="18" charset="0"/>
+                              <a:cs typeface="Arial" panose="020B0604020202020204" pitchFamily="34" charset="0"/>
+                            </a:rPr>
+                            <m:t>1</m:t>
+                          </m:r>
+                        </m:sub>
+                      </m:sSub>
+                    </m:oMath>
+                  </m:oMathPara>
+                </a14:m>
+                <a:endParaRPr lang="en-US" sz="2000" dirty="0" smtClean="0">
+                  <a:latin typeface="Arial" panose="020B0604020202020204" pitchFamily="34" charset="0"/>
+                  <a:cs typeface="Arial" panose="020B0604020202020204" pitchFamily="34" charset="0"/>
+                </a:endParaRPr>
+              </a:p>
+            </p:txBody>
+          </p:sp>
+        </mc:Choice>
+        <mc:Fallback>
+          <p:sp>
+            <p:nvSpPr>
+              <p:cNvPr id="36" name="TextBox 35"/>
+              <p:cNvSpPr txBox="1">
+                <a:spLocks noRot="1" noChangeAspect="1" noMove="1" noResize="1" noEditPoints="1" noAdjustHandles="1" noChangeArrowheads="1" noChangeShapeType="1" noTextEdit="1"/>
+              </p:cNvSpPr>
+              <p:nvPr/>
+            </p:nvSpPr>
+            <p:spPr>
+              <a:xfrm>
+                <a:off x="7534277" y="3188393"/>
+                <a:ext cx="933845" cy="527067"/>
+              </a:xfrm>
+              <a:prstGeom prst="rect">
+                <a:avLst/>
+              </a:prstGeom>
+              <a:blipFill>
+                <a:blip r:embed="rId30"/>
+                <a:stretch>
+                  <a:fillRect/>
+                </a:stretch>
+              </a:blipFill>
+            </p:spPr>
+            <p:txBody>
+              <a:bodyPr/>
+              <a:lstStyle/>
+              <a:p>
+                <a:r>
+                  <a:rPr lang="en-US">
+                    <a:noFill/>
+                  </a:rPr>
+                  <a:t> </a:t>
+                </a:r>
+              </a:p>
+            </p:txBody>
+          </p:sp>
+        </mc:Fallback>
+      </mc:AlternateContent>
+    </p:spTree>
+    <p:extLst>
+      <p:ext uri="{BB962C8B-B14F-4D97-AF65-F5344CB8AC3E}">
+        <p14:creationId xmlns:p14="http://schemas.microsoft.com/office/powerpoint/2010/main" val="2818547824"/>
+      </p:ext>
+    </p:extLst>
+  </p:cSld>
+  <p:clrMapOvr>
+    <a:masterClrMapping/>
+  </p:clrMapOvr>
+</p:sld>
+</file>
+
 <file path=ppt/theme/theme1.xml><?xml version="1.0" encoding="utf-8"?>
 <a:theme xmlns:a="http://schemas.openxmlformats.org/drawingml/2006/main" name="Office Theme">
   <a:themeElements>

</xml_diff>

<commit_message>
Finished text for chapter 6
Still has some TODOs listed for Olivia and Emma, and needs some checkpoint questions and end of chapter stuff.
</commit_message>
<xml_diff>
--- a/tex/figures/ApplyingNewtonsLaws/Figures.pptx
+++ b/tex/figures/ApplyingNewtonsLaws/Figures.pptx
@@ -12,6 +12,7 @@
     <p:sldId id="274" r:id="rId6"/>
     <p:sldId id="275" r:id="rId7"/>
     <p:sldId id="276" r:id="rId8"/>
+    <p:sldId id="277" r:id="rId9"/>
   </p:sldIdLst>
   <p:sldSz cx="12192000" cy="6858000"/>
   <p:notesSz cx="6858000" cy="9144000"/>
@@ -249,7 +250,7 @@
           <a:p>
             <a:fld id="{F7249F8D-641B-4CAF-BAE5-10524742F6F1}" type="datetimeFigureOut">
               <a:rPr lang="en-CA" smtClean="0"/>
-              <a:t>2018-05-31</a:t>
+              <a:t>2018-06-01</a:t>
             </a:fld>
             <a:endParaRPr lang="en-CA"/>
           </a:p>
@@ -419,7 +420,7 @@
           <a:p>
             <a:fld id="{F7249F8D-641B-4CAF-BAE5-10524742F6F1}" type="datetimeFigureOut">
               <a:rPr lang="en-CA" smtClean="0"/>
-              <a:t>2018-05-31</a:t>
+              <a:t>2018-06-01</a:t>
             </a:fld>
             <a:endParaRPr lang="en-CA"/>
           </a:p>
@@ -599,7 +600,7 @@
           <a:p>
             <a:fld id="{F7249F8D-641B-4CAF-BAE5-10524742F6F1}" type="datetimeFigureOut">
               <a:rPr lang="en-CA" smtClean="0"/>
-              <a:t>2018-05-31</a:t>
+              <a:t>2018-06-01</a:t>
             </a:fld>
             <a:endParaRPr lang="en-CA"/>
           </a:p>
@@ -769,7 +770,7 @@
           <a:p>
             <a:fld id="{F7249F8D-641B-4CAF-BAE5-10524742F6F1}" type="datetimeFigureOut">
               <a:rPr lang="en-CA" smtClean="0"/>
-              <a:t>2018-05-31</a:t>
+              <a:t>2018-06-01</a:t>
             </a:fld>
             <a:endParaRPr lang="en-CA"/>
           </a:p>
@@ -1015,7 +1016,7 @@
           <a:p>
             <a:fld id="{F7249F8D-641B-4CAF-BAE5-10524742F6F1}" type="datetimeFigureOut">
               <a:rPr lang="en-CA" smtClean="0"/>
-              <a:t>2018-05-31</a:t>
+              <a:t>2018-06-01</a:t>
             </a:fld>
             <a:endParaRPr lang="en-CA"/>
           </a:p>
@@ -1247,7 +1248,7 @@
           <a:p>
             <a:fld id="{F7249F8D-641B-4CAF-BAE5-10524742F6F1}" type="datetimeFigureOut">
               <a:rPr lang="en-CA" smtClean="0"/>
-              <a:t>2018-05-31</a:t>
+              <a:t>2018-06-01</a:t>
             </a:fld>
             <a:endParaRPr lang="en-CA"/>
           </a:p>
@@ -1614,7 +1615,7 @@
           <a:p>
             <a:fld id="{F7249F8D-641B-4CAF-BAE5-10524742F6F1}" type="datetimeFigureOut">
               <a:rPr lang="en-CA" smtClean="0"/>
-              <a:t>2018-05-31</a:t>
+              <a:t>2018-06-01</a:t>
             </a:fld>
             <a:endParaRPr lang="en-CA"/>
           </a:p>
@@ -1732,7 +1733,7 @@
           <a:p>
             <a:fld id="{F7249F8D-641B-4CAF-BAE5-10524742F6F1}" type="datetimeFigureOut">
               <a:rPr lang="en-CA" smtClean="0"/>
-              <a:t>2018-05-31</a:t>
+              <a:t>2018-06-01</a:t>
             </a:fld>
             <a:endParaRPr lang="en-CA"/>
           </a:p>
@@ -1827,7 +1828,7 @@
           <a:p>
             <a:fld id="{F7249F8D-641B-4CAF-BAE5-10524742F6F1}" type="datetimeFigureOut">
               <a:rPr lang="en-CA" smtClean="0"/>
-              <a:t>2018-05-31</a:t>
+              <a:t>2018-06-01</a:t>
             </a:fld>
             <a:endParaRPr lang="en-CA"/>
           </a:p>
@@ -2104,7 +2105,7 @@
           <a:p>
             <a:fld id="{F7249F8D-641B-4CAF-BAE5-10524742F6F1}" type="datetimeFigureOut">
               <a:rPr lang="en-CA" smtClean="0"/>
-              <a:t>2018-05-31</a:t>
+              <a:t>2018-06-01</a:t>
             </a:fld>
             <a:endParaRPr lang="en-CA"/>
           </a:p>
@@ -2357,7 +2358,7 @@
           <a:p>
             <a:fld id="{F7249F8D-641B-4CAF-BAE5-10524742F6F1}" type="datetimeFigureOut">
               <a:rPr lang="en-CA" smtClean="0"/>
-              <a:t>2018-05-31</a:t>
+              <a:t>2018-06-01</a:t>
             </a:fld>
             <a:endParaRPr lang="en-CA"/>
           </a:p>
@@ -2570,7 +2571,7 @@
           <a:p>
             <a:fld id="{F7249F8D-641B-4CAF-BAE5-10524742F6F1}" type="datetimeFigureOut">
               <a:rPr lang="en-CA" smtClean="0"/>
-              <a:t>2018-05-31</a:t>
+              <a:t>2018-06-01</a:t>
             </a:fld>
             <a:endParaRPr lang="en-CA"/>
           </a:p>
@@ -9224,8 +9225,8 @@
             </p:sp>
           </mc:Fallback>
         </mc:AlternateContent>
-        <mc:AlternateContent xmlns:mc="http://schemas.openxmlformats.org/markup-compatibility/2006">
-          <mc:Choice xmlns:a14="http://schemas.microsoft.com/office/drawing/2010/main" Requires="a14">
+        <mc:AlternateContent xmlns:mc="http://schemas.openxmlformats.org/markup-compatibility/2006" xmlns:a14="http://schemas.microsoft.com/office/drawing/2010/main">
+          <mc:Choice Requires="a14">
             <p:sp>
               <p:nvSpPr>
                 <p:cNvPr id="49" name="TextBox 48"/>
@@ -9307,7 +9308,7 @@
               </p:txBody>
             </p:sp>
           </mc:Choice>
-          <mc:Fallback>
+          <mc:Fallback xmlns="">
             <p:sp>
               <p:nvSpPr>
                 <p:cNvPr id="49" name="TextBox 48"/>
@@ -19939,8 +19940,8 @@
               </a:fontRef>
             </p:style>
           </p:cxnSp>
-          <mc:AlternateContent xmlns:mc="http://schemas.openxmlformats.org/markup-compatibility/2006">
-            <mc:Choice xmlns:a14="http://schemas.microsoft.com/office/drawing/2010/main" Requires="a14">
+          <mc:AlternateContent xmlns:mc="http://schemas.openxmlformats.org/markup-compatibility/2006" xmlns:a14="http://schemas.microsoft.com/office/drawing/2010/main">
+            <mc:Choice Requires="a14">
               <p:sp>
                 <p:nvSpPr>
                   <p:cNvPr id="66" name="TextBox 65"/>
@@ -20022,7 +20023,7 @@
                 </p:txBody>
               </p:sp>
             </mc:Choice>
-            <mc:Fallback>
+            <mc:Fallback xmlns="">
               <p:sp>
                 <p:nvSpPr>
                   <p:cNvPr id="66" name="TextBox 65"/>
@@ -20061,8 +20062,8 @@
               </p:sp>
             </mc:Fallback>
           </mc:AlternateContent>
-          <mc:AlternateContent xmlns:mc="http://schemas.openxmlformats.org/markup-compatibility/2006">
-            <mc:Choice xmlns:a14="http://schemas.microsoft.com/office/drawing/2010/main" Requires="a14">
+          <mc:AlternateContent xmlns:mc="http://schemas.openxmlformats.org/markup-compatibility/2006" xmlns:a14="http://schemas.microsoft.com/office/drawing/2010/main">
+            <mc:Choice Requires="a14">
               <p:sp>
                 <p:nvSpPr>
                   <p:cNvPr id="68" name="TextBox 67"/>
@@ -20144,7 +20145,7 @@
                 </p:txBody>
               </p:sp>
             </mc:Choice>
-            <mc:Fallback>
+            <mc:Fallback xmlns="">
               <p:sp>
                 <p:nvSpPr>
                   <p:cNvPr id="68" name="TextBox 67"/>
@@ -20183,8 +20184,8 @@
               </p:sp>
             </mc:Fallback>
           </mc:AlternateContent>
-          <mc:AlternateContent xmlns:mc="http://schemas.openxmlformats.org/markup-compatibility/2006">
-            <mc:Choice xmlns:a14="http://schemas.microsoft.com/office/drawing/2010/main" Requires="a14">
+          <mc:AlternateContent xmlns:mc="http://schemas.openxmlformats.org/markup-compatibility/2006" xmlns:a14="http://schemas.microsoft.com/office/drawing/2010/main">
+            <mc:Choice Requires="a14">
               <p:sp>
                 <p:nvSpPr>
                   <p:cNvPr id="70" name="TextBox 69"/>
@@ -20266,7 +20267,7 @@
                 </p:txBody>
               </p:sp>
             </mc:Choice>
-            <mc:Fallback>
+            <mc:Fallback xmlns="">
               <p:sp>
                 <p:nvSpPr>
                   <p:cNvPr id="70" name="TextBox 69"/>
@@ -20689,8 +20690,8 @@
               </a:fontRef>
             </p:style>
           </p:cxnSp>
-          <mc:AlternateContent xmlns:mc="http://schemas.openxmlformats.org/markup-compatibility/2006">
-            <mc:Choice xmlns:a14="http://schemas.microsoft.com/office/drawing/2010/main" Requires="a14">
+          <mc:AlternateContent xmlns:mc="http://schemas.openxmlformats.org/markup-compatibility/2006" xmlns:a14="http://schemas.microsoft.com/office/drawing/2010/main">
+            <mc:Choice Requires="a14">
               <p:sp>
                 <p:nvSpPr>
                   <p:cNvPr id="88" name="TextBox 87"/>
@@ -20713,6 +20714,7 @@
                   </a:bodyPr>
                   <a:lstStyle/>
                   <a:p>
+                    <a:pPr/>
                     <a14:m>
                       <m:oMathPara xmlns:m="http://schemas.openxmlformats.org/officeDocument/2006/math">
                         <m:oMathParaPr>
@@ -20758,7 +20760,7 @@
                 </p:txBody>
               </p:sp>
             </mc:Choice>
-            <mc:Fallback>
+            <mc:Fallback xmlns="">
               <p:sp>
                 <p:nvSpPr>
                   <p:cNvPr id="88" name="TextBox 87"/>
@@ -20797,8 +20799,8 @@
               </p:sp>
             </mc:Fallback>
           </mc:AlternateContent>
-          <mc:AlternateContent xmlns:mc="http://schemas.openxmlformats.org/markup-compatibility/2006">
-            <mc:Choice xmlns:a14="http://schemas.microsoft.com/office/drawing/2010/main" Requires="a14">
+          <mc:AlternateContent xmlns:mc="http://schemas.openxmlformats.org/markup-compatibility/2006" xmlns:a14="http://schemas.microsoft.com/office/drawing/2010/main">
+            <mc:Choice Requires="a14">
               <p:sp>
                 <p:nvSpPr>
                   <p:cNvPr id="89" name="TextBox 88"/>
@@ -20880,7 +20882,7 @@
                 </p:txBody>
               </p:sp>
             </mc:Choice>
-            <mc:Fallback>
+            <mc:Fallback xmlns="">
               <p:sp>
                 <p:nvSpPr>
                   <p:cNvPr id="89" name="TextBox 88"/>
@@ -20919,8 +20921,8 @@
               </p:sp>
             </mc:Fallback>
           </mc:AlternateContent>
-          <mc:AlternateContent xmlns:mc="http://schemas.openxmlformats.org/markup-compatibility/2006">
-            <mc:Choice xmlns:a14="http://schemas.microsoft.com/office/drawing/2010/main" Requires="a14">
+          <mc:AlternateContent xmlns:mc="http://schemas.openxmlformats.org/markup-compatibility/2006" xmlns:a14="http://schemas.microsoft.com/office/drawing/2010/main">
+            <mc:Choice Requires="a14">
               <p:sp>
                 <p:nvSpPr>
                   <p:cNvPr id="90" name="TextBox 89"/>
@@ -21002,7 +21004,7 @@
                 </p:txBody>
               </p:sp>
             </mc:Choice>
-            <mc:Fallback>
+            <mc:Fallback xmlns="">
               <p:sp>
                 <p:nvSpPr>
                   <p:cNvPr id="90" name="TextBox 89"/>
@@ -21041,8 +21043,8 @@
               </p:sp>
             </mc:Fallback>
           </mc:AlternateContent>
-          <mc:AlternateContent xmlns:mc="http://schemas.openxmlformats.org/markup-compatibility/2006">
-            <mc:Choice xmlns:a14="http://schemas.microsoft.com/office/drawing/2010/main" Requires="a14">
+          <mc:AlternateContent xmlns:mc="http://schemas.openxmlformats.org/markup-compatibility/2006" xmlns:a14="http://schemas.microsoft.com/office/drawing/2010/main">
+            <mc:Choice Requires="a14">
               <p:sp>
                 <p:nvSpPr>
                   <p:cNvPr id="91" name="TextBox 90"/>
@@ -21124,7 +21126,7 @@
                 </p:txBody>
               </p:sp>
             </mc:Choice>
-            <mc:Fallback>
+            <mc:Fallback xmlns="">
               <p:sp>
                 <p:nvSpPr>
                   <p:cNvPr id="91" name="TextBox 90"/>
@@ -21163,8 +21165,8 @@
               </p:sp>
             </mc:Fallback>
           </mc:AlternateContent>
-          <mc:AlternateContent xmlns:mc="http://schemas.openxmlformats.org/markup-compatibility/2006">
-            <mc:Choice xmlns:a14="http://schemas.microsoft.com/office/drawing/2010/main" Requires="a14">
+          <mc:AlternateContent xmlns:mc="http://schemas.openxmlformats.org/markup-compatibility/2006" xmlns:a14="http://schemas.microsoft.com/office/drawing/2010/main">
+            <mc:Choice Requires="a14">
               <p:sp>
                 <p:nvSpPr>
                   <p:cNvPr id="92" name="TextBox 91"/>
@@ -21246,7 +21248,7 @@
                 </p:txBody>
               </p:sp>
             </mc:Choice>
-            <mc:Fallback>
+            <mc:Fallback xmlns="">
               <p:sp>
                 <p:nvSpPr>
                   <p:cNvPr id="92" name="TextBox 91"/>
@@ -21285,8 +21287,8 @@
               </p:sp>
             </mc:Fallback>
           </mc:AlternateContent>
-          <mc:AlternateContent xmlns:mc="http://schemas.openxmlformats.org/markup-compatibility/2006">
-            <mc:Choice xmlns:a14="http://schemas.microsoft.com/office/drawing/2010/main" Requires="a14">
+          <mc:AlternateContent xmlns:mc="http://schemas.openxmlformats.org/markup-compatibility/2006" xmlns:a14="http://schemas.microsoft.com/office/drawing/2010/main">
+            <mc:Choice Requires="a14">
               <p:sp>
                 <p:nvSpPr>
                   <p:cNvPr id="93" name="TextBox 92"/>
@@ -21368,7 +21370,7 @@
                 </p:txBody>
               </p:sp>
             </mc:Choice>
-            <mc:Fallback>
+            <mc:Fallback xmlns="">
               <p:sp>
                 <p:nvSpPr>
                   <p:cNvPr id="93" name="TextBox 92"/>
@@ -21407,8 +21409,8 @@
               </p:sp>
             </mc:Fallback>
           </mc:AlternateContent>
-          <mc:AlternateContent xmlns:mc="http://schemas.openxmlformats.org/markup-compatibility/2006">
-            <mc:Choice xmlns:a14="http://schemas.microsoft.com/office/drawing/2010/main" Requires="a14">
+          <mc:AlternateContent xmlns:mc="http://schemas.openxmlformats.org/markup-compatibility/2006" xmlns:a14="http://schemas.microsoft.com/office/drawing/2010/main">
+            <mc:Choice Requires="a14">
               <p:sp>
                 <p:nvSpPr>
                   <p:cNvPr id="94" name="TextBox 93"/>
@@ -21431,6 +21433,7 @@
                   </a:bodyPr>
                   <a:lstStyle/>
                   <a:p>
+                    <a:pPr/>
                     <a14:m>
                       <m:oMathPara xmlns:m="http://schemas.openxmlformats.org/officeDocument/2006/math">
                         <m:oMathParaPr>
@@ -21455,7 +21458,7 @@
                 </p:txBody>
               </p:sp>
             </mc:Choice>
-            <mc:Fallback>
+            <mc:Fallback xmlns="">
               <p:sp>
                 <p:nvSpPr>
                   <p:cNvPr id="94" name="TextBox 93"/>
@@ -21494,8 +21497,8 @@
               </p:sp>
             </mc:Fallback>
           </mc:AlternateContent>
-          <mc:AlternateContent xmlns:mc="http://schemas.openxmlformats.org/markup-compatibility/2006">
-            <mc:Choice xmlns:a14="http://schemas.microsoft.com/office/drawing/2010/main" Requires="a14">
+          <mc:AlternateContent xmlns:mc="http://schemas.openxmlformats.org/markup-compatibility/2006" xmlns:a14="http://schemas.microsoft.com/office/drawing/2010/main">
+            <mc:Choice Requires="a14">
               <p:sp>
                 <p:nvSpPr>
                   <p:cNvPr id="95" name="TextBox 94"/>
@@ -21518,6 +21521,7 @@
                   </a:bodyPr>
                   <a:lstStyle/>
                   <a:p>
+                    <a:pPr/>
                     <a14:m>
                       <m:oMathPara xmlns:m="http://schemas.openxmlformats.org/officeDocument/2006/math">
                         <m:oMathParaPr>
@@ -21542,7 +21546,7 @@
                 </p:txBody>
               </p:sp>
             </mc:Choice>
-            <mc:Fallback>
+            <mc:Fallback xmlns="">
               <p:sp>
                 <p:nvSpPr>
                   <p:cNvPr id="95" name="TextBox 94"/>
@@ -21581,8 +21585,8 @@
               </p:sp>
             </mc:Fallback>
           </mc:AlternateContent>
-          <mc:AlternateContent xmlns:mc="http://schemas.openxmlformats.org/markup-compatibility/2006">
-            <mc:Choice xmlns:a14="http://schemas.microsoft.com/office/drawing/2010/main" Requires="a14">
+          <mc:AlternateContent xmlns:mc="http://schemas.openxmlformats.org/markup-compatibility/2006" xmlns:a14="http://schemas.microsoft.com/office/drawing/2010/main">
+            <mc:Choice Requires="a14">
               <p:sp>
                 <p:nvSpPr>
                   <p:cNvPr id="96" name="TextBox 95"/>
@@ -21605,6 +21609,7 @@
                   </a:bodyPr>
                   <a:lstStyle/>
                   <a:p>
+                    <a:pPr/>
                     <a14:m>
                       <m:oMathPara xmlns:m="http://schemas.openxmlformats.org/officeDocument/2006/math">
                         <m:oMathParaPr>
@@ -21629,7 +21634,7 @@
                 </p:txBody>
               </p:sp>
             </mc:Choice>
-            <mc:Fallback>
+            <mc:Fallback xmlns="">
               <p:sp>
                 <p:nvSpPr>
                   <p:cNvPr id="96" name="TextBox 95"/>
@@ -21697,10 +21702,6 @@
                   </a:rPr>
                   <a:t>4</a:t>
                 </a:r>
-                <a:endParaRPr lang="en-US" sz="2000" dirty="0" smtClean="0">
-                  <a:latin typeface="Arial" panose="020B0604020202020204" pitchFamily="34" charset="0"/>
-                  <a:cs typeface="Arial" panose="020B0604020202020204" pitchFamily="34" charset="0"/>
-                </a:endParaRPr>
               </a:p>
             </p:txBody>
           </p:sp>
@@ -21740,8 +21741,8 @@
               </a:p>
             </p:txBody>
           </p:sp>
-          <mc:AlternateContent xmlns:mc="http://schemas.openxmlformats.org/markup-compatibility/2006">
-            <mc:Choice xmlns:a14="http://schemas.microsoft.com/office/drawing/2010/main" Requires="a14">
+          <mc:AlternateContent xmlns:mc="http://schemas.openxmlformats.org/markup-compatibility/2006" xmlns:a14="http://schemas.microsoft.com/office/drawing/2010/main">
+            <mc:Choice Requires="a14">
               <p:sp>
                 <p:nvSpPr>
                   <p:cNvPr id="99" name="TextBox 98"/>
@@ -21823,7 +21824,7 @@
                 </p:txBody>
               </p:sp>
             </mc:Choice>
-            <mc:Fallback>
+            <mc:Fallback xmlns="">
               <p:sp>
                 <p:nvSpPr>
                   <p:cNvPr id="99" name="TextBox 98"/>
@@ -21862,8 +21863,8 @@
               </p:sp>
             </mc:Fallback>
           </mc:AlternateContent>
-          <mc:AlternateContent xmlns:mc="http://schemas.openxmlformats.org/markup-compatibility/2006">
-            <mc:Choice xmlns:a14="http://schemas.microsoft.com/office/drawing/2010/main" Requires="a14">
+          <mc:AlternateContent xmlns:mc="http://schemas.openxmlformats.org/markup-compatibility/2006" xmlns:a14="http://schemas.microsoft.com/office/drawing/2010/main">
+            <mc:Choice Requires="a14">
               <p:sp>
                 <p:nvSpPr>
                   <p:cNvPr id="100" name="TextBox 99"/>
@@ -21945,7 +21946,7 @@
                 </p:txBody>
               </p:sp>
             </mc:Choice>
-            <mc:Fallback>
+            <mc:Fallback xmlns="">
               <p:sp>
                 <p:nvSpPr>
                   <p:cNvPr id="100" name="TextBox 99"/>
@@ -22076,8 +22077,8 @@
               </a:p>
             </p:txBody>
           </p:sp>
-          <mc:AlternateContent xmlns:mc="http://schemas.openxmlformats.org/markup-compatibility/2006">
-            <mc:Choice xmlns:a14="http://schemas.microsoft.com/office/drawing/2010/main" Requires="a14">
+          <mc:AlternateContent xmlns:mc="http://schemas.openxmlformats.org/markup-compatibility/2006" xmlns:a14="http://schemas.microsoft.com/office/drawing/2010/main">
+            <mc:Choice Requires="a14">
               <p:sp>
                 <p:nvSpPr>
                   <p:cNvPr id="103" name="TextBox 102"/>
@@ -22100,6 +22101,7 @@
                   </a:bodyPr>
                   <a:lstStyle/>
                   <a:p>
+                    <a:pPr/>
                     <a14:m>
                       <m:oMathPara xmlns:m="http://schemas.openxmlformats.org/officeDocument/2006/math">
                         <m:oMathParaPr>
@@ -22145,7 +22147,7 @@
                 </p:txBody>
               </p:sp>
             </mc:Choice>
-            <mc:Fallback>
+            <mc:Fallback xmlns="">
               <p:sp>
                 <p:nvSpPr>
                   <p:cNvPr id="103" name="TextBox 102"/>
@@ -22833,8 +22835,8 @@
                 </a:fontRef>
               </p:style>
             </p:cxnSp>
-            <mc:AlternateContent xmlns:mc="http://schemas.openxmlformats.org/markup-compatibility/2006">
-              <mc:Choice xmlns:a14="http://schemas.microsoft.com/office/drawing/2010/main" Requires="a14">
+            <mc:AlternateContent xmlns:mc="http://schemas.openxmlformats.org/markup-compatibility/2006" xmlns:a14="http://schemas.microsoft.com/office/drawing/2010/main">
+              <mc:Choice Requires="a14">
                 <p:sp>
                   <p:nvSpPr>
                     <p:cNvPr id="134" name="TextBox 133"/>
@@ -22916,7 +22918,7 @@
                   </p:txBody>
                 </p:sp>
               </mc:Choice>
-              <mc:Fallback>
+              <mc:Fallback xmlns="">
                 <p:sp>
                   <p:nvSpPr>
                     <p:cNvPr id="134" name="TextBox 133"/>
@@ -22955,8 +22957,8 @@
                 </p:sp>
               </mc:Fallback>
             </mc:AlternateContent>
-            <mc:AlternateContent xmlns:mc="http://schemas.openxmlformats.org/markup-compatibility/2006">
-              <mc:Choice xmlns:a14="http://schemas.microsoft.com/office/drawing/2010/main" Requires="a14">
+            <mc:AlternateContent xmlns:mc="http://schemas.openxmlformats.org/markup-compatibility/2006" xmlns:a14="http://schemas.microsoft.com/office/drawing/2010/main">
+              <mc:Choice Requires="a14">
                 <p:sp>
                   <p:nvSpPr>
                     <p:cNvPr id="136" name="TextBox 135"/>
@@ -23038,7 +23040,7 @@
                   </p:txBody>
                 </p:sp>
               </mc:Choice>
-              <mc:Fallback>
+              <mc:Fallback xmlns="">
                 <p:sp>
                   <p:nvSpPr>
                     <p:cNvPr id="136" name="TextBox 135"/>
@@ -23257,8 +23259,8 @@
                 </a:p>
               </p:txBody>
             </p:sp>
-            <mc:AlternateContent xmlns:mc="http://schemas.openxmlformats.org/markup-compatibility/2006">
-              <mc:Choice xmlns:a14="http://schemas.microsoft.com/office/drawing/2010/main" Requires="a14">
+            <mc:AlternateContent xmlns:mc="http://schemas.openxmlformats.org/markup-compatibility/2006" xmlns:a14="http://schemas.microsoft.com/office/drawing/2010/main">
+              <mc:Choice Requires="a14">
                 <p:sp>
                   <p:nvSpPr>
                     <p:cNvPr id="147" name="TextBox 146"/>
@@ -23340,7 +23342,7 @@
                   </p:txBody>
                 </p:sp>
               </mc:Choice>
-              <mc:Fallback>
+              <mc:Fallback xmlns="">
                 <p:sp>
                   <p:nvSpPr>
                     <p:cNvPr id="147" name="TextBox 146"/>
@@ -23379,8 +23381,8 @@
                 </p:sp>
               </mc:Fallback>
             </mc:AlternateContent>
-            <mc:AlternateContent xmlns:mc="http://schemas.openxmlformats.org/markup-compatibility/2006">
-              <mc:Choice xmlns:a14="http://schemas.microsoft.com/office/drawing/2010/main" Requires="a14">
+            <mc:AlternateContent xmlns:mc="http://schemas.openxmlformats.org/markup-compatibility/2006" xmlns:a14="http://schemas.microsoft.com/office/drawing/2010/main">
+              <mc:Choice Requires="a14">
                 <p:sp>
                   <p:nvSpPr>
                     <p:cNvPr id="149" name="TextBox 148"/>
@@ -23462,7 +23464,7 @@
                   </p:txBody>
                 </p:sp>
               </mc:Choice>
-              <mc:Fallback>
+              <mc:Fallback xmlns="">
                 <p:sp>
                   <p:nvSpPr>
                     <p:cNvPr id="149" name="TextBox 148"/>
@@ -23501,8 +23503,8 @@
                 </p:sp>
               </mc:Fallback>
             </mc:AlternateContent>
-            <mc:AlternateContent xmlns:mc="http://schemas.openxmlformats.org/markup-compatibility/2006">
-              <mc:Choice xmlns:a14="http://schemas.microsoft.com/office/drawing/2010/main" Requires="a14">
+            <mc:AlternateContent xmlns:mc="http://schemas.openxmlformats.org/markup-compatibility/2006" xmlns:a14="http://schemas.microsoft.com/office/drawing/2010/main">
+              <mc:Choice Requires="a14">
                 <p:sp>
                   <p:nvSpPr>
                     <p:cNvPr id="151" name="TextBox 150"/>
@@ -23584,7 +23586,7 @@
                   </p:txBody>
                 </p:sp>
               </mc:Choice>
-              <mc:Fallback>
+              <mc:Fallback xmlns="">
                 <p:sp>
                   <p:nvSpPr>
                     <p:cNvPr id="151" name="TextBox 150"/>
@@ -23623,8 +23625,8 @@
                 </p:sp>
               </mc:Fallback>
             </mc:AlternateContent>
-            <mc:AlternateContent xmlns:mc="http://schemas.openxmlformats.org/markup-compatibility/2006">
-              <mc:Choice xmlns:a14="http://schemas.microsoft.com/office/drawing/2010/main" Requires="a14">
+            <mc:AlternateContent xmlns:mc="http://schemas.openxmlformats.org/markup-compatibility/2006" xmlns:a14="http://schemas.microsoft.com/office/drawing/2010/main">
+              <mc:Choice Requires="a14">
                 <p:sp>
                   <p:nvSpPr>
                     <p:cNvPr id="152" name="TextBox 151"/>
@@ -23647,6 +23649,7 @@
                     </a:bodyPr>
                     <a:lstStyle/>
                     <a:p>
+                      <a:pPr/>
                       <a14:m>
                         <m:oMathPara xmlns:m="http://schemas.openxmlformats.org/officeDocument/2006/math">
                           <m:oMathParaPr>
@@ -23671,7 +23674,7 @@
                   </p:txBody>
                 </p:sp>
               </mc:Choice>
-              <mc:Fallback>
+              <mc:Fallback xmlns="">
                 <p:sp>
                   <p:nvSpPr>
                     <p:cNvPr id="152" name="TextBox 151"/>
@@ -23710,8 +23713,8 @@
                 </p:sp>
               </mc:Fallback>
             </mc:AlternateContent>
-            <mc:AlternateContent xmlns:mc="http://schemas.openxmlformats.org/markup-compatibility/2006">
-              <mc:Choice xmlns:a14="http://schemas.microsoft.com/office/drawing/2010/main" Requires="a14">
+            <mc:AlternateContent xmlns:mc="http://schemas.openxmlformats.org/markup-compatibility/2006" xmlns:a14="http://schemas.microsoft.com/office/drawing/2010/main">
+              <mc:Choice Requires="a14">
                 <p:sp>
                   <p:nvSpPr>
                     <p:cNvPr id="154" name="TextBox 153"/>
@@ -23734,6 +23737,7 @@
                     </a:bodyPr>
                     <a:lstStyle/>
                     <a:p>
+                      <a:pPr/>
                       <a14:m>
                         <m:oMathPara xmlns:m="http://schemas.openxmlformats.org/officeDocument/2006/math">
                           <m:oMathParaPr>
@@ -23758,7 +23762,7 @@
                   </p:txBody>
                 </p:sp>
               </mc:Choice>
-              <mc:Fallback>
+              <mc:Fallback xmlns="">
                 <p:sp>
                   <p:nvSpPr>
                     <p:cNvPr id="154" name="TextBox 153"/>
@@ -23826,15 +23830,11 @@
                     </a:rPr>
                     <a:t>3</a:t>
                   </a:r>
-                  <a:endParaRPr lang="en-US" sz="2000" dirty="0" smtClean="0">
-                    <a:latin typeface="Arial" panose="020B0604020202020204" pitchFamily="34" charset="0"/>
-                    <a:cs typeface="Arial" panose="020B0604020202020204" pitchFamily="34" charset="0"/>
-                  </a:endParaRPr>
                 </a:p>
               </p:txBody>
             </p:sp>
-            <mc:AlternateContent xmlns:mc="http://schemas.openxmlformats.org/markup-compatibility/2006">
-              <mc:Choice xmlns:a14="http://schemas.microsoft.com/office/drawing/2010/main" Requires="a14">
+            <mc:AlternateContent xmlns:mc="http://schemas.openxmlformats.org/markup-compatibility/2006" xmlns:a14="http://schemas.microsoft.com/office/drawing/2010/main">
+              <mc:Choice Requires="a14">
                 <p:sp>
                   <p:nvSpPr>
                     <p:cNvPr id="158" name="TextBox 157"/>
@@ -23916,7 +23916,7 @@
                   </p:txBody>
                 </p:sp>
               </mc:Choice>
-              <mc:Fallback>
+              <mc:Fallback xmlns="">
                 <p:sp>
                   <p:nvSpPr>
                     <p:cNvPr id="158" name="TextBox 157"/>
@@ -24355,8 +24355,8 @@
               </a:fontRef>
             </p:style>
           </p:cxnSp>
-          <mc:AlternateContent xmlns:mc="http://schemas.openxmlformats.org/markup-compatibility/2006">
-            <mc:Choice xmlns:a14="http://schemas.microsoft.com/office/drawing/2010/main" Requires="a14">
+          <mc:AlternateContent xmlns:mc="http://schemas.openxmlformats.org/markup-compatibility/2006" xmlns:a14="http://schemas.microsoft.com/office/drawing/2010/main">
+            <mc:Choice Requires="a14">
               <p:sp>
                 <p:nvSpPr>
                   <p:cNvPr id="166" name="TextBox 165"/>
@@ -24379,6 +24379,7 @@
                   </a:bodyPr>
                   <a:lstStyle/>
                   <a:p>
+                    <a:pPr/>
                     <a14:m>
                       <m:oMathPara xmlns:m="http://schemas.openxmlformats.org/officeDocument/2006/math">
                         <m:oMathParaPr>
@@ -24435,7 +24436,7 @@
                 </p:txBody>
               </p:sp>
             </mc:Choice>
-            <mc:Fallback>
+            <mc:Fallback xmlns="">
               <p:sp>
                 <p:nvSpPr>
                   <p:cNvPr id="166" name="TextBox 165"/>
@@ -24523,8 +24524,8 @@
             </a:p>
           </p:txBody>
         </p:sp>
-        <mc:AlternateContent xmlns:mc="http://schemas.openxmlformats.org/markup-compatibility/2006">
-          <mc:Choice xmlns:a14="http://schemas.microsoft.com/office/drawing/2010/main" Requires="a14">
+        <mc:AlternateContent xmlns:mc="http://schemas.openxmlformats.org/markup-compatibility/2006" xmlns:a14="http://schemas.microsoft.com/office/drawing/2010/main">
+          <mc:Choice Requires="a14">
             <p:sp>
               <p:nvSpPr>
                 <p:cNvPr id="170" name="TextBox 169"/>
@@ -24547,6 +24548,7 @@
                 </a:bodyPr>
                 <a:lstStyle/>
                 <a:p>
+                  <a:pPr/>
                   <a14:m>
                     <m:oMathPara xmlns:m="http://schemas.openxmlformats.org/officeDocument/2006/math">
                       <m:oMathParaPr>
@@ -24605,7 +24607,7 @@
               </p:txBody>
             </p:sp>
           </mc:Choice>
-          <mc:Fallback>
+          <mc:Fallback xmlns="">
             <p:sp>
               <p:nvSpPr>
                 <p:cNvPr id="170" name="TextBox 169"/>
@@ -24716,8 +24718,8 @@
             </a:fontRef>
           </p:style>
         </p:cxnSp>
-        <mc:AlternateContent xmlns:mc="http://schemas.openxmlformats.org/markup-compatibility/2006">
-          <mc:Choice xmlns:a14="http://schemas.microsoft.com/office/drawing/2010/main" Requires="a14">
+        <mc:AlternateContent xmlns:mc="http://schemas.openxmlformats.org/markup-compatibility/2006" xmlns:a14="http://schemas.microsoft.com/office/drawing/2010/main">
+          <mc:Choice Requires="a14">
             <p:sp>
               <p:nvSpPr>
                 <p:cNvPr id="175" name="TextBox 174"/>
@@ -24740,6 +24742,7 @@
                 </a:bodyPr>
                 <a:lstStyle/>
                 <a:p>
+                  <a:pPr/>
                   <a14:m>
                     <m:oMathPara xmlns:m="http://schemas.openxmlformats.org/officeDocument/2006/math">
                       <m:oMathParaPr>
@@ -24785,7 +24788,7 @@
               </p:txBody>
             </p:sp>
           </mc:Choice>
-          <mc:Fallback>
+          <mc:Fallback xmlns="">
             <p:sp>
               <p:nvSpPr>
                 <p:cNvPr id="175" name="TextBox 174"/>
@@ -24824,8 +24827,8 @@
             </p:sp>
           </mc:Fallback>
         </mc:AlternateContent>
-        <mc:AlternateContent xmlns:mc="http://schemas.openxmlformats.org/markup-compatibility/2006">
-          <mc:Choice xmlns:a14="http://schemas.microsoft.com/office/drawing/2010/main" Requires="a14">
+        <mc:AlternateContent xmlns:mc="http://schemas.openxmlformats.org/markup-compatibility/2006" xmlns:a14="http://schemas.microsoft.com/office/drawing/2010/main">
+          <mc:Choice Requires="a14">
             <p:sp>
               <p:nvSpPr>
                 <p:cNvPr id="176" name="TextBox 175"/>
@@ -24848,6 +24851,7 @@
                 </a:bodyPr>
                 <a:lstStyle/>
                 <a:p>
+                  <a:pPr/>
                   <a14:m>
                     <m:oMathPara xmlns:m="http://schemas.openxmlformats.org/officeDocument/2006/math">
                       <m:oMathParaPr>
@@ -24893,7 +24897,7 @@
               </p:txBody>
             </p:sp>
           </mc:Choice>
-          <mc:Fallback>
+          <mc:Fallback xmlns="">
             <p:sp>
               <p:nvSpPr>
                 <p:cNvPr id="176" name="TextBox 175"/>
@@ -25147,8 +25151,8 @@
               </a:fontRef>
             </p:style>
           </p:cxnSp>
-          <mc:AlternateContent xmlns:mc="http://schemas.openxmlformats.org/markup-compatibility/2006">
-            <mc:Choice xmlns:a14="http://schemas.microsoft.com/office/drawing/2010/main" Requires="a14">
+          <mc:AlternateContent xmlns:mc="http://schemas.openxmlformats.org/markup-compatibility/2006" xmlns:a14="http://schemas.microsoft.com/office/drawing/2010/main">
+            <mc:Choice Requires="a14">
               <p:sp>
                 <p:nvSpPr>
                   <p:cNvPr id="30" name="TextBox 29"/>
@@ -25230,7 +25234,7 @@
                 </p:txBody>
               </p:sp>
             </mc:Choice>
-            <mc:Fallback>
+            <mc:Fallback xmlns="">
               <p:sp>
                 <p:nvSpPr>
                   <p:cNvPr id="30" name="TextBox 29"/>
@@ -26307,54 +26311,6 @@
               </p:grpSpPr>
               <p:sp>
                 <p:nvSpPr>
-                  <p:cNvPr id="6" name="Rectangle 5"/>
-                  <p:cNvSpPr/>
-                  <p:nvPr/>
-                </p:nvSpPr>
-                <p:spPr>
-                  <a:xfrm>
-                    <a:off x="6824546" y="1170878"/>
-                    <a:ext cx="390293" cy="211873"/>
-                  </a:xfrm>
-                  <a:prstGeom prst="rect">
-                    <a:avLst/>
-                  </a:prstGeom>
-                  <a:solidFill>
-                    <a:schemeClr val="accent1"/>
-                  </a:solidFill>
-                  <a:ln w="38100">
-                    <a:solidFill>
-                      <a:schemeClr val="accent1"/>
-                    </a:solidFill>
-                  </a:ln>
-                </p:spPr>
-                <p:style>
-                  <a:lnRef idx="2">
-                    <a:schemeClr val="accent1">
-                      <a:shade val="50000"/>
-                    </a:schemeClr>
-                  </a:lnRef>
-                  <a:fillRef idx="1">
-                    <a:schemeClr val="accent1"/>
-                  </a:fillRef>
-                  <a:effectRef idx="0">
-                    <a:schemeClr val="accent1"/>
-                  </a:effectRef>
-                  <a:fontRef idx="minor">
-                    <a:schemeClr val="lt1"/>
-                  </a:fontRef>
-                </p:style>
-                <p:txBody>
-                  <a:bodyPr rtlCol="0" anchor="ctr"/>
-                  <a:lstStyle/>
-                  <a:p>
-                    <a:pPr algn="ctr"/>
-                    <a:endParaRPr lang="en-US"/>
-                  </a:p>
-                </p:txBody>
-              </p:sp>
-              <p:sp>
-                <p:nvSpPr>
                   <p:cNvPr id="7" name="Oval 6"/>
                   <p:cNvSpPr/>
                   <p:nvPr/>
@@ -26685,6 +26641,54 @@
                   </a:fontRef>
                 </p:style>
               </p:cxnSp>
+              <p:sp>
+                <p:nvSpPr>
+                  <p:cNvPr id="6" name="Rectangle 5"/>
+                  <p:cNvSpPr/>
+                  <p:nvPr/>
+                </p:nvSpPr>
+                <p:spPr>
+                  <a:xfrm>
+                    <a:off x="6824546" y="1170878"/>
+                    <a:ext cx="390293" cy="211873"/>
+                  </a:xfrm>
+                  <a:prstGeom prst="rect">
+                    <a:avLst/>
+                  </a:prstGeom>
+                  <a:solidFill>
+                    <a:schemeClr val="accent1"/>
+                  </a:solidFill>
+                  <a:ln w="38100">
+                    <a:solidFill>
+                      <a:schemeClr val="accent1"/>
+                    </a:solidFill>
+                  </a:ln>
+                </p:spPr>
+                <p:style>
+                  <a:lnRef idx="2">
+                    <a:schemeClr val="accent1">
+                      <a:shade val="50000"/>
+                    </a:schemeClr>
+                  </a:lnRef>
+                  <a:fillRef idx="1">
+                    <a:schemeClr val="accent1"/>
+                  </a:fillRef>
+                  <a:effectRef idx="0">
+                    <a:schemeClr val="accent1"/>
+                  </a:effectRef>
+                  <a:fontRef idx="minor">
+                    <a:schemeClr val="lt1"/>
+                  </a:fontRef>
+                </p:style>
+                <p:txBody>
+                  <a:bodyPr rtlCol="0" anchor="ctr"/>
+                  <a:lstStyle/>
+                  <a:p>
+                    <a:pPr algn="ctr"/>
+                    <a:endParaRPr lang="en-US"/>
+                  </a:p>
+                </p:txBody>
+              </p:sp>
             </p:grpSp>
             <p:cxnSp>
               <p:nvCxnSpPr>
@@ -26722,8 +26726,8 @@
                 </a:fontRef>
               </p:style>
             </p:cxnSp>
-            <mc:AlternateContent xmlns:mc="http://schemas.openxmlformats.org/markup-compatibility/2006">
-              <mc:Choice xmlns:a14="http://schemas.microsoft.com/office/drawing/2010/main" Requires="a14">
+            <mc:AlternateContent xmlns:mc="http://schemas.openxmlformats.org/markup-compatibility/2006" xmlns:a14="http://schemas.microsoft.com/office/drawing/2010/main">
+              <mc:Choice Requires="a14">
                 <p:sp>
                   <p:nvSpPr>
                     <p:cNvPr id="20" name="TextBox 19"/>
@@ -26746,6 +26750,7 @@
                     </a:bodyPr>
                     <a:lstStyle/>
                     <a:p>
+                      <a:pPr/>
                       <a14:m>
                         <m:oMathPara xmlns:m="http://schemas.openxmlformats.org/officeDocument/2006/math">
                           <m:oMathParaPr>
@@ -26770,7 +26775,7 @@
                   </p:txBody>
                 </p:sp>
               </mc:Choice>
-              <mc:Fallback>
+              <mc:Fallback xmlns="">
                 <p:sp>
                   <p:nvSpPr>
                     <p:cNvPr id="20" name="TextBox 19"/>
@@ -26810,8 +26815,8 @@
               </mc:Fallback>
             </mc:AlternateContent>
           </p:grpSp>
-          <mc:AlternateContent xmlns:mc="http://schemas.openxmlformats.org/markup-compatibility/2006">
-            <mc:Choice xmlns:a14="http://schemas.microsoft.com/office/drawing/2010/main" Requires="a14">
+          <mc:AlternateContent xmlns:mc="http://schemas.openxmlformats.org/markup-compatibility/2006" xmlns:a14="http://schemas.microsoft.com/office/drawing/2010/main">
+            <mc:Choice Requires="a14">
               <p:sp>
                 <p:nvSpPr>
                   <p:cNvPr id="44" name="TextBox 43"/>
@@ -26873,7 +26878,7 @@
                 </p:txBody>
               </p:sp>
             </mc:Choice>
-            <mc:Fallback>
+            <mc:Fallback xmlns="">
               <p:sp>
                 <p:nvSpPr>
                   <p:cNvPr id="44" name="TextBox 43"/>
@@ -26962,10 +26967,2401 @@
           </p:txBody>
         </p:sp>
       </p:grpSp>
+      <p:grpSp>
+        <p:nvGrpSpPr>
+          <p:cNvPr id="73" name="Group 72"/>
+          <p:cNvGrpSpPr/>
+          <p:nvPr/>
+        </p:nvGrpSpPr>
+        <p:grpSpPr>
+          <a:xfrm>
+            <a:off x="1634858" y="5002024"/>
+            <a:ext cx="4912640" cy="1178105"/>
+            <a:chOff x="2865863" y="5013576"/>
+            <a:chExt cx="4912640" cy="1178105"/>
+          </a:xfrm>
+        </p:grpSpPr>
+        <p:sp>
+          <p:nvSpPr>
+            <p:cNvPr id="2" name="Right Triangle 1"/>
+            <p:cNvSpPr/>
+            <p:nvPr/>
+          </p:nvSpPr>
+          <p:spPr>
+            <a:xfrm flipH="1">
+              <a:off x="4841755" y="5181359"/>
+              <a:ext cx="2936748" cy="1003609"/>
+            </a:xfrm>
+            <a:prstGeom prst="rtTriangle">
+              <a:avLst/>
+            </a:prstGeom>
+            <a:noFill/>
+            <a:ln w="38100">
+              <a:solidFill>
+                <a:schemeClr val="tx1"/>
+              </a:solidFill>
+            </a:ln>
+          </p:spPr>
+          <p:style>
+            <a:lnRef idx="2">
+              <a:schemeClr val="accent1">
+                <a:shade val="50000"/>
+              </a:schemeClr>
+            </a:lnRef>
+            <a:fillRef idx="1">
+              <a:schemeClr val="accent1"/>
+            </a:fillRef>
+            <a:effectRef idx="0">
+              <a:schemeClr val="accent1"/>
+            </a:effectRef>
+            <a:fontRef idx="minor">
+              <a:schemeClr val="lt1"/>
+            </a:fontRef>
+          </p:style>
+          <p:txBody>
+            <a:bodyPr rtlCol="0" anchor="ctr"/>
+            <a:lstStyle/>
+            <a:p>
+              <a:pPr algn="ctr"/>
+              <a:endParaRPr lang="en-US"/>
+            </a:p>
+          </p:txBody>
+        </p:sp>
+        <p:grpSp>
+          <p:nvGrpSpPr>
+            <p:cNvPr id="68" name="Group 67"/>
+            <p:cNvGrpSpPr/>
+            <p:nvPr/>
+          </p:nvGrpSpPr>
+          <p:grpSpPr>
+            <a:xfrm rot="20473929">
+              <a:off x="5862880" y="5017071"/>
+              <a:ext cx="819913" cy="621315"/>
+              <a:chOff x="7349026" y="5492337"/>
+              <a:chExt cx="819913" cy="621315"/>
+            </a:xfrm>
+          </p:grpSpPr>
+          <p:sp>
+            <p:nvSpPr>
+              <p:cNvPr id="11" name="Oval 10"/>
+              <p:cNvSpPr/>
+              <p:nvPr/>
+            </p:nvSpPr>
+            <p:spPr>
+              <a:xfrm>
+                <a:off x="7401083" y="5915182"/>
+                <a:ext cx="45719" cy="192526"/>
+              </a:xfrm>
+              <a:prstGeom prst="ellipse">
+                <a:avLst/>
+              </a:prstGeom>
+              <a:solidFill>
+                <a:schemeClr val="tx1"/>
+              </a:solidFill>
+              <a:ln w="38100">
+                <a:solidFill>
+                  <a:schemeClr val="tx1"/>
+                </a:solidFill>
+              </a:ln>
+            </p:spPr>
+            <p:style>
+              <a:lnRef idx="2">
+                <a:schemeClr val="accent1">
+                  <a:shade val="50000"/>
+                </a:schemeClr>
+              </a:lnRef>
+              <a:fillRef idx="1">
+                <a:schemeClr val="accent1"/>
+              </a:fillRef>
+              <a:effectRef idx="0">
+                <a:schemeClr val="accent1"/>
+              </a:effectRef>
+              <a:fontRef idx="minor">
+                <a:schemeClr val="lt1"/>
+              </a:fontRef>
+            </p:style>
+            <p:txBody>
+              <a:bodyPr rtlCol="0" anchor="ctr"/>
+              <a:lstStyle/>
+              <a:p>
+                <a:pPr algn="ctr"/>
+                <a:endParaRPr lang="en-US"/>
+              </a:p>
+            </p:txBody>
+          </p:sp>
+          <p:sp>
+            <p:nvSpPr>
+              <p:cNvPr id="48" name="Oval 47"/>
+              <p:cNvSpPr/>
+              <p:nvPr/>
+            </p:nvSpPr>
+            <p:spPr>
+              <a:xfrm>
+                <a:off x="8080725" y="5921126"/>
+                <a:ext cx="45719" cy="192526"/>
+              </a:xfrm>
+              <a:prstGeom prst="ellipse">
+                <a:avLst/>
+              </a:prstGeom>
+              <a:solidFill>
+                <a:schemeClr val="tx1"/>
+              </a:solidFill>
+              <a:ln w="38100">
+                <a:solidFill>
+                  <a:schemeClr val="tx1"/>
+                </a:solidFill>
+              </a:ln>
+            </p:spPr>
+            <p:style>
+              <a:lnRef idx="2">
+                <a:schemeClr val="accent1">
+                  <a:shade val="50000"/>
+                </a:schemeClr>
+              </a:lnRef>
+              <a:fillRef idx="1">
+                <a:schemeClr val="accent1"/>
+              </a:fillRef>
+              <a:effectRef idx="0">
+                <a:schemeClr val="accent1"/>
+              </a:effectRef>
+              <a:fontRef idx="minor">
+                <a:schemeClr val="lt1"/>
+              </a:fontRef>
+            </p:style>
+            <p:txBody>
+              <a:bodyPr rtlCol="0" anchor="ctr"/>
+              <a:lstStyle/>
+              <a:p>
+                <a:pPr algn="ctr"/>
+                <a:endParaRPr lang="en-US"/>
+              </a:p>
+            </p:txBody>
+          </p:sp>
+          <p:sp>
+            <p:nvSpPr>
+              <p:cNvPr id="52" name="Round Same Side Corner Rectangle 51"/>
+              <p:cNvSpPr/>
+              <p:nvPr/>
+            </p:nvSpPr>
+            <p:spPr>
+              <a:xfrm>
+                <a:off x="7349026" y="5683163"/>
+                <a:ext cx="819913" cy="289011"/>
+              </a:xfrm>
+              <a:prstGeom prst="round2SameRect">
+                <a:avLst>
+                  <a:gd name="adj1" fmla="val 36859"/>
+                  <a:gd name="adj2" fmla="val 0"/>
+                </a:avLst>
+              </a:prstGeom>
+              <a:solidFill>
+                <a:schemeClr val="accent1"/>
+              </a:solidFill>
+              <a:ln w="38100">
+                <a:solidFill>
+                  <a:schemeClr val="accent1"/>
+                </a:solidFill>
+              </a:ln>
+            </p:spPr>
+            <p:style>
+              <a:lnRef idx="2">
+                <a:schemeClr val="accent1">
+                  <a:shade val="50000"/>
+                </a:schemeClr>
+              </a:lnRef>
+              <a:fillRef idx="1">
+                <a:schemeClr val="accent1"/>
+              </a:fillRef>
+              <a:effectRef idx="0">
+                <a:schemeClr val="accent1"/>
+              </a:effectRef>
+              <a:fontRef idx="minor">
+                <a:schemeClr val="lt1"/>
+              </a:fontRef>
+            </p:style>
+            <p:txBody>
+              <a:bodyPr rtlCol="0" anchor="ctr"/>
+              <a:lstStyle/>
+              <a:p>
+                <a:pPr algn="ctr"/>
+                <a:endParaRPr lang="en-US"/>
+              </a:p>
+            </p:txBody>
+          </p:sp>
+          <p:sp>
+            <p:nvSpPr>
+              <p:cNvPr id="22" name="Oval 21"/>
+              <p:cNvSpPr/>
+              <p:nvPr/>
+            </p:nvSpPr>
+            <p:spPr>
+              <a:xfrm>
+                <a:off x="7423895" y="5753818"/>
+                <a:ext cx="45719" cy="105617"/>
+              </a:xfrm>
+              <a:prstGeom prst="ellipse">
+                <a:avLst/>
+              </a:prstGeom>
+              <a:solidFill>
+                <a:srgbClr val="FF0000"/>
+              </a:solidFill>
+              <a:ln w="38100">
+                <a:solidFill>
+                  <a:srgbClr val="FF0000"/>
+                </a:solidFill>
+              </a:ln>
+            </p:spPr>
+            <p:style>
+              <a:lnRef idx="2">
+                <a:schemeClr val="accent1">
+                  <a:shade val="50000"/>
+                </a:schemeClr>
+              </a:lnRef>
+              <a:fillRef idx="1">
+                <a:schemeClr val="accent1"/>
+              </a:fillRef>
+              <a:effectRef idx="0">
+                <a:schemeClr val="accent1"/>
+              </a:effectRef>
+              <a:fontRef idx="minor">
+                <a:schemeClr val="lt1"/>
+              </a:fontRef>
+            </p:style>
+            <p:txBody>
+              <a:bodyPr rtlCol="0" anchor="ctr"/>
+              <a:lstStyle/>
+              <a:p>
+                <a:pPr algn="ctr"/>
+                <a:endParaRPr lang="en-US"/>
+              </a:p>
+            </p:txBody>
+          </p:sp>
+          <p:sp>
+            <p:nvSpPr>
+              <p:cNvPr id="49" name="Oval 48"/>
+              <p:cNvSpPr/>
+              <p:nvPr/>
+            </p:nvSpPr>
+            <p:spPr>
+              <a:xfrm>
+                <a:off x="8043464" y="5753818"/>
+                <a:ext cx="45719" cy="105617"/>
+              </a:xfrm>
+              <a:prstGeom prst="ellipse">
+                <a:avLst/>
+              </a:prstGeom>
+              <a:solidFill>
+                <a:srgbClr val="FF0000"/>
+              </a:solidFill>
+              <a:ln w="38100">
+                <a:solidFill>
+                  <a:srgbClr val="FF0000"/>
+                </a:solidFill>
+              </a:ln>
+            </p:spPr>
+            <p:style>
+              <a:lnRef idx="2">
+                <a:schemeClr val="accent1">
+                  <a:shade val="50000"/>
+                </a:schemeClr>
+              </a:lnRef>
+              <a:fillRef idx="1">
+                <a:schemeClr val="accent1"/>
+              </a:fillRef>
+              <a:effectRef idx="0">
+                <a:schemeClr val="accent1"/>
+              </a:effectRef>
+              <a:fontRef idx="minor">
+                <a:schemeClr val="lt1"/>
+              </a:fontRef>
+            </p:style>
+            <p:txBody>
+              <a:bodyPr rtlCol="0" anchor="ctr"/>
+              <a:lstStyle/>
+              <a:p>
+                <a:pPr algn="ctr"/>
+                <a:endParaRPr lang="en-US"/>
+              </a:p>
+            </p:txBody>
+          </p:sp>
+          <p:sp>
+            <p:nvSpPr>
+              <p:cNvPr id="53" name="Trapezoid 52"/>
+              <p:cNvSpPr/>
+              <p:nvPr/>
+            </p:nvSpPr>
+            <p:spPr>
+              <a:xfrm>
+                <a:off x="7427423" y="5492337"/>
+                <a:ext cx="656783" cy="176262"/>
+              </a:xfrm>
+              <a:prstGeom prst="trapezoid">
+                <a:avLst/>
+              </a:prstGeom>
+              <a:noFill/>
+              <a:ln w="38100">
+                <a:solidFill>
+                  <a:schemeClr val="accent1"/>
+                </a:solidFill>
+              </a:ln>
+            </p:spPr>
+            <p:style>
+              <a:lnRef idx="2">
+                <a:schemeClr val="accent1">
+                  <a:shade val="50000"/>
+                </a:schemeClr>
+              </a:lnRef>
+              <a:fillRef idx="1">
+                <a:schemeClr val="accent1"/>
+              </a:fillRef>
+              <a:effectRef idx="0">
+                <a:schemeClr val="accent1"/>
+              </a:effectRef>
+              <a:fontRef idx="minor">
+                <a:schemeClr val="lt1"/>
+              </a:fontRef>
+            </p:style>
+            <p:txBody>
+              <a:bodyPr rtlCol="0" anchor="ctr"/>
+              <a:lstStyle/>
+              <a:p>
+                <a:pPr algn="ctr"/>
+                <a:endParaRPr lang="en-US"/>
+              </a:p>
+            </p:txBody>
+          </p:sp>
+          <p:sp>
+            <p:nvSpPr>
+              <p:cNvPr id="54" name="Rectangle 53"/>
+              <p:cNvSpPr/>
+              <p:nvPr/>
+            </p:nvSpPr>
+            <p:spPr>
+              <a:xfrm>
+                <a:off x="7616407" y="5792216"/>
+                <a:ext cx="215285" cy="97494"/>
+              </a:xfrm>
+              <a:prstGeom prst="rect">
+                <a:avLst/>
+              </a:prstGeom>
+              <a:solidFill>
+                <a:schemeClr val="bg1"/>
+              </a:solidFill>
+              <a:ln w="38100">
+                <a:solidFill>
+                  <a:schemeClr val="bg1"/>
+                </a:solidFill>
+              </a:ln>
+            </p:spPr>
+            <p:style>
+              <a:lnRef idx="2">
+                <a:schemeClr val="accent1">
+                  <a:shade val="50000"/>
+                </a:schemeClr>
+              </a:lnRef>
+              <a:fillRef idx="1">
+                <a:schemeClr val="accent1"/>
+              </a:fillRef>
+              <a:effectRef idx="0">
+                <a:schemeClr val="accent1"/>
+              </a:effectRef>
+              <a:fontRef idx="minor">
+                <a:schemeClr val="lt1"/>
+              </a:fontRef>
+            </p:style>
+            <p:txBody>
+              <a:bodyPr rtlCol="0" anchor="ctr"/>
+              <a:lstStyle/>
+              <a:p>
+                <a:pPr algn="ctr"/>
+                <a:endParaRPr lang="en-US"/>
+              </a:p>
+            </p:txBody>
+          </p:sp>
+          <p:sp>
+            <p:nvSpPr>
+              <p:cNvPr id="18" name="TextBox 17"/>
+              <p:cNvSpPr txBox="1"/>
+              <p:nvPr/>
+            </p:nvSpPr>
+            <p:spPr>
+              <a:xfrm>
+                <a:off x="7556479" y="5733965"/>
+                <a:ext cx="379310" cy="99481"/>
+              </a:xfrm>
+              <a:prstGeom prst="rect">
+                <a:avLst/>
+              </a:prstGeom>
+              <a:noFill/>
+            </p:spPr>
+            <p:txBody>
+              <a:bodyPr wrap="none" rtlCol="0">
+                <a:noAutofit/>
+              </a:bodyPr>
+              <a:lstStyle/>
+              <a:p>
+                <a:r>
+                  <a:rPr lang="en-US" sz="400" dirty="0" smtClean="0">
+                    <a:latin typeface="Arial" panose="020B0604020202020204" pitchFamily="34" charset="0"/>
+                    <a:cs typeface="Arial" panose="020B0604020202020204" pitchFamily="34" charset="0"/>
+                  </a:rPr>
+                  <a:t>   VD</a:t>
+                </a:r>
+              </a:p>
+              <a:p>
+                <a:r>
+                  <a:rPr lang="en-US" sz="400" dirty="0" smtClean="0">
+                    <a:latin typeface="Arial" panose="020B0604020202020204" pitchFamily="34" charset="0"/>
+                    <a:cs typeface="Arial" panose="020B0604020202020204" pitchFamily="34" charset="0"/>
+                  </a:rPr>
+                  <a:t>12345</a:t>
+                </a:r>
+                <a:endParaRPr lang="en-US" sz="400" dirty="0" smtClean="0">
+                  <a:latin typeface="Arial" panose="020B0604020202020204" pitchFamily="34" charset="0"/>
+                  <a:cs typeface="Arial" panose="020B0604020202020204" pitchFamily="34" charset="0"/>
+                </a:endParaRPr>
+              </a:p>
+            </p:txBody>
+          </p:sp>
+          <p:sp>
+            <p:nvSpPr>
+              <p:cNvPr id="64" name="Rectangle 63"/>
+              <p:cNvSpPr/>
+              <p:nvPr/>
+            </p:nvSpPr>
+            <p:spPr>
+              <a:xfrm>
+                <a:off x="7615378" y="5793354"/>
+                <a:ext cx="45719" cy="45719"/>
+              </a:xfrm>
+              <a:prstGeom prst="rect">
+                <a:avLst/>
+              </a:prstGeom>
+              <a:solidFill>
+                <a:srgbClr val="FF0000"/>
+              </a:solidFill>
+              <a:ln w="9525">
+                <a:solidFill>
+                  <a:srgbClr val="FF0000"/>
+                </a:solidFill>
+              </a:ln>
+            </p:spPr>
+            <p:style>
+              <a:lnRef idx="2">
+                <a:schemeClr val="accent1">
+                  <a:shade val="50000"/>
+                </a:schemeClr>
+              </a:lnRef>
+              <a:fillRef idx="1">
+                <a:schemeClr val="accent1"/>
+              </a:fillRef>
+              <a:effectRef idx="0">
+                <a:schemeClr val="accent1"/>
+              </a:effectRef>
+              <a:fontRef idx="minor">
+                <a:schemeClr val="lt1"/>
+              </a:fontRef>
+            </p:style>
+            <p:txBody>
+              <a:bodyPr rtlCol="0" anchor="ctr"/>
+              <a:lstStyle/>
+              <a:p>
+                <a:pPr algn="ctr"/>
+                <a:endParaRPr lang="en-US"/>
+              </a:p>
+            </p:txBody>
+          </p:sp>
+          <p:sp>
+            <p:nvSpPr>
+              <p:cNvPr id="65" name="Plus 64"/>
+              <p:cNvSpPr/>
+              <p:nvPr/>
+            </p:nvSpPr>
+            <p:spPr>
+              <a:xfrm>
+                <a:off x="7612997" y="5792216"/>
+                <a:ext cx="45719" cy="45719"/>
+              </a:xfrm>
+              <a:prstGeom prst="mathPlus">
+                <a:avLst/>
+              </a:prstGeom>
+              <a:solidFill>
+                <a:schemeClr val="bg1"/>
+              </a:solidFill>
+              <a:ln w="6350">
+                <a:solidFill>
+                  <a:schemeClr val="bg1"/>
+                </a:solidFill>
+              </a:ln>
+            </p:spPr>
+            <p:style>
+              <a:lnRef idx="2">
+                <a:schemeClr val="accent1">
+                  <a:shade val="50000"/>
+                </a:schemeClr>
+              </a:lnRef>
+              <a:fillRef idx="1">
+                <a:schemeClr val="accent1"/>
+              </a:fillRef>
+              <a:effectRef idx="0">
+                <a:schemeClr val="accent1"/>
+              </a:effectRef>
+              <a:fontRef idx="minor">
+                <a:schemeClr val="lt1"/>
+              </a:fontRef>
+            </p:style>
+            <p:txBody>
+              <a:bodyPr rtlCol="0" anchor="ctr"/>
+              <a:lstStyle/>
+              <a:p>
+                <a:pPr algn="ctr"/>
+                <a:endParaRPr lang="en-US"/>
+              </a:p>
+            </p:txBody>
+          </p:sp>
+          <p:sp>
+            <p:nvSpPr>
+              <p:cNvPr id="66" name="Rectangle 65"/>
+              <p:cNvSpPr/>
+              <p:nvPr/>
+            </p:nvSpPr>
+            <p:spPr>
+              <a:xfrm>
+                <a:off x="7778049" y="5788881"/>
+                <a:ext cx="48100" cy="52387"/>
+              </a:xfrm>
+              <a:prstGeom prst="rect">
+                <a:avLst/>
+              </a:prstGeom>
+              <a:solidFill>
+                <a:schemeClr val="accent6"/>
+              </a:solidFill>
+              <a:ln w="3175">
+                <a:solidFill>
+                  <a:schemeClr val="accent6"/>
+                </a:solidFill>
+              </a:ln>
+            </p:spPr>
+            <p:style>
+              <a:lnRef idx="2">
+                <a:schemeClr val="accent1">
+                  <a:shade val="50000"/>
+                </a:schemeClr>
+              </a:lnRef>
+              <a:fillRef idx="1">
+                <a:schemeClr val="accent1"/>
+              </a:fillRef>
+              <a:effectRef idx="0">
+                <a:schemeClr val="accent1"/>
+              </a:effectRef>
+              <a:fontRef idx="minor">
+                <a:schemeClr val="lt1"/>
+              </a:fontRef>
+            </p:style>
+            <p:txBody>
+              <a:bodyPr rtlCol="0" anchor="ctr"/>
+              <a:lstStyle/>
+              <a:p>
+                <a:pPr algn="ctr"/>
+                <a:endParaRPr lang="en-US"/>
+              </a:p>
+            </p:txBody>
+          </p:sp>
+          <p:sp>
+            <p:nvSpPr>
+              <p:cNvPr id="67" name="Rectangle 66"/>
+              <p:cNvSpPr/>
+              <p:nvPr/>
+            </p:nvSpPr>
+            <p:spPr>
+              <a:xfrm>
+                <a:off x="7771154" y="5772297"/>
+                <a:ext cx="59758" cy="45719"/>
+              </a:xfrm>
+              <a:prstGeom prst="rect">
+                <a:avLst/>
+              </a:prstGeom>
+              <a:solidFill>
+                <a:schemeClr val="bg1"/>
+              </a:solidFill>
+              <a:ln w="0">
+                <a:solidFill>
+                  <a:schemeClr val="bg1"/>
+                </a:solidFill>
+              </a:ln>
+            </p:spPr>
+            <p:style>
+              <a:lnRef idx="2">
+                <a:schemeClr val="accent1">
+                  <a:shade val="50000"/>
+                </a:schemeClr>
+              </a:lnRef>
+              <a:fillRef idx="1">
+                <a:schemeClr val="accent1"/>
+              </a:fillRef>
+              <a:effectRef idx="0">
+                <a:schemeClr val="accent1"/>
+              </a:effectRef>
+              <a:fontRef idx="minor">
+                <a:schemeClr val="lt1"/>
+              </a:fontRef>
+            </p:style>
+            <p:txBody>
+              <a:bodyPr rtlCol="0" anchor="ctr"/>
+              <a:lstStyle/>
+              <a:p>
+                <a:pPr algn="ctr"/>
+                <a:endParaRPr lang="en-US"/>
+              </a:p>
+            </p:txBody>
+          </p:sp>
+        </p:grpSp>
+        <mc:AlternateContent xmlns:mc="http://schemas.openxmlformats.org/markup-compatibility/2006">
+          <mc:Choice xmlns:a14="http://schemas.microsoft.com/office/drawing/2010/main" Requires="a14">
+            <p:sp>
+              <p:nvSpPr>
+                <p:cNvPr id="69" name="TextBox 68"/>
+                <p:cNvSpPr txBox="1"/>
+                <p:nvPr/>
+              </p:nvSpPr>
+              <p:spPr>
+                <a:xfrm>
+                  <a:off x="5680819" y="5883904"/>
+                  <a:ext cx="222304" cy="307777"/>
+                </a:xfrm>
+                <a:prstGeom prst="rect">
+                  <a:avLst/>
+                </a:prstGeom>
+                <a:noFill/>
+              </p:spPr>
+              <p:txBody>
+                <a:bodyPr wrap="none" lIns="0" tIns="0" rIns="0" bIns="0" rtlCol="0">
+                  <a:spAutoFit/>
+                </a:bodyPr>
+                <a:lstStyle/>
+                <a:p>
+                  <a14:m>
+                    <m:oMathPara xmlns:m="http://schemas.openxmlformats.org/officeDocument/2006/math">
+                      <m:oMathParaPr>
+                        <m:jc m:val="centerGroup"/>
+                      </m:oMathParaPr>
+                      <m:oMath xmlns:m="http://schemas.openxmlformats.org/officeDocument/2006/math">
+                        <m:r>
+                          <a:rPr lang="en-US" sz="2000" b="0" i="1" smtClean="0">
+                            <a:latin typeface="Cambria Math" panose="02040503050406030204" pitchFamily="18" charset="0"/>
+                            <a:cs typeface="Arial" panose="020B0604020202020204" pitchFamily="34" charset="0"/>
+                          </a:rPr>
+                          <m:t>𝜃</m:t>
+                        </m:r>
+                      </m:oMath>
+                    </m:oMathPara>
+                  </a14:m>
+                  <a:endParaRPr lang="en-US" sz="2000" dirty="0" smtClean="0">
+                    <a:latin typeface="Arial" panose="020B0604020202020204" pitchFamily="34" charset="0"/>
+                    <a:cs typeface="Arial" panose="020B0604020202020204" pitchFamily="34" charset="0"/>
+                  </a:endParaRPr>
+                </a:p>
+              </p:txBody>
+            </p:sp>
+          </mc:Choice>
+          <mc:Fallback>
+            <p:sp>
+              <p:nvSpPr>
+                <p:cNvPr id="69" name="TextBox 68"/>
+                <p:cNvSpPr txBox="1">
+                  <a:spLocks noRot="1" noChangeAspect="1" noMove="1" noResize="1" noEditPoints="1" noAdjustHandles="1" noChangeArrowheads="1" noChangeShapeType="1" noTextEdit="1"/>
+                </p:cNvSpPr>
+                <p:nvPr/>
+              </p:nvSpPr>
+              <p:spPr>
+                <a:xfrm>
+                  <a:off x="5680819" y="5883904"/>
+                  <a:ext cx="222304" cy="307777"/>
+                </a:xfrm>
+                <a:prstGeom prst="rect">
+                  <a:avLst/>
+                </a:prstGeom>
+                <a:blipFill>
+                  <a:blip r:embed="rId51"/>
+                  <a:stretch>
+                    <a:fillRect l="-25000" r="-25000" b="-9804"/>
+                  </a:stretch>
+                </a:blipFill>
+              </p:spPr>
+              <p:txBody>
+                <a:bodyPr/>
+                <a:lstStyle/>
+                <a:p>
+                  <a:r>
+                    <a:rPr lang="en-US">
+                      <a:noFill/>
+                    </a:rPr>
+                    <a:t> </a:t>
+                  </a:r>
+                </a:p>
+              </p:txBody>
+            </p:sp>
+          </mc:Fallback>
+        </mc:AlternateContent>
+        <p:cxnSp>
+          <p:nvCxnSpPr>
+            <p:cNvPr id="70" name="Straight Connector 69"/>
+            <p:cNvCxnSpPr/>
+            <p:nvPr/>
+          </p:nvCxnSpPr>
+          <p:spPr>
+            <a:xfrm>
+              <a:off x="2865863" y="5374266"/>
+              <a:ext cx="2973914" cy="4543"/>
+            </a:xfrm>
+            <a:prstGeom prst="line">
+              <a:avLst/>
+            </a:prstGeom>
+            <a:ln w="38100">
+              <a:solidFill>
+                <a:schemeClr val="tx1"/>
+              </a:solidFill>
+              <a:prstDash val="sysDot"/>
+            </a:ln>
+          </p:spPr>
+          <p:style>
+            <a:lnRef idx="1">
+              <a:schemeClr val="accent1"/>
+            </a:lnRef>
+            <a:fillRef idx="0">
+              <a:schemeClr val="accent1"/>
+            </a:fillRef>
+            <a:effectRef idx="0">
+              <a:schemeClr val="accent1"/>
+            </a:effectRef>
+            <a:fontRef idx="minor">
+              <a:schemeClr val="tx1"/>
+            </a:fontRef>
+          </p:style>
+        </p:cxnSp>
+        <mc:AlternateContent xmlns:mc="http://schemas.openxmlformats.org/markup-compatibility/2006">
+          <mc:Choice xmlns:a14="http://schemas.microsoft.com/office/drawing/2010/main" Requires="a14">
+            <p:sp>
+              <p:nvSpPr>
+                <p:cNvPr id="72" name="TextBox 71"/>
+                <p:cNvSpPr txBox="1"/>
+                <p:nvPr/>
+              </p:nvSpPr>
+              <p:spPr>
+                <a:xfrm>
+                  <a:off x="4318570" y="5013576"/>
+                  <a:ext cx="241540" cy="307777"/>
+                </a:xfrm>
+                <a:prstGeom prst="rect">
+                  <a:avLst/>
+                </a:prstGeom>
+                <a:noFill/>
+              </p:spPr>
+              <p:txBody>
+                <a:bodyPr wrap="none" lIns="0" tIns="0" rIns="0" bIns="0" rtlCol="0">
+                  <a:spAutoFit/>
+                </a:bodyPr>
+                <a:lstStyle/>
+                <a:p>
+                  <a:pPr/>
+                  <a14:m>
+                    <m:oMathPara xmlns:m="http://schemas.openxmlformats.org/officeDocument/2006/math">
+                      <m:oMathParaPr>
+                        <m:jc m:val="centerGroup"/>
+                      </m:oMathParaPr>
+                      <m:oMath xmlns:m="http://schemas.openxmlformats.org/officeDocument/2006/math">
+                        <m:r>
+                          <a:rPr lang="en-US" sz="2000" b="0" i="1" smtClean="0">
+                            <a:latin typeface="Cambria Math" panose="02040503050406030204" pitchFamily="18" charset="0"/>
+                            <a:cs typeface="Arial" panose="020B0604020202020204" pitchFamily="34" charset="0"/>
+                          </a:rPr>
+                          <m:t>𝑅</m:t>
+                        </m:r>
+                      </m:oMath>
+                    </m:oMathPara>
+                  </a14:m>
+                  <a:endParaRPr lang="en-US" sz="2000" dirty="0" smtClean="0">
+                    <a:latin typeface="Arial" panose="020B0604020202020204" pitchFamily="34" charset="0"/>
+                    <a:cs typeface="Arial" panose="020B0604020202020204" pitchFamily="34" charset="0"/>
+                  </a:endParaRPr>
+                </a:p>
+              </p:txBody>
+            </p:sp>
+          </mc:Choice>
+          <mc:Fallback>
+            <p:sp>
+              <p:nvSpPr>
+                <p:cNvPr id="72" name="TextBox 71"/>
+                <p:cNvSpPr txBox="1">
+                  <a:spLocks noRot="1" noChangeAspect="1" noMove="1" noResize="1" noEditPoints="1" noAdjustHandles="1" noChangeArrowheads="1" noChangeShapeType="1" noTextEdit="1"/>
+                </p:cNvSpPr>
+                <p:nvPr/>
+              </p:nvSpPr>
+              <p:spPr>
+                <a:xfrm>
+                  <a:off x="4318570" y="5013576"/>
+                  <a:ext cx="241540" cy="307777"/>
+                </a:xfrm>
+                <a:prstGeom prst="rect">
+                  <a:avLst/>
+                </a:prstGeom>
+                <a:blipFill>
+                  <a:blip r:embed="rId52"/>
+                  <a:stretch>
+                    <a:fillRect l="-20000" r="-20000" b="-10000"/>
+                  </a:stretch>
+                </a:blipFill>
+              </p:spPr>
+              <p:txBody>
+                <a:bodyPr/>
+                <a:lstStyle/>
+                <a:p>
+                  <a:r>
+                    <a:rPr lang="en-US">
+                      <a:noFill/>
+                    </a:rPr>
+                    <a:t> </a:t>
+                  </a:r>
+                </a:p>
+              </p:txBody>
+            </p:sp>
+          </mc:Fallback>
+        </mc:AlternateContent>
+      </p:grpSp>
+      <p:grpSp>
+        <p:nvGrpSpPr>
+          <p:cNvPr id="110" name="Group 109"/>
+          <p:cNvGrpSpPr/>
+          <p:nvPr/>
+        </p:nvGrpSpPr>
+        <p:grpSpPr>
+          <a:xfrm>
+            <a:off x="9122960" y="3557386"/>
+            <a:ext cx="2257498" cy="3057192"/>
+            <a:chOff x="9122960" y="3557386"/>
+            <a:chExt cx="2257498" cy="3057192"/>
+          </a:xfrm>
+        </p:grpSpPr>
+        <p:grpSp>
+          <p:nvGrpSpPr>
+            <p:cNvPr id="103" name="Group 102"/>
+            <p:cNvGrpSpPr/>
+            <p:nvPr/>
+          </p:nvGrpSpPr>
+          <p:grpSpPr>
+            <a:xfrm>
+              <a:off x="9122960" y="3557386"/>
+              <a:ext cx="1897613" cy="3057192"/>
+              <a:chOff x="9122960" y="3557386"/>
+              <a:chExt cx="1897613" cy="3057192"/>
+            </a:xfrm>
+          </p:grpSpPr>
+          <p:grpSp>
+            <p:nvGrpSpPr>
+              <p:cNvPr id="75" name="Group 74"/>
+              <p:cNvGrpSpPr/>
+              <p:nvPr/>
+            </p:nvGrpSpPr>
+            <p:grpSpPr>
+              <a:xfrm>
+                <a:off x="9122960" y="3557386"/>
+                <a:ext cx="1897613" cy="3057192"/>
+                <a:chOff x="8558589" y="1940914"/>
+                <a:chExt cx="1897613" cy="3057192"/>
+              </a:xfrm>
+            </p:grpSpPr>
+            <p:sp>
+              <p:nvSpPr>
+                <p:cNvPr id="77" name="Oval 76"/>
+                <p:cNvSpPr/>
+                <p:nvPr/>
+              </p:nvSpPr>
+              <p:spPr>
+                <a:xfrm>
+                  <a:off x="9986883" y="3321986"/>
+                  <a:ext cx="120943" cy="119766"/>
+                </a:xfrm>
+                <a:prstGeom prst="ellipse">
+                  <a:avLst/>
+                </a:prstGeom>
+                <a:solidFill>
+                  <a:schemeClr val="tx1"/>
+                </a:solidFill>
+                <a:ln w="38100">
+                  <a:solidFill>
+                    <a:schemeClr val="tx1"/>
+                  </a:solidFill>
+                </a:ln>
+              </p:spPr>
+              <p:style>
+                <a:lnRef idx="2">
+                  <a:schemeClr val="accent1">
+                    <a:shade val="50000"/>
+                  </a:schemeClr>
+                </a:lnRef>
+                <a:fillRef idx="1">
+                  <a:schemeClr val="accent1"/>
+                </a:fillRef>
+                <a:effectRef idx="0">
+                  <a:schemeClr val="accent1"/>
+                </a:effectRef>
+                <a:fontRef idx="minor">
+                  <a:schemeClr val="lt1"/>
+                </a:fontRef>
+              </p:style>
+              <p:txBody>
+                <a:bodyPr rtlCol="0" anchor="ctr"/>
+                <a:lstStyle/>
+                <a:p>
+                  <a:pPr algn="ctr"/>
+                  <a:endParaRPr lang="en-US"/>
+                </a:p>
+              </p:txBody>
+            </p:sp>
+            <p:cxnSp>
+              <p:nvCxnSpPr>
+                <p:cNvPr id="78" name="Straight Arrow Connector 77"/>
+                <p:cNvCxnSpPr/>
+                <p:nvPr/>
+              </p:nvCxnSpPr>
+              <p:spPr>
+                <a:xfrm flipH="1">
+                  <a:off x="9545682" y="3419706"/>
+                  <a:ext cx="441523" cy="301294"/>
+                </a:xfrm>
+                <a:prstGeom prst="straightConnector1">
+                  <a:avLst/>
+                </a:prstGeom>
+                <a:ln w="38100">
+                  <a:solidFill>
+                    <a:schemeClr val="tx1"/>
+                  </a:solidFill>
+                  <a:prstDash val="sysDot"/>
+                  <a:tailEnd type="triangle"/>
+                </a:ln>
+              </p:spPr>
+              <p:style>
+                <a:lnRef idx="1">
+                  <a:schemeClr val="accent1"/>
+                </a:lnRef>
+                <a:fillRef idx="0">
+                  <a:schemeClr val="accent1"/>
+                </a:fillRef>
+                <a:effectRef idx="0">
+                  <a:schemeClr val="accent1"/>
+                </a:effectRef>
+                <a:fontRef idx="minor">
+                  <a:schemeClr val="tx1"/>
+                </a:fontRef>
+              </p:style>
+            </p:cxnSp>
+            <p:cxnSp>
+              <p:nvCxnSpPr>
+                <p:cNvPr id="79" name="Straight Arrow Connector 78"/>
+                <p:cNvCxnSpPr/>
+                <p:nvPr/>
+              </p:nvCxnSpPr>
+              <p:spPr>
+                <a:xfrm flipH="1">
+                  <a:off x="10040393" y="3435406"/>
+                  <a:ext cx="7135" cy="796601"/>
+                </a:xfrm>
+                <a:prstGeom prst="straightConnector1">
+                  <a:avLst/>
+                </a:prstGeom>
+                <a:ln w="38100">
+                  <a:solidFill>
+                    <a:schemeClr val="tx1"/>
+                  </a:solidFill>
+                  <a:tailEnd type="triangle"/>
+                </a:ln>
+              </p:spPr>
+              <p:style>
+                <a:lnRef idx="1">
+                  <a:schemeClr val="accent1"/>
+                </a:lnRef>
+                <a:fillRef idx="0">
+                  <a:schemeClr val="accent1"/>
+                </a:fillRef>
+                <a:effectRef idx="0">
+                  <a:schemeClr val="accent1"/>
+                </a:effectRef>
+                <a:fontRef idx="minor">
+                  <a:schemeClr val="tx1"/>
+                </a:fontRef>
+              </p:style>
+            </p:cxnSp>
+            <p:cxnSp>
+              <p:nvCxnSpPr>
+                <p:cNvPr id="80" name="Straight Arrow Connector 79"/>
+                <p:cNvCxnSpPr/>
+                <p:nvPr/>
+              </p:nvCxnSpPr>
+              <p:spPr>
+                <a:xfrm flipH="1" flipV="1">
+                  <a:off x="9546003" y="2546408"/>
+                  <a:ext cx="501351" cy="814704"/>
+                </a:xfrm>
+                <a:prstGeom prst="straightConnector1">
+                  <a:avLst/>
+                </a:prstGeom>
+                <a:ln w="38100">
+                  <a:solidFill>
+                    <a:schemeClr val="tx1"/>
+                  </a:solidFill>
+                  <a:tailEnd type="triangle"/>
+                </a:ln>
+              </p:spPr>
+              <p:style>
+                <a:lnRef idx="1">
+                  <a:schemeClr val="accent1"/>
+                </a:lnRef>
+                <a:fillRef idx="0">
+                  <a:schemeClr val="accent1"/>
+                </a:fillRef>
+                <a:effectRef idx="0">
+                  <a:schemeClr val="accent1"/>
+                </a:effectRef>
+                <a:fontRef idx="minor">
+                  <a:schemeClr val="tx1"/>
+                </a:fontRef>
+              </p:style>
+            </p:cxnSp>
+            <mc:AlternateContent xmlns:mc="http://schemas.openxmlformats.org/markup-compatibility/2006">
+              <mc:Choice xmlns:a14="http://schemas.microsoft.com/office/drawing/2010/main" Requires="a14">
+                <p:sp>
+                  <p:nvSpPr>
+                    <p:cNvPr id="81" name="TextBox 80"/>
+                    <p:cNvSpPr txBox="1"/>
+                    <p:nvPr/>
+                  </p:nvSpPr>
+                  <p:spPr>
+                    <a:xfrm>
+                      <a:off x="9148346" y="3463365"/>
+                      <a:ext cx="267381" cy="354071"/>
+                    </a:xfrm>
+                    <a:prstGeom prst="rect">
+                      <a:avLst/>
+                    </a:prstGeom>
+                    <a:noFill/>
+                  </p:spPr>
+                  <p:txBody>
+                    <a:bodyPr wrap="none" lIns="0" tIns="0" rIns="0" bIns="0" rtlCol="0">
+                      <a:spAutoFit/>
+                    </a:bodyPr>
+                    <a:lstStyle/>
+                    <a:p>
+                      <a:pPr/>
+                      <a14:m>
+                        <m:oMathPara xmlns:m="http://schemas.openxmlformats.org/officeDocument/2006/math">
+                          <m:oMathParaPr>
+                            <m:jc m:val="centerGroup"/>
+                          </m:oMathParaPr>
+                          <m:oMath xmlns:m="http://schemas.openxmlformats.org/officeDocument/2006/math">
+                            <m:sSub>
+                              <m:sSubPr>
+                                <m:ctrlPr>
+                                  <a:rPr lang="en-US" sz="2000" b="0" i="1" smtClean="0">
+                                    <a:latin typeface="Cambria Math" panose="02040503050406030204" pitchFamily="18" charset="0"/>
+                                    <a:cs typeface="Arial" panose="020B0604020202020204" pitchFamily="34" charset="0"/>
+                                  </a:rPr>
+                                </m:ctrlPr>
+                              </m:sSubPr>
+                              <m:e>
+                                <m:acc>
+                                  <m:accPr>
+                                    <m:chr m:val="⃗"/>
+                                    <m:ctrlPr>
+                                      <a:rPr lang="en-US" sz="2000" b="0" i="1" smtClean="0">
+                                        <a:latin typeface="Cambria Math" panose="02040503050406030204" pitchFamily="18" charset="0"/>
+                                        <a:cs typeface="Arial" panose="020B0604020202020204" pitchFamily="34" charset="0"/>
+                                      </a:rPr>
+                                    </m:ctrlPr>
+                                  </m:accPr>
+                                  <m:e>
+                                    <m:r>
+                                      <a:rPr lang="en-US" sz="2000" b="0" i="1" smtClean="0">
+                                        <a:latin typeface="Cambria Math" panose="02040503050406030204" pitchFamily="18" charset="0"/>
+                                        <a:cs typeface="Arial" panose="020B0604020202020204" pitchFamily="34" charset="0"/>
+                                      </a:rPr>
+                                      <m:t>𝑓</m:t>
+                                    </m:r>
+                                  </m:e>
+                                </m:acc>
+                              </m:e>
+                              <m:sub>
+                                <m:r>
+                                  <a:rPr lang="en-US" sz="2000" b="0" i="1" smtClean="0">
+                                    <a:latin typeface="Cambria Math" panose="02040503050406030204" pitchFamily="18" charset="0"/>
+                                    <a:cs typeface="Arial" panose="020B0604020202020204" pitchFamily="34" charset="0"/>
+                                  </a:rPr>
+                                  <m:t>𝑠</m:t>
+                                </m:r>
+                              </m:sub>
+                            </m:sSub>
+                          </m:oMath>
+                        </m:oMathPara>
+                      </a14:m>
+                      <a:endParaRPr lang="en-US" sz="2000" dirty="0">
+                        <a:latin typeface="Arial" panose="020B0604020202020204" pitchFamily="34" charset="0"/>
+                        <a:cs typeface="Arial" panose="020B0604020202020204" pitchFamily="34" charset="0"/>
+                      </a:endParaRPr>
+                    </a:p>
+                  </p:txBody>
+                </p:sp>
+              </mc:Choice>
+              <mc:Fallback>
+                <p:sp>
+                  <p:nvSpPr>
+                    <p:cNvPr id="81" name="TextBox 80"/>
+                    <p:cNvSpPr txBox="1">
+                      <a:spLocks noRot="1" noChangeAspect="1" noMove="1" noResize="1" noEditPoints="1" noAdjustHandles="1" noChangeArrowheads="1" noChangeShapeType="1" noTextEdit="1"/>
+                    </p:cNvSpPr>
+                    <p:nvPr/>
+                  </p:nvSpPr>
+                  <p:spPr>
+                    <a:xfrm>
+                      <a:off x="9148346" y="3463365"/>
+                      <a:ext cx="267381" cy="354071"/>
+                    </a:xfrm>
+                    <a:prstGeom prst="rect">
+                      <a:avLst/>
+                    </a:prstGeom>
+                    <a:blipFill>
+                      <a:blip r:embed="rId53"/>
+                      <a:stretch>
+                        <a:fillRect l="-29545" t="-32759" r="-84091" b="-32759"/>
+                      </a:stretch>
+                    </a:blipFill>
+                  </p:spPr>
+                  <p:txBody>
+                    <a:bodyPr/>
+                    <a:lstStyle/>
+                    <a:p>
+                      <a:r>
+                        <a:rPr lang="en-US">
+                          <a:noFill/>
+                        </a:rPr>
+                        <a:t> </a:t>
+                      </a:r>
+                    </a:p>
+                  </p:txBody>
+                </p:sp>
+              </mc:Fallback>
+            </mc:AlternateContent>
+            <mc:AlternateContent xmlns:mc="http://schemas.openxmlformats.org/markup-compatibility/2006" xmlns:a14="http://schemas.microsoft.com/office/drawing/2010/main">
+              <mc:Choice Requires="a14">
+                <p:sp>
+                  <p:nvSpPr>
+                    <p:cNvPr id="82" name="TextBox 81"/>
+                    <p:cNvSpPr txBox="1"/>
+                    <p:nvPr/>
+                  </p:nvSpPr>
+                  <p:spPr>
+                    <a:xfrm>
+                      <a:off x="10191835" y="2656285"/>
+                      <a:ext cx="264367" cy="345159"/>
+                    </a:xfrm>
+                    <a:prstGeom prst="rect">
+                      <a:avLst/>
+                    </a:prstGeom>
+                    <a:noFill/>
+                  </p:spPr>
+                  <p:txBody>
+                    <a:bodyPr wrap="none" lIns="0" tIns="0" rIns="0" bIns="0" rtlCol="0">
+                      <a:spAutoFit/>
+                    </a:bodyPr>
+                    <a:lstStyle/>
+                    <a:p>
+                      <a:pPr/>
+                      <a14:m>
+                        <m:oMathPara xmlns:m="http://schemas.openxmlformats.org/officeDocument/2006/math">
+                          <m:oMathParaPr>
+                            <m:jc m:val="centerGroup"/>
+                          </m:oMathParaPr>
+                          <m:oMath xmlns:m="http://schemas.openxmlformats.org/officeDocument/2006/math">
+                            <m:acc>
+                              <m:accPr>
+                                <m:chr m:val="⃗"/>
+                                <m:ctrlPr>
+                                  <a:rPr lang="en-US" sz="2000" b="0" i="1" smtClean="0">
+                                    <a:latin typeface="Cambria Math" panose="02040503050406030204" pitchFamily="18" charset="0"/>
+                                    <a:cs typeface="Arial" panose="020B0604020202020204" pitchFamily="34" charset="0"/>
+                                  </a:rPr>
+                                </m:ctrlPr>
+                              </m:accPr>
+                              <m:e>
+                                <m:r>
+                                  <a:rPr lang="en-US" sz="2000" b="0" i="1" smtClean="0">
+                                    <a:latin typeface="Cambria Math" panose="02040503050406030204" pitchFamily="18" charset="0"/>
+                                    <a:cs typeface="Arial" panose="020B0604020202020204" pitchFamily="34" charset="0"/>
+                                  </a:rPr>
+                                  <m:t>𝑁</m:t>
+                                </m:r>
+                              </m:e>
+                            </m:acc>
+                          </m:oMath>
+                        </m:oMathPara>
+                      </a14:m>
+                      <a:endParaRPr lang="en-US" sz="2000" dirty="0">
+                        <a:latin typeface="Arial" panose="020B0604020202020204" pitchFamily="34" charset="0"/>
+                        <a:cs typeface="Arial" panose="020B0604020202020204" pitchFamily="34" charset="0"/>
+                      </a:endParaRPr>
+                    </a:p>
+                  </p:txBody>
+                </p:sp>
+              </mc:Choice>
+              <mc:Fallback xmlns="">
+                <p:sp>
+                  <p:nvSpPr>
+                    <p:cNvPr id="18" name="TextBox 17"/>
+                    <p:cNvSpPr txBox="1">
+                      <a:spLocks noRot="1" noChangeAspect="1" noMove="1" noResize="1" noEditPoints="1" noAdjustHandles="1" noChangeArrowheads="1" noChangeShapeType="1" noTextEdit="1"/>
+                    </p:cNvSpPr>
+                    <p:nvPr/>
+                  </p:nvSpPr>
+                  <p:spPr>
+                    <a:xfrm>
+                      <a:off x="10191835" y="2656285"/>
+                      <a:ext cx="264367" cy="345159"/>
+                    </a:xfrm>
+                    <a:prstGeom prst="rect">
+                      <a:avLst/>
+                    </a:prstGeom>
+                    <a:blipFill>
+                      <a:blip r:embed="rId3"/>
+                      <a:stretch>
+                        <a:fillRect l="-20930" r="-18605" b="-8772"/>
+                      </a:stretch>
+                    </a:blipFill>
+                  </p:spPr>
+                  <p:txBody>
+                    <a:bodyPr/>
+                    <a:lstStyle/>
+                    <a:p>
+                      <a:r>
+                        <a:rPr lang="en-US">
+                          <a:noFill/>
+                        </a:rPr>
+                        <a:t> </a:t>
+                      </a:r>
+                    </a:p>
+                  </p:txBody>
+                </p:sp>
+              </mc:Fallback>
+            </mc:AlternateContent>
+            <mc:AlternateContent xmlns:mc="http://schemas.openxmlformats.org/markup-compatibility/2006" xmlns:a14="http://schemas.microsoft.com/office/drawing/2010/main">
+              <mc:Choice Requires="a14">
+                <p:sp>
+                  <p:nvSpPr>
+                    <p:cNvPr id="83" name="TextBox 82"/>
+                    <p:cNvSpPr txBox="1"/>
+                    <p:nvPr/>
+                  </p:nvSpPr>
+                  <p:spPr>
+                    <a:xfrm>
+                      <a:off x="9619569" y="3883778"/>
+                      <a:ext cx="303866" cy="377219"/>
+                    </a:xfrm>
+                    <a:prstGeom prst="rect">
+                      <a:avLst/>
+                    </a:prstGeom>
+                    <a:noFill/>
+                  </p:spPr>
+                  <p:txBody>
+                    <a:bodyPr wrap="none" lIns="0" tIns="0" rIns="0" bIns="0" rtlCol="0">
+                      <a:spAutoFit/>
+                    </a:bodyPr>
+                    <a:lstStyle/>
+                    <a:p>
+                      <a:pPr/>
+                      <a14:m>
+                        <m:oMathPara xmlns:m="http://schemas.openxmlformats.org/officeDocument/2006/math">
+                          <m:oMathParaPr>
+                            <m:jc m:val="centerGroup"/>
+                          </m:oMathParaPr>
+                          <m:oMath xmlns:m="http://schemas.openxmlformats.org/officeDocument/2006/math">
+                            <m:sSub>
+                              <m:sSubPr>
+                                <m:ctrlPr>
+                                  <a:rPr lang="en-US" sz="2000" b="0" i="1" smtClean="0">
+                                    <a:latin typeface="Cambria Math" panose="02040503050406030204" pitchFamily="18" charset="0"/>
+                                    <a:cs typeface="Arial" panose="020B0604020202020204" pitchFamily="34" charset="0"/>
+                                  </a:rPr>
+                                </m:ctrlPr>
+                              </m:sSubPr>
+                              <m:e>
+                                <m:acc>
+                                  <m:accPr>
+                                    <m:chr m:val="⃗"/>
+                                    <m:ctrlPr>
+                                      <a:rPr lang="en-US" sz="2000" b="0" i="1" smtClean="0">
+                                        <a:latin typeface="Cambria Math" panose="02040503050406030204" pitchFamily="18" charset="0"/>
+                                        <a:cs typeface="Arial" panose="020B0604020202020204" pitchFamily="34" charset="0"/>
+                                      </a:rPr>
+                                    </m:ctrlPr>
+                                  </m:accPr>
+                                  <m:e>
+                                    <m:r>
+                                      <a:rPr lang="en-US" sz="2000" b="0" i="1" smtClean="0">
+                                        <a:latin typeface="Cambria Math" panose="02040503050406030204" pitchFamily="18" charset="0"/>
+                                        <a:cs typeface="Arial" panose="020B0604020202020204" pitchFamily="34" charset="0"/>
+                                      </a:rPr>
+                                      <m:t>𝐹</m:t>
+                                    </m:r>
+                                  </m:e>
+                                </m:acc>
+                              </m:e>
+                              <m:sub>
+                                <m:r>
+                                  <a:rPr lang="en-US" sz="2000" b="0" i="1" smtClean="0">
+                                    <a:latin typeface="Cambria Math" panose="02040503050406030204" pitchFamily="18" charset="0"/>
+                                    <a:cs typeface="Arial" panose="020B0604020202020204" pitchFamily="34" charset="0"/>
+                                  </a:rPr>
+                                  <m:t>𝑔</m:t>
+                                </m:r>
+                              </m:sub>
+                            </m:sSub>
+                          </m:oMath>
+                        </m:oMathPara>
+                      </a14:m>
+                      <a:endParaRPr lang="en-US" sz="2000" dirty="0">
+                        <a:latin typeface="Arial" panose="020B0604020202020204" pitchFamily="34" charset="0"/>
+                        <a:cs typeface="Arial" panose="020B0604020202020204" pitchFamily="34" charset="0"/>
+                      </a:endParaRPr>
+                    </a:p>
+                  </p:txBody>
+                </p:sp>
+              </mc:Choice>
+              <mc:Fallback xmlns="">
+                <p:sp>
+                  <p:nvSpPr>
+                    <p:cNvPr id="47" name="TextBox 46"/>
+                    <p:cNvSpPr txBox="1">
+                      <a:spLocks noRot="1" noChangeAspect="1" noMove="1" noResize="1" noEditPoints="1" noAdjustHandles="1" noChangeArrowheads="1" noChangeShapeType="1" noTextEdit="1"/>
+                    </p:cNvSpPr>
+                    <p:nvPr/>
+                  </p:nvSpPr>
+                  <p:spPr>
+                    <a:xfrm>
+                      <a:off x="9619569" y="3883778"/>
+                      <a:ext cx="303866" cy="377219"/>
+                    </a:xfrm>
+                    <a:prstGeom prst="rect">
+                      <a:avLst/>
+                    </a:prstGeom>
+                    <a:blipFill>
+                      <a:blip r:embed="rId42"/>
+                      <a:stretch>
+                        <a:fillRect l="-18000" t="-30645" r="-70000" b="-17742"/>
+                      </a:stretch>
+                    </a:blipFill>
+                  </p:spPr>
+                  <p:txBody>
+                    <a:bodyPr/>
+                    <a:lstStyle/>
+                    <a:p>
+                      <a:r>
+                        <a:rPr lang="en-US">
+                          <a:noFill/>
+                        </a:rPr>
+                        <a:t> </a:t>
+                      </a:r>
+                    </a:p>
+                  </p:txBody>
+                </p:sp>
+              </mc:Fallback>
+            </mc:AlternateContent>
+            <p:sp>
+              <p:nvSpPr>
+                <p:cNvPr id="84" name="Right Arrow 83"/>
+                <p:cNvSpPr/>
+                <p:nvPr/>
+              </p:nvSpPr>
+              <p:spPr>
+                <a:xfrm flipH="1">
+                  <a:off x="9625454" y="2274905"/>
+                  <a:ext cx="606575" cy="107622"/>
+                </a:xfrm>
+                <a:prstGeom prst="rightArrow">
+                  <a:avLst/>
+                </a:prstGeom>
+                <a:solidFill>
+                  <a:schemeClr val="tx1"/>
+                </a:solidFill>
+                <a:ln w="38100">
+                  <a:solidFill>
+                    <a:schemeClr val="tx1"/>
+                  </a:solidFill>
+                </a:ln>
+              </p:spPr>
+              <p:style>
+                <a:lnRef idx="2">
+                  <a:schemeClr val="accent1">
+                    <a:shade val="50000"/>
+                  </a:schemeClr>
+                </a:lnRef>
+                <a:fillRef idx="1">
+                  <a:schemeClr val="accent1"/>
+                </a:fillRef>
+                <a:effectRef idx="0">
+                  <a:schemeClr val="accent1"/>
+                </a:effectRef>
+                <a:fontRef idx="minor">
+                  <a:schemeClr val="lt1"/>
+                </a:fontRef>
+              </p:style>
+              <p:txBody>
+                <a:bodyPr rtlCol="0" anchor="ctr"/>
+                <a:lstStyle/>
+                <a:p>
+                  <a:pPr algn="ctr"/>
+                  <a:endParaRPr lang="en-US"/>
+                </a:p>
+              </p:txBody>
+            </p:sp>
+            <mc:AlternateContent xmlns:mc="http://schemas.openxmlformats.org/markup-compatibility/2006" xmlns:a14="http://schemas.microsoft.com/office/drawing/2010/main">
+              <mc:Choice Requires="a14">
+                <p:sp>
+                  <p:nvSpPr>
+                    <p:cNvPr id="85" name="TextBox 84"/>
+                    <p:cNvSpPr txBox="1"/>
+                    <p:nvPr/>
+                  </p:nvSpPr>
+                  <p:spPr>
+                    <a:xfrm>
+                      <a:off x="9893372" y="1940914"/>
+                      <a:ext cx="352917" cy="307777"/>
+                    </a:xfrm>
+                    <a:prstGeom prst="rect">
+                      <a:avLst/>
+                    </a:prstGeom>
+                    <a:noFill/>
+                  </p:spPr>
+                  <p:txBody>
+                    <a:bodyPr wrap="none" lIns="0" tIns="0" rIns="0" bIns="0" rtlCol="0">
+                      <a:spAutoFit/>
+                    </a:bodyPr>
+                    <a:lstStyle/>
+                    <a:p>
+                      <a:pPr/>
+                      <a14:m>
+                        <m:oMathPara xmlns:m="http://schemas.openxmlformats.org/officeDocument/2006/math">
+                          <m:oMathParaPr>
+                            <m:jc m:val="centerGroup"/>
+                          </m:oMathParaPr>
+                          <m:oMath xmlns:m="http://schemas.openxmlformats.org/officeDocument/2006/math">
+                            <m:sSub>
+                              <m:sSubPr>
+                                <m:ctrlPr>
+                                  <a:rPr lang="en-US" sz="2000" b="0" i="1" smtClean="0">
+                                    <a:latin typeface="Cambria Math" panose="02040503050406030204" pitchFamily="18" charset="0"/>
+                                    <a:cs typeface="Arial" panose="020B0604020202020204" pitchFamily="34" charset="0"/>
+                                  </a:rPr>
+                                </m:ctrlPr>
+                              </m:sSubPr>
+                              <m:e>
+                                <m:acc>
+                                  <m:accPr>
+                                    <m:chr m:val="⃗"/>
+                                    <m:ctrlPr>
+                                      <a:rPr lang="en-US" sz="2000" b="0" i="1" smtClean="0">
+                                        <a:latin typeface="Cambria Math" panose="02040503050406030204" pitchFamily="18" charset="0"/>
+                                        <a:cs typeface="Arial" panose="020B0604020202020204" pitchFamily="34" charset="0"/>
+                                      </a:rPr>
+                                    </m:ctrlPr>
+                                  </m:accPr>
+                                  <m:e>
+                                    <m:r>
+                                      <a:rPr lang="en-US" sz="2000" b="0" i="1" smtClean="0">
+                                        <a:latin typeface="Cambria Math" panose="02040503050406030204" pitchFamily="18" charset="0"/>
+                                        <a:cs typeface="Arial" panose="020B0604020202020204" pitchFamily="34" charset="0"/>
+                                      </a:rPr>
+                                      <m:t>𝑎</m:t>
+                                    </m:r>
+                                  </m:e>
+                                </m:acc>
+                              </m:e>
+                              <m:sub>
+                                <m:r>
+                                  <a:rPr lang="en-US" sz="2000" b="0" i="1" smtClean="0">
+                                    <a:latin typeface="Cambria Math" panose="02040503050406030204" pitchFamily="18" charset="0"/>
+                                    <a:cs typeface="Arial" panose="020B0604020202020204" pitchFamily="34" charset="0"/>
+                                  </a:rPr>
+                                  <m:t>𝑅</m:t>
+                                </m:r>
+                              </m:sub>
+                            </m:sSub>
+                          </m:oMath>
+                        </m:oMathPara>
+                      </a14:m>
+                      <a:endParaRPr lang="en-US" sz="2000" dirty="0">
+                        <a:latin typeface="Arial" panose="020B0604020202020204" pitchFamily="34" charset="0"/>
+                        <a:cs typeface="Arial" panose="020B0604020202020204" pitchFamily="34" charset="0"/>
+                      </a:endParaRPr>
+                    </a:p>
+                  </p:txBody>
+                </p:sp>
+              </mc:Choice>
+              <mc:Fallback xmlns="">
+                <p:sp>
+                  <p:nvSpPr>
+                    <p:cNvPr id="22" name="TextBox 21"/>
+                    <p:cNvSpPr txBox="1">
+                      <a:spLocks noRot="1" noChangeAspect="1" noMove="1" noResize="1" noEditPoints="1" noAdjustHandles="1" noChangeArrowheads="1" noChangeShapeType="1" noTextEdit="1"/>
+                    </p:cNvSpPr>
+                    <p:nvPr/>
+                  </p:nvSpPr>
+                  <p:spPr>
+                    <a:xfrm>
+                      <a:off x="9893372" y="1940914"/>
+                      <a:ext cx="352917" cy="307777"/>
+                    </a:xfrm>
+                    <a:prstGeom prst="rect">
+                      <a:avLst/>
+                    </a:prstGeom>
+                    <a:blipFill>
+                      <a:blip r:embed="rId44"/>
+                      <a:stretch>
+                        <a:fillRect l="-13793" t="-33333" r="-56897" b="-19608"/>
+                      </a:stretch>
+                    </a:blipFill>
+                  </p:spPr>
+                  <p:txBody>
+                    <a:bodyPr/>
+                    <a:lstStyle/>
+                    <a:p>
+                      <a:r>
+                        <a:rPr lang="en-US">
+                          <a:noFill/>
+                        </a:rPr>
+                        <a:t> </a:t>
+                      </a:r>
+                    </a:p>
+                  </p:txBody>
+                </p:sp>
+              </mc:Fallback>
+            </mc:AlternateContent>
+            <p:grpSp>
+              <p:nvGrpSpPr>
+                <p:cNvPr id="86" name="Group 85"/>
+                <p:cNvGrpSpPr/>
+                <p:nvPr/>
+              </p:nvGrpSpPr>
+              <p:grpSpPr>
+                <a:xfrm rot="21415886">
+                  <a:off x="8558589" y="4017294"/>
+                  <a:ext cx="903735" cy="980812"/>
+                  <a:chOff x="-195155" y="509392"/>
+                  <a:chExt cx="2610391" cy="2950201"/>
+                </a:xfrm>
+              </p:grpSpPr>
+              <p:grpSp>
+                <p:nvGrpSpPr>
+                  <p:cNvPr id="87" name="Group 86"/>
+                  <p:cNvGrpSpPr/>
+                  <p:nvPr/>
+                </p:nvGrpSpPr>
+                <p:grpSpPr>
+                  <a:xfrm>
+                    <a:off x="-195155" y="509392"/>
+                    <a:ext cx="2610391" cy="2950201"/>
+                    <a:chOff x="-167860" y="482096"/>
+                    <a:chExt cx="2610391" cy="2950201"/>
+                  </a:xfrm>
+                </p:grpSpPr>
+                <p:cxnSp>
+                  <p:nvCxnSpPr>
+                    <p:cNvPr id="89" name="Straight Arrow Connector 88"/>
+                    <p:cNvCxnSpPr/>
+                    <p:nvPr/>
+                  </p:nvCxnSpPr>
+                  <p:spPr>
+                    <a:xfrm rot="184114" flipH="1" flipV="1">
+                      <a:off x="1547188" y="664938"/>
+                      <a:ext cx="17631" cy="1876197"/>
+                    </a:xfrm>
+                    <a:prstGeom prst="straightConnector1">
+                      <a:avLst/>
+                    </a:prstGeom>
+                    <a:ln w="38100">
+                      <a:solidFill>
+                        <a:schemeClr val="tx1"/>
+                      </a:solidFill>
+                      <a:tailEnd type="triangle"/>
+                    </a:ln>
+                  </p:spPr>
+                  <p:style>
+                    <a:lnRef idx="1">
+                      <a:schemeClr val="accent1"/>
+                    </a:lnRef>
+                    <a:fillRef idx="0">
+                      <a:schemeClr val="accent1"/>
+                    </a:fillRef>
+                    <a:effectRef idx="0">
+                      <a:schemeClr val="accent1"/>
+                    </a:effectRef>
+                    <a:fontRef idx="minor">
+                      <a:schemeClr val="tx1"/>
+                    </a:fontRef>
+                  </p:style>
+                </p:cxnSp>
+                <p:cxnSp>
+                  <p:nvCxnSpPr>
+                    <p:cNvPr id="90" name="Straight Arrow Connector 89"/>
+                    <p:cNvCxnSpPr/>
+                    <p:nvPr/>
+                  </p:nvCxnSpPr>
+                  <p:spPr>
+                    <a:xfrm rot="184114" flipH="1">
+                      <a:off x="-167860" y="2488544"/>
+                      <a:ext cx="1675960" cy="4479"/>
+                    </a:xfrm>
+                    <a:prstGeom prst="straightConnector1">
+                      <a:avLst/>
+                    </a:prstGeom>
+                    <a:ln w="38100">
+                      <a:solidFill>
+                        <a:schemeClr val="tx1"/>
+                      </a:solidFill>
+                      <a:tailEnd type="triangle"/>
+                    </a:ln>
+                  </p:spPr>
+                  <p:style>
+                    <a:lnRef idx="1">
+                      <a:schemeClr val="accent1"/>
+                    </a:lnRef>
+                    <a:fillRef idx="0">
+                      <a:schemeClr val="accent1"/>
+                    </a:fillRef>
+                    <a:effectRef idx="0">
+                      <a:schemeClr val="accent1"/>
+                    </a:effectRef>
+                    <a:fontRef idx="minor">
+                      <a:schemeClr val="tx1"/>
+                    </a:fontRef>
+                  </p:style>
+                </p:cxnSp>
+                <mc:AlternateContent xmlns:mc="http://schemas.openxmlformats.org/markup-compatibility/2006" xmlns:a14="http://schemas.microsoft.com/office/drawing/2010/main">
+                  <mc:Choice Requires="a14">
+                    <p:sp>
+                      <p:nvSpPr>
+                        <p:cNvPr id="91" name="Rectangle 90"/>
+                        <p:cNvSpPr/>
+                        <p:nvPr/>
+                      </p:nvSpPr>
+                      <p:spPr>
+                        <a:xfrm>
+                          <a:off x="-159544" y="2321377"/>
+                          <a:ext cx="1010837" cy="1110920"/>
+                        </a:xfrm>
+                        <a:prstGeom prst="rect">
+                          <a:avLst/>
+                        </a:prstGeom>
+                      </p:spPr>
+                      <p:txBody>
+                        <a:bodyPr wrap="square">
+                          <a:spAutoFit/>
+                        </a:bodyPr>
+                        <a:lstStyle/>
+                        <a:p>
+                          <a:pPr/>
+                          <a14:m>
+                            <m:oMathPara xmlns:m="http://schemas.openxmlformats.org/officeDocument/2006/math">
+                              <m:oMathParaPr>
+                                <m:jc m:val="centerGroup"/>
+                              </m:oMathParaPr>
+                              <m:oMath xmlns:m="http://schemas.openxmlformats.org/officeDocument/2006/math">
+                                <m:r>
+                                  <a:rPr lang="en-US" i="1">
+                                    <a:latin typeface="Cambria Math" panose="02040503050406030204" pitchFamily="18" charset="0"/>
+                                    <a:cs typeface="Arial" panose="020B0604020202020204" pitchFamily="34" charset="0"/>
+                                  </a:rPr>
+                                  <m:t>𝑥</m:t>
+                                </m:r>
+                              </m:oMath>
+                            </m:oMathPara>
+                          </a14:m>
+                          <a:endParaRPr lang="en-CA" dirty="0"/>
+                        </a:p>
+                      </p:txBody>
+                    </p:sp>
+                  </mc:Choice>
+                  <mc:Fallback xmlns="">
+                    <p:sp>
+                      <p:nvSpPr>
+                        <p:cNvPr id="28" name="Rectangle 27"/>
+                        <p:cNvSpPr>
+                          <a:spLocks noRot="1" noChangeAspect="1" noMove="1" noResize="1" noEditPoints="1" noAdjustHandles="1" noChangeArrowheads="1" noChangeShapeType="1" noTextEdit="1"/>
+                        </p:cNvSpPr>
+                        <p:nvPr/>
+                      </p:nvSpPr>
+                      <p:spPr>
+                        <a:xfrm>
+                          <a:off x="-159544" y="2321377"/>
+                          <a:ext cx="1010837" cy="1110920"/>
+                        </a:xfrm>
+                        <a:prstGeom prst="rect">
+                          <a:avLst/>
+                        </a:prstGeom>
+                        <a:blipFill>
+                          <a:blip r:embed="rId45"/>
+                          <a:stretch>
+                            <a:fillRect/>
+                          </a:stretch>
+                        </a:blipFill>
+                      </p:spPr>
+                      <p:txBody>
+                        <a:bodyPr/>
+                        <a:lstStyle/>
+                        <a:p>
+                          <a:r>
+                            <a:rPr lang="en-US">
+                              <a:noFill/>
+                            </a:rPr>
+                            <a:t> </a:t>
+                          </a:r>
+                        </a:p>
+                      </p:txBody>
+                    </p:sp>
+                  </mc:Fallback>
+                </mc:AlternateContent>
+                <mc:AlternateContent xmlns:mc="http://schemas.openxmlformats.org/markup-compatibility/2006" xmlns:a14="http://schemas.microsoft.com/office/drawing/2010/main">
+                  <mc:Choice Requires="a14">
+                    <p:sp>
+                      <p:nvSpPr>
+                        <p:cNvPr id="92" name="Rectangle 91"/>
+                        <p:cNvSpPr/>
+                        <p:nvPr/>
+                      </p:nvSpPr>
+                      <p:spPr>
+                        <a:xfrm>
+                          <a:off x="1671664" y="482096"/>
+                          <a:ext cx="658647" cy="1110920"/>
+                        </a:xfrm>
+                        <a:prstGeom prst="rect">
+                          <a:avLst/>
+                        </a:prstGeom>
+                      </p:spPr>
+                      <p:txBody>
+                        <a:bodyPr wrap="square">
+                          <a:spAutoFit/>
+                        </a:bodyPr>
+                        <a:lstStyle/>
+                        <a:p>
+                          <a:pPr/>
+                          <a14:m>
+                            <m:oMathPara xmlns:m="http://schemas.openxmlformats.org/officeDocument/2006/math">
+                              <m:oMathParaPr>
+                                <m:jc m:val="centerGroup"/>
+                              </m:oMathParaPr>
+                              <m:oMath xmlns:m="http://schemas.openxmlformats.org/officeDocument/2006/math">
+                                <m:r>
+                                  <a:rPr lang="en-US" b="0" i="1" smtClean="0">
+                                    <a:latin typeface="Cambria Math" panose="02040503050406030204" pitchFamily="18" charset="0"/>
+                                  </a:rPr>
+                                  <m:t>𝑦</m:t>
+                                </m:r>
+                              </m:oMath>
+                            </m:oMathPara>
+                          </a14:m>
+                          <a:endParaRPr lang="en-CA" dirty="0"/>
+                        </a:p>
+                      </p:txBody>
+                    </p:sp>
+                  </mc:Choice>
+                  <mc:Fallback xmlns="">
+                    <p:sp>
+                      <p:nvSpPr>
+                        <p:cNvPr id="29" name="Rectangle 28"/>
+                        <p:cNvSpPr>
+                          <a:spLocks noRot="1" noChangeAspect="1" noMove="1" noResize="1" noEditPoints="1" noAdjustHandles="1" noChangeArrowheads="1" noChangeShapeType="1" noTextEdit="1"/>
+                        </p:cNvSpPr>
+                        <p:nvPr/>
+                      </p:nvSpPr>
+                      <p:spPr>
+                        <a:xfrm>
+                          <a:off x="1671664" y="482096"/>
+                          <a:ext cx="658647" cy="1110920"/>
+                        </a:xfrm>
+                        <a:prstGeom prst="rect">
+                          <a:avLst/>
+                        </a:prstGeom>
+                        <a:blipFill>
+                          <a:blip r:embed="rId46"/>
+                          <a:stretch>
+                            <a:fillRect r="-29268" b="-4762"/>
+                          </a:stretch>
+                        </a:blipFill>
+                      </p:spPr>
+                      <p:txBody>
+                        <a:bodyPr/>
+                        <a:lstStyle/>
+                        <a:p>
+                          <a:r>
+                            <a:rPr lang="en-US">
+                              <a:noFill/>
+                            </a:rPr>
+                            <a:t> </a:t>
+                          </a:r>
+                        </a:p>
+                      </p:txBody>
+                    </p:sp>
+                  </mc:Fallback>
+                </mc:AlternateContent>
+                <mc:AlternateContent xmlns:mc="http://schemas.openxmlformats.org/markup-compatibility/2006" xmlns:a14="http://schemas.microsoft.com/office/drawing/2010/main">
+                  <mc:Choice Requires="a14">
+                    <p:sp>
+                      <p:nvSpPr>
+                        <p:cNvPr id="93" name="Rectangle 92"/>
+                        <p:cNvSpPr/>
+                        <p:nvPr/>
+                      </p:nvSpPr>
+                      <p:spPr>
+                        <a:xfrm>
+                          <a:off x="1325751" y="2271021"/>
+                          <a:ext cx="1116780" cy="1110919"/>
+                        </a:xfrm>
+                        <a:prstGeom prst="rect">
+                          <a:avLst/>
+                        </a:prstGeom>
+                      </p:spPr>
+                      <p:txBody>
+                        <a:bodyPr wrap="square">
+                          <a:spAutoFit/>
+                        </a:bodyPr>
+                        <a:lstStyle/>
+                        <a:p>
+                          <a:pPr/>
+                          <a14:m>
+                            <m:oMathPara xmlns:m="http://schemas.openxmlformats.org/officeDocument/2006/math">
+                              <m:oMathParaPr>
+                                <m:jc m:val="centerGroup"/>
+                              </m:oMathParaPr>
+                              <m:oMath xmlns:m="http://schemas.openxmlformats.org/officeDocument/2006/math">
+                                <m:r>
+                                  <a:rPr lang="en-US" b="0" i="1" smtClean="0">
+                                    <a:latin typeface="Cambria Math" panose="02040503050406030204" pitchFamily="18" charset="0"/>
+                                    <a:cs typeface="Arial" panose="020B0604020202020204" pitchFamily="34" charset="0"/>
+                                  </a:rPr>
+                                  <m:t>0</m:t>
+                                </m:r>
+                              </m:oMath>
+                            </m:oMathPara>
+                          </a14:m>
+                          <a:endParaRPr lang="en-CA" dirty="0"/>
+                        </a:p>
+                      </p:txBody>
+                    </p:sp>
+                  </mc:Choice>
+                  <mc:Fallback xmlns="">
+                    <p:sp>
+                      <p:nvSpPr>
+                        <p:cNvPr id="30" name="Rectangle 29"/>
+                        <p:cNvSpPr>
+                          <a:spLocks noRot="1" noChangeAspect="1" noMove="1" noResize="1" noEditPoints="1" noAdjustHandles="1" noChangeArrowheads="1" noChangeShapeType="1" noTextEdit="1"/>
+                        </p:cNvSpPr>
+                        <p:nvPr/>
+                      </p:nvSpPr>
+                      <p:spPr>
+                        <a:xfrm>
+                          <a:off x="1325751" y="2271021"/>
+                          <a:ext cx="1116780" cy="1110919"/>
+                        </a:xfrm>
+                        <a:prstGeom prst="rect">
+                          <a:avLst/>
+                        </a:prstGeom>
+                        <a:blipFill>
+                          <a:blip r:embed="rId47"/>
+                          <a:stretch>
+                            <a:fillRect/>
+                          </a:stretch>
+                        </a:blipFill>
+                      </p:spPr>
+                      <p:txBody>
+                        <a:bodyPr/>
+                        <a:lstStyle/>
+                        <a:p>
+                          <a:r>
+                            <a:rPr lang="en-US">
+                              <a:noFill/>
+                            </a:rPr>
+                            <a:t> </a:t>
+                          </a:r>
+                        </a:p>
+                      </p:txBody>
+                    </p:sp>
+                  </mc:Fallback>
+                </mc:AlternateContent>
+              </p:grpSp>
+              <p:sp>
+                <p:nvSpPr>
+                  <p:cNvPr id="88" name="Rectangle 87"/>
+                  <p:cNvSpPr/>
+                  <p:nvPr/>
+                </p:nvSpPr>
+                <p:spPr>
+                  <a:xfrm>
+                    <a:off x="1129904" y="1614682"/>
+                    <a:ext cx="184731" cy="369332"/>
+                  </a:xfrm>
+                  <a:prstGeom prst="rect">
+                    <a:avLst/>
+                  </a:prstGeom>
+                </p:spPr>
+                <p:txBody>
+                  <a:bodyPr wrap="none">
+                    <a:spAutoFit/>
+                  </a:bodyPr>
+                  <a:lstStyle/>
+                  <a:p>
+                    <a:endParaRPr lang="en-CA" dirty="0"/>
+                  </a:p>
+                </p:txBody>
+              </p:sp>
+            </p:grpSp>
+          </p:grpSp>
+          <p:cxnSp>
+            <p:nvCxnSpPr>
+              <p:cNvPr id="97" name="Straight Connector 96"/>
+              <p:cNvCxnSpPr/>
+              <p:nvPr/>
+            </p:nvCxnSpPr>
+            <p:spPr>
+              <a:xfrm>
+                <a:off x="10619238" y="4272757"/>
+                <a:ext cx="10727" cy="754265"/>
+              </a:xfrm>
+              <a:prstGeom prst="line">
+                <a:avLst/>
+              </a:prstGeom>
+              <a:ln w="19050">
+                <a:solidFill>
+                  <a:schemeClr val="tx1"/>
+                </a:solidFill>
+                <a:prstDash val="sysDot"/>
+              </a:ln>
+            </p:spPr>
+            <p:style>
+              <a:lnRef idx="1">
+                <a:schemeClr val="accent1"/>
+              </a:lnRef>
+              <a:fillRef idx="0">
+                <a:schemeClr val="accent1"/>
+              </a:fillRef>
+              <a:effectRef idx="0">
+                <a:schemeClr val="accent1"/>
+              </a:effectRef>
+              <a:fontRef idx="minor">
+                <a:schemeClr val="tx1"/>
+              </a:fontRef>
+            </p:style>
+          </p:cxnSp>
+          <mc:AlternateContent xmlns:mc="http://schemas.openxmlformats.org/markup-compatibility/2006">
+            <mc:Choice xmlns:a14="http://schemas.microsoft.com/office/drawing/2010/main" Requires="a14">
+              <p:sp>
+                <p:nvSpPr>
+                  <p:cNvPr id="99" name="TextBox 98"/>
+                  <p:cNvSpPr txBox="1"/>
+                  <p:nvPr/>
+                </p:nvSpPr>
+                <p:spPr>
+                  <a:xfrm>
+                    <a:off x="10408054" y="4396781"/>
+                    <a:ext cx="222304" cy="307777"/>
+                  </a:xfrm>
+                  <a:prstGeom prst="rect">
+                    <a:avLst/>
+                  </a:prstGeom>
+                  <a:noFill/>
+                </p:spPr>
+                <p:txBody>
+                  <a:bodyPr wrap="none" lIns="0" tIns="0" rIns="0" bIns="0" rtlCol="0">
+                    <a:spAutoFit/>
+                  </a:bodyPr>
+                  <a:lstStyle/>
+                  <a:p>
+                    <a14:m>
+                      <m:oMathPara xmlns:m="http://schemas.openxmlformats.org/officeDocument/2006/math">
+                        <m:oMathParaPr>
+                          <m:jc m:val="centerGroup"/>
+                        </m:oMathParaPr>
+                        <m:oMath xmlns:m="http://schemas.openxmlformats.org/officeDocument/2006/math">
+                          <m:r>
+                            <a:rPr lang="en-US" sz="2000" b="0" i="1" smtClean="0">
+                              <a:latin typeface="Cambria Math" panose="02040503050406030204" pitchFamily="18" charset="0"/>
+                              <a:cs typeface="Arial" panose="020B0604020202020204" pitchFamily="34" charset="0"/>
+                            </a:rPr>
+                            <m:t>𝜃</m:t>
+                          </m:r>
+                        </m:oMath>
+                      </m:oMathPara>
+                    </a14:m>
+                    <a:endParaRPr lang="en-US" sz="2000" dirty="0" smtClean="0">
+                      <a:latin typeface="Arial" panose="020B0604020202020204" pitchFamily="34" charset="0"/>
+                      <a:cs typeface="Arial" panose="020B0604020202020204" pitchFamily="34" charset="0"/>
+                    </a:endParaRPr>
+                  </a:p>
+                </p:txBody>
+              </p:sp>
+            </mc:Choice>
+            <mc:Fallback>
+              <p:sp>
+                <p:nvSpPr>
+                  <p:cNvPr id="99" name="TextBox 98"/>
+                  <p:cNvSpPr txBox="1">
+                    <a:spLocks noRot="1" noChangeAspect="1" noMove="1" noResize="1" noEditPoints="1" noAdjustHandles="1" noChangeArrowheads="1" noChangeShapeType="1" noTextEdit="1"/>
+                  </p:cNvSpPr>
+                  <p:nvPr/>
+                </p:nvSpPr>
+                <p:spPr>
+                  <a:xfrm>
+                    <a:off x="10408054" y="4396781"/>
+                    <a:ext cx="222304" cy="307777"/>
+                  </a:xfrm>
+                  <a:prstGeom prst="rect">
+                    <a:avLst/>
+                  </a:prstGeom>
+                  <a:blipFill>
+                    <a:blip r:embed="rId54"/>
+                    <a:stretch>
+                      <a:fillRect l="-24324" r="-21622" b="-9804"/>
+                    </a:stretch>
+                  </a:blipFill>
+                </p:spPr>
+                <p:txBody>
+                  <a:bodyPr/>
+                  <a:lstStyle/>
+                  <a:p>
+                    <a:r>
+                      <a:rPr lang="en-US">
+                        <a:noFill/>
+                      </a:rPr>
+                      <a:t> </a:t>
+                    </a:r>
+                  </a:p>
+                </p:txBody>
+              </p:sp>
+            </mc:Fallback>
+          </mc:AlternateContent>
+          <p:cxnSp>
+            <p:nvCxnSpPr>
+              <p:cNvPr id="100" name="Straight Connector 99"/>
+              <p:cNvCxnSpPr/>
+              <p:nvPr/>
+            </p:nvCxnSpPr>
+            <p:spPr>
+              <a:xfrm flipV="1">
+                <a:off x="9934411" y="4989952"/>
+                <a:ext cx="608905" cy="7403"/>
+              </a:xfrm>
+              <a:prstGeom prst="line">
+                <a:avLst/>
+              </a:prstGeom>
+              <a:ln w="19050">
+                <a:solidFill>
+                  <a:schemeClr val="tx1"/>
+                </a:solidFill>
+                <a:prstDash val="sysDot"/>
+              </a:ln>
+            </p:spPr>
+            <p:style>
+              <a:lnRef idx="1">
+                <a:schemeClr val="accent1"/>
+              </a:lnRef>
+              <a:fillRef idx="0">
+                <a:schemeClr val="accent1"/>
+              </a:fillRef>
+              <a:effectRef idx="0">
+                <a:schemeClr val="accent1"/>
+              </a:effectRef>
+              <a:fontRef idx="minor">
+                <a:schemeClr val="tx1"/>
+              </a:fontRef>
+            </p:style>
+          </p:cxnSp>
+          <mc:AlternateContent xmlns:mc="http://schemas.openxmlformats.org/markup-compatibility/2006">
+            <mc:Choice xmlns:a14="http://schemas.microsoft.com/office/drawing/2010/main" Requires="a14">
+              <p:sp>
+                <p:nvSpPr>
+                  <p:cNvPr id="102" name="TextBox 101"/>
+                  <p:cNvSpPr txBox="1"/>
+                  <p:nvPr/>
+                </p:nvSpPr>
+                <p:spPr>
+                  <a:xfrm>
+                    <a:off x="10138717" y="4949009"/>
+                    <a:ext cx="250206" cy="314983"/>
+                  </a:xfrm>
+                  <a:prstGeom prst="rect">
+                    <a:avLst/>
+                  </a:prstGeom>
+                  <a:noFill/>
+                </p:spPr>
+                <p:txBody>
+                  <a:bodyPr wrap="square" lIns="0" tIns="0" rIns="0" bIns="0" rtlCol="0">
+                    <a:spAutoFit/>
+                  </a:bodyPr>
+                  <a:lstStyle/>
+                  <a:p>
+                    <a14:m>
+                      <m:oMathPara xmlns:m="http://schemas.openxmlformats.org/officeDocument/2006/math">
+                        <m:oMathParaPr>
+                          <m:jc m:val="centerGroup"/>
+                        </m:oMathParaPr>
+                        <m:oMath xmlns:m="http://schemas.openxmlformats.org/officeDocument/2006/math">
+                          <m:r>
+                            <a:rPr lang="en-US" sz="2000" b="0" i="1" smtClean="0">
+                              <a:latin typeface="Cambria Math" panose="02040503050406030204" pitchFamily="18" charset="0"/>
+                              <a:cs typeface="Arial" panose="020B0604020202020204" pitchFamily="34" charset="0"/>
+                            </a:rPr>
+                            <m:t>𝜃</m:t>
+                          </m:r>
+                        </m:oMath>
+                      </m:oMathPara>
+                    </a14:m>
+                    <a:endParaRPr lang="en-US" sz="2000" dirty="0" smtClean="0">
+                      <a:latin typeface="Arial" panose="020B0604020202020204" pitchFamily="34" charset="0"/>
+                      <a:cs typeface="Arial" panose="020B0604020202020204" pitchFamily="34" charset="0"/>
+                    </a:endParaRPr>
+                  </a:p>
+                </p:txBody>
+              </p:sp>
+            </mc:Choice>
+            <mc:Fallback>
+              <p:sp>
+                <p:nvSpPr>
+                  <p:cNvPr id="102" name="TextBox 101"/>
+                  <p:cNvSpPr txBox="1">
+                    <a:spLocks noRot="1" noChangeAspect="1" noMove="1" noResize="1" noEditPoints="1" noAdjustHandles="1" noChangeArrowheads="1" noChangeShapeType="1" noTextEdit="1"/>
+                  </p:cNvSpPr>
+                  <p:nvPr/>
+                </p:nvSpPr>
+                <p:spPr>
+                  <a:xfrm>
+                    <a:off x="10138717" y="4949009"/>
+                    <a:ext cx="250206" cy="314983"/>
+                  </a:xfrm>
+                  <a:prstGeom prst="rect">
+                    <a:avLst/>
+                  </a:prstGeom>
+                  <a:blipFill>
+                    <a:blip r:embed="rId55"/>
+                    <a:stretch>
+                      <a:fillRect l="-17073" r="-14634" b="-7692"/>
+                    </a:stretch>
+                  </a:blipFill>
+                </p:spPr>
+                <p:txBody>
+                  <a:bodyPr/>
+                  <a:lstStyle/>
+                  <a:p>
+                    <a:r>
+                      <a:rPr lang="en-US">
+                        <a:noFill/>
+                      </a:rPr>
+                      <a:t> </a:t>
+                    </a:r>
+                  </a:p>
+                </p:txBody>
+              </p:sp>
+            </mc:Fallback>
+          </mc:AlternateContent>
+        </p:grpSp>
+        <p:cxnSp>
+          <p:nvCxnSpPr>
+            <p:cNvPr id="104" name="Straight Arrow Connector 103"/>
+            <p:cNvCxnSpPr/>
+            <p:nvPr/>
+          </p:nvCxnSpPr>
+          <p:spPr>
+            <a:xfrm flipV="1">
+              <a:off x="10672197" y="4678810"/>
+              <a:ext cx="468141" cy="298774"/>
+            </a:xfrm>
+            <a:prstGeom prst="straightConnector1">
+              <a:avLst/>
+            </a:prstGeom>
+            <a:ln w="38100">
+              <a:solidFill>
+                <a:schemeClr val="tx1"/>
+              </a:solidFill>
+              <a:prstDash val="sysDot"/>
+              <a:tailEnd type="triangle"/>
+            </a:ln>
+          </p:spPr>
+          <p:style>
+            <a:lnRef idx="1">
+              <a:schemeClr val="accent1"/>
+            </a:lnRef>
+            <a:fillRef idx="0">
+              <a:schemeClr val="accent1"/>
+            </a:fillRef>
+            <a:effectRef idx="0">
+              <a:schemeClr val="accent1"/>
+            </a:effectRef>
+            <a:fontRef idx="minor">
+              <a:schemeClr val="tx1"/>
+            </a:fontRef>
+          </p:style>
+        </p:cxnSp>
+        <mc:AlternateContent xmlns:mc="http://schemas.openxmlformats.org/markup-compatibility/2006">
+          <mc:Choice xmlns:a14="http://schemas.microsoft.com/office/drawing/2010/main" Requires="a14">
+            <p:sp>
+              <p:nvSpPr>
+                <p:cNvPr id="109" name="TextBox 108"/>
+                <p:cNvSpPr txBox="1"/>
+                <p:nvPr/>
+              </p:nvSpPr>
+              <p:spPr>
+                <a:xfrm>
+                  <a:off x="11113077" y="4672951"/>
+                  <a:ext cx="267381" cy="354071"/>
+                </a:xfrm>
+                <a:prstGeom prst="rect">
+                  <a:avLst/>
+                </a:prstGeom>
+                <a:noFill/>
+              </p:spPr>
+              <p:txBody>
+                <a:bodyPr wrap="none" lIns="0" tIns="0" rIns="0" bIns="0" rtlCol="0">
+                  <a:spAutoFit/>
+                </a:bodyPr>
+                <a:lstStyle/>
+                <a:p>
+                  <a:pPr/>
+                  <a14:m>
+                    <m:oMathPara xmlns:m="http://schemas.openxmlformats.org/officeDocument/2006/math">
+                      <m:oMathParaPr>
+                        <m:jc m:val="centerGroup"/>
+                      </m:oMathParaPr>
+                      <m:oMath xmlns:m="http://schemas.openxmlformats.org/officeDocument/2006/math">
+                        <m:sSub>
+                          <m:sSubPr>
+                            <m:ctrlPr>
+                              <a:rPr lang="en-US" sz="2000" b="0" i="1" smtClean="0">
+                                <a:latin typeface="Cambria Math" panose="02040503050406030204" pitchFamily="18" charset="0"/>
+                                <a:cs typeface="Arial" panose="020B0604020202020204" pitchFamily="34" charset="0"/>
+                              </a:rPr>
+                            </m:ctrlPr>
+                          </m:sSubPr>
+                          <m:e>
+                            <m:acc>
+                              <m:accPr>
+                                <m:chr m:val="⃗"/>
+                                <m:ctrlPr>
+                                  <a:rPr lang="en-US" sz="2000" b="0" i="1" smtClean="0">
+                                    <a:latin typeface="Cambria Math" panose="02040503050406030204" pitchFamily="18" charset="0"/>
+                                    <a:cs typeface="Arial" panose="020B0604020202020204" pitchFamily="34" charset="0"/>
+                                  </a:rPr>
+                                </m:ctrlPr>
+                              </m:accPr>
+                              <m:e>
+                                <m:r>
+                                  <a:rPr lang="en-US" sz="2000" b="0" i="1" smtClean="0">
+                                    <a:latin typeface="Cambria Math" panose="02040503050406030204" pitchFamily="18" charset="0"/>
+                                    <a:cs typeface="Arial" panose="020B0604020202020204" pitchFamily="34" charset="0"/>
+                                  </a:rPr>
+                                  <m:t>𝑓</m:t>
+                                </m:r>
+                              </m:e>
+                            </m:acc>
+                          </m:e>
+                          <m:sub>
+                            <m:r>
+                              <a:rPr lang="en-US" sz="2000" b="0" i="1" smtClean="0">
+                                <a:latin typeface="Cambria Math" panose="02040503050406030204" pitchFamily="18" charset="0"/>
+                                <a:cs typeface="Arial" panose="020B0604020202020204" pitchFamily="34" charset="0"/>
+                              </a:rPr>
+                              <m:t>𝑠</m:t>
+                            </m:r>
+                          </m:sub>
+                        </m:sSub>
+                      </m:oMath>
+                    </m:oMathPara>
+                  </a14:m>
+                  <a:endParaRPr lang="en-US" sz="2000" dirty="0">
+                    <a:latin typeface="Arial" panose="020B0604020202020204" pitchFamily="34" charset="0"/>
+                    <a:cs typeface="Arial" panose="020B0604020202020204" pitchFamily="34" charset="0"/>
+                  </a:endParaRPr>
+                </a:p>
+              </p:txBody>
+            </p:sp>
+          </mc:Choice>
+          <mc:Fallback>
+            <p:sp>
+              <p:nvSpPr>
+                <p:cNvPr id="109" name="TextBox 108"/>
+                <p:cNvSpPr txBox="1">
+                  <a:spLocks noRot="1" noChangeAspect="1" noMove="1" noResize="1" noEditPoints="1" noAdjustHandles="1" noChangeArrowheads="1" noChangeShapeType="1" noTextEdit="1"/>
+                </p:cNvSpPr>
+                <p:nvPr/>
+              </p:nvSpPr>
+              <p:spPr>
+                <a:xfrm>
+                  <a:off x="11113077" y="4672951"/>
+                  <a:ext cx="267381" cy="354071"/>
+                </a:xfrm>
+                <a:prstGeom prst="rect">
+                  <a:avLst/>
+                </a:prstGeom>
+                <a:blipFill>
+                  <a:blip r:embed="rId56"/>
+                  <a:stretch>
+                    <a:fillRect l="-29545" t="-34483" r="-84091" b="-31034"/>
+                  </a:stretch>
+                </a:blipFill>
+              </p:spPr>
+              <p:txBody>
+                <a:bodyPr/>
+                <a:lstStyle/>
+                <a:p>
+                  <a:r>
+                    <a:rPr lang="en-US">
+                      <a:noFill/>
+                    </a:rPr>
+                    <a:t> </a:t>
+                  </a:r>
+                </a:p>
+              </p:txBody>
+            </p:sp>
+          </mc:Fallback>
+        </mc:AlternateContent>
+      </p:grpSp>
     </p:spTree>
     <p:extLst>
       <p:ext uri="{BB962C8B-B14F-4D97-AF65-F5344CB8AC3E}">
         <p14:creationId xmlns:p14="http://schemas.microsoft.com/office/powerpoint/2010/main" val="1725024232"/>
+      </p:ext>
+    </p:extLst>
+  </p:cSld>
+  <p:clrMapOvr>
+    <a:masterClrMapping/>
+  </p:clrMapOvr>
+</p:sld>
+</file>
+
+<file path=ppt/slides/slide8.xml><?xml version="1.0" encoding="utf-8"?>
+<p:sld xmlns:a="http://schemas.openxmlformats.org/drawingml/2006/main" xmlns:r="http://schemas.openxmlformats.org/officeDocument/2006/relationships" xmlns:p="http://schemas.openxmlformats.org/presentationml/2006/main">
+  <p:cSld>
+    <p:spTree>
+      <p:nvGrpSpPr>
+        <p:cNvPr id="1" name=""/>
+        <p:cNvGrpSpPr/>
+        <p:nvPr/>
+      </p:nvGrpSpPr>
+      <p:grpSpPr>
+        <a:xfrm>
+          <a:off x="0" y="0"/>
+          <a:ext cx="0" cy="0"/>
+          <a:chOff x="0" y="0"/>
+          <a:chExt cx="0" cy="0"/>
+        </a:xfrm>
+      </p:grpSpPr>
+    </p:spTree>
+    <p:extLst>
+      <p:ext uri="{BB962C8B-B14F-4D97-AF65-F5344CB8AC3E}">
+        <p14:creationId xmlns:p14="http://schemas.microsoft.com/office/powerpoint/2010/main" val="2974178763"/>
       </p:ext>
     </p:extLst>
   </p:cSld>

</xml_diff>